<commit_message>
ficha técnica nueva, icono del la barra de navegación, order por Nid de los listados de obras
</commit_message>
<xml_diff>
--- a/obras/static/ppt/FichaTecnicaObras.pptx
+++ b/obras/static/ppt/FichaTecnicaObras.pptx
@@ -4,8 +4,11 @@
   <p:sldMasterIdLst>
     <p:sldMasterId id="2147483648" r:id="rId1"/>
   </p:sldMasterIdLst>
+  <p:notesMasterIdLst>
+    <p:notesMasterId r:id="rId3"/>
+  </p:notesMasterIdLst>
   <p:handoutMasterIdLst>
-    <p:handoutMasterId r:id="rId3"/>
+    <p:handoutMasterId r:id="rId4"/>
   </p:handoutMasterIdLst>
   <p:sldIdLst>
     <p:sldId id="256" r:id="rId2"/>
@@ -107,6 +110,36 @@
       </a:defRPr>
     </a:lvl9pPr>
   </p:defaultTextStyle>
+  <p:extLst>
+    <p:ext uri="{EFAFB233-063F-42B5-8137-9DF3F51BA10A}">
+      <p15:sldGuideLst xmlns:p15="http://schemas.microsoft.com/office/powerpoint/2012/main">
+        <p15:guide id="1" orient="horz" pos="2160">
+          <p15:clr>
+            <a:srgbClr val="A4A3A4"/>
+          </p15:clr>
+        </p15:guide>
+        <p15:guide id="2" pos="2880">
+          <p15:clr>
+            <a:srgbClr val="A4A3A4"/>
+          </p15:clr>
+        </p15:guide>
+      </p15:sldGuideLst>
+    </p:ext>
+    <p:ext uri="{2D200454-40CA-4A62-9FC3-DE9A4176ACB9}">
+      <p15:notesGuideLst xmlns:p15="http://schemas.microsoft.com/office/powerpoint/2012/main">
+        <p15:guide id="1" orient="horz" pos="2880">
+          <p15:clr>
+            <a:srgbClr val="A4A3A4"/>
+          </p15:clr>
+        </p15:guide>
+        <p15:guide id="2" pos="2160">
+          <p15:clr>
+            <a:srgbClr val="A4A3A4"/>
+          </p15:clr>
+        </p15:guide>
+      </p15:notesGuideLst>
+    </p:ext>
+  </p:extLst>
 </p:presentation>
 </file>
 
@@ -192,7 +225,7 @@
           <a:p>
             <a:fld id="{A12F159B-2BA9-4A4C-8F37-6A12CA4521B5}" type="datetimeFigureOut">
               <a:rPr lang="es-MX" smtClean="0"/>
-              <a:t>05/07/2015</a:t>
+              <a:t>17/07/2015</a:t>
             </a:fld>
             <a:endParaRPr lang="es-MX"/>
           </a:p>
@@ -273,6 +306,356 @@
   </p:cSld>
   <p:clrMap bg1="lt1" tx1="dk1" bg2="lt2" tx2="dk2" accent1="accent1" accent2="accent2" accent3="accent3" accent4="accent4" accent5="accent5" accent6="accent6" hlink="hlink" folHlink="folHlink"/>
 </p:handoutMaster>
+</file>
+
+<file path=ppt/notesMasters/notesMaster1.xml><?xml version="1.0" encoding="utf-8"?>
+<p:notesMaster xmlns:a="http://schemas.openxmlformats.org/drawingml/2006/main" xmlns:r="http://schemas.openxmlformats.org/officeDocument/2006/relationships" xmlns:p="http://schemas.openxmlformats.org/presentationml/2006/main">
+  <p:cSld>
+    <p:bg>
+      <p:bgRef idx="1001">
+        <a:schemeClr val="bg1"/>
+      </p:bgRef>
+    </p:bg>
+    <p:spTree>
+      <p:nvGrpSpPr>
+        <p:cNvPr id="1" name=""/>
+        <p:cNvGrpSpPr/>
+        <p:nvPr/>
+      </p:nvGrpSpPr>
+      <p:grpSpPr>
+        <a:xfrm>
+          <a:off x="0" y="0"/>
+          <a:ext cx="0" cy="0"/>
+          <a:chOff x="0" y="0"/>
+          <a:chExt cx="0" cy="0"/>
+        </a:xfrm>
+      </p:grpSpPr>
+      <p:sp>
+        <p:nvSpPr>
+          <p:cNvPr id="2" name="1 Marcador de encabezado"/>
+          <p:cNvSpPr>
+            <a:spLocks noGrp="1"/>
+          </p:cNvSpPr>
+          <p:nvPr>
+            <p:ph type="hdr" sz="quarter"/>
+          </p:nvPr>
+        </p:nvSpPr>
+        <p:spPr>
+          <a:xfrm>
+            <a:off x="0" y="0"/>
+            <a:ext cx="2971800" cy="457200"/>
+          </a:xfrm>
+          <a:prstGeom prst="rect">
+            <a:avLst/>
+          </a:prstGeom>
+        </p:spPr>
+        <p:txBody>
+          <a:bodyPr vert="horz" lIns="91440" tIns="45720" rIns="91440" bIns="45720" rtlCol="0"/>
+          <a:lstStyle>
+            <a:lvl1pPr algn="l">
+              <a:defRPr sz="1200"/>
+            </a:lvl1pPr>
+          </a:lstStyle>
+          <a:p>
+            <a:endParaRPr lang="es-MX"/>
+          </a:p>
+        </p:txBody>
+      </p:sp>
+      <p:sp>
+        <p:nvSpPr>
+          <p:cNvPr id="3" name="2 Marcador de fecha"/>
+          <p:cNvSpPr>
+            <a:spLocks noGrp="1"/>
+          </p:cNvSpPr>
+          <p:nvPr>
+            <p:ph type="dt" idx="1"/>
+          </p:nvPr>
+        </p:nvSpPr>
+        <p:spPr>
+          <a:xfrm>
+            <a:off x="3884613" y="0"/>
+            <a:ext cx="2971800" cy="457200"/>
+          </a:xfrm>
+          <a:prstGeom prst="rect">
+            <a:avLst/>
+          </a:prstGeom>
+        </p:spPr>
+        <p:txBody>
+          <a:bodyPr vert="horz" lIns="91440" tIns="45720" rIns="91440" bIns="45720" rtlCol="0"/>
+          <a:lstStyle>
+            <a:lvl1pPr algn="r">
+              <a:defRPr sz="1200"/>
+            </a:lvl1pPr>
+          </a:lstStyle>
+          <a:p>
+            <a:fld id="{E725DF0C-0434-4166-AFB2-E9FB5C8C5747}" type="datetimeFigureOut">
+              <a:rPr lang="es-MX" smtClean="0"/>
+              <a:t>17/07/2015</a:t>
+            </a:fld>
+            <a:endParaRPr lang="es-MX"/>
+          </a:p>
+        </p:txBody>
+      </p:sp>
+      <p:sp>
+        <p:nvSpPr>
+          <p:cNvPr id="4" name="3 Marcador de imagen de diapositiva"/>
+          <p:cNvSpPr>
+            <a:spLocks noGrp="1" noRot="1" noChangeAspect="1"/>
+          </p:cNvSpPr>
+          <p:nvPr>
+            <p:ph type="sldImg" idx="2"/>
+          </p:nvPr>
+        </p:nvSpPr>
+        <p:spPr>
+          <a:xfrm>
+            <a:off x="1143000" y="685800"/>
+            <a:ext cx="4572000" cy="3429000"/>
+          </a:xfrm>
+          <a:prstGeom prst="rect">
+            <a:avLst/>
+          </a:prstGeom>
+          <a:noFill/>
+          <a:ln w="12700">
+            <a:solidFill>
+              <a:prstClr val="black"/>
+            </a:solidFill>
+          </a:ln>
+        </p:spPr>
+        <p:txBody>
+          <a:bodyPr vert="horz" lIns="91440" tIns="45720" rIns="91440" bIns="45720" rtlCol="0" anchor="ctr"/>
+          <a:lstStyle/>
+          <a:p>
+            <a:endParaRPr lang="es-MX"/>
+          </a:p>
+        </p:txBody>
+      </p:sp>
+      <p:sp>
+        <p:nvSpPr>
+          <p:cNvPr id="5" name="4 Marcador de notas"/>
+          <p:cNvSpPr>
+            <a:spLocks noGrp="1"/>
+          </p:cNvSpPr>
+          <p:nvPr>
+            <p:ph type="body" sz="quarter" idx="3"/>
+          </p:nvPr>
+        </p:nvSpPr>
+        <p:spPr>
+          <a:xfrm>
+            <a:off x="685800" y="4343400"/>
+            <a:ext cx="5486400" cy="4114800"/>
+          </a:xfrm>
+          <a:prstGeom prst="rect">
+            <a:avLst/>
+          </a:prstGeom>
+        </p:spPr>
+        <p:txBody>
+          <a:bodyPr vert="horz" lIns="91440" tIns="45720" rIns="91440" bIns="45720" rtlCol="0"/>
+          <a:lstStyle/>
+          <a:p>
+            <a:pPr lvl="0"/>
+            <a:r>
+              <a:rPr lang="es-ES" smtClean="0"/>
+              <a:t>Haga clic para modificar el estilo de texto del patrón</a:t>
+            </a:r>
+          </a:p>
+          <a:p>
+            <a:pPr lvl="1"/>
+            <a:r>
+              <a:rPr lang="es-ES" smtClean="0"/>
+              <a:t>Segundo nivel</a:t>
+            </a:r>
+          </a:p>
+          <a:p>
+            <a:pPr lvl="2"/>
+            <a:r>
+              <a:rPr lang="es-ES" smtClean="0"/>
+              <a:t>Tercer nivel</a:t>
+            </a:r>
+          </a:p>
+          <a:p>
+            <a:pPr lvl="3"/>
+            <a:r>
+              <a:rPr lang="es-ES" smtClean="0"/>
+              <a:t>Cuarto nivel</a:t>
+            </a:r>
+          </a:p>
+          <a:p>
+            <a:pPr lvl="4"/>
+            <a:r>
+              <a:rPr lang="es-ES" smtClean="0"/>
+              <a:t>Quinto nivel</a:t>
+            </a:r>
+            <a:endParaRPr lang="es-MX"/>
+          </a:p>
+        </p:txBody>
+      </p:sp>
+      <p:sp>
+        <p:nvSpPr>
+          <p:cNvPr id="6" name="5 Marcador de pie de página"/>
+          <p:cNvSpPr>
+            <a:spLocks noGrp="1"/>
+          </p:cNvSpPr>
+          <p:nvPr>
+            <p:ph type="ftr" sz="quarter" idx="4"/>
+          </p:nvPr>
+        </p:nvSpPr>
+        <p:spPr>
+          <a:xfrm>
+            <a:off x="0" y="8685213"/>
+            <a:ext cx="2971800" cy="457200"/>
+          </a:xfrm>
+          <a:prstGeom prst="rect">
+            <a:avLst/>
+          </a:prstGeom>
+        </p:spPr>
+        <p:txBody>
+          <a:bodyPr vert="horz" lIns="91440" tIns="45720" rIns="91440" bIns="45720" rtlCol="0" anchor="b"/>
+          <a:lstStyle>
+            <a:lvl1pPr algn="l">
+              <a:defRPr sz="1200"/>
+            </a:lvl1pPr>
+          </a:lstStyle>
+          <a:p>
+            <a:endParaRPr lang="es-MX"/>
+          </a:p>
+        </p:txBody>
+      </p:sp>
+      <p:sp>
+        <p:nvSpPr>
+          <p:cNvPr id="7" name="6 Marcador de número de diapositiva"/>
+          <p:cNvSpPr>
+            <a:spLocks noGrp="1"/>
+          </p:cNvSpPr>
+          <p:nvPr>
+            <p:ph type="sldNum" sz="quarter" idx="5"/>
+          </p:nvPr>
+        </p:nvSpPr>
+        <p:spPr>
+          <a:xfrm>
+            <a:off x="3884613" y="8685213"/>
+            <a:ext cx="2971800" cy="457200"/>
+          </a:xfrm>
+          <a:prstGeom prst="rect">
+            <a:avLst/>
+          </a:prstGeom>
+        </p:spPr>
+        <p:txBody>
+          <a:bodyPr vert="horz" lIns="91440" tIns="45720" rIns="91440" bIns="45720" rtlCol="0" anchor="b"/>
+          <a:lstStyle>
+            <a:lvl1pPr algn="r">
+              <a:defRPr sz="1200"/>
+            </a:lvl1pPr>
+          </a:lstStyle>
+          <a:p>
+            <a:fld id="{6C2C919C-6F3A-4BD1-A987-70045E4C4A6B}" type="slidenum">
+              <a:rPr lang="es-MX" smtClean="0"/>
+              <a:t>‹Nº›</a:t>
+            </a:fld>
+            <a:endParaRPr lang="es-MX"/>
+          </a:p>
+        </p:txBody>
+      </p:sp>
+    </p:spTree>
+    <p:extLst>
+      <p:ext uri="{BB962C8B-B14F-4D97-AF65-F5344CB8AC3E}">
+        <p14:creationId xmlns:p14="http://schemas.microsoft.com/office/powerpoint/2010/main" val="1065884515"/>
+      </p:ext>
+    </p:extLst>
+  </p:cSld>
+  <p:clrMap bg1="lt1" tx1="dk1" bg2="lt2" tx2="dk2" accent1="accent1" accent2="accent2" accent3="accent3" accent4="accent4" accent5="accent5" accent6="accent6" hlink="hlink" folHlink="folHlink"/>
+  <p:notesStyle>
+    <a:lvl1pPr marL="0" algn="l" defTabSz="914400" rtl="0" eaLnBrk="1" latinLnBrk="0" hangingPunct="1">
+      <a:defRPr sz="1200" kern="1200">
+        <a:solidFill>
+          <a:schemeClr val="tx1"/>
+        </a:solidFill>
+        <a:latin typeface="+mn-lt"/>
+        <a:ea typeface="+mn-ea"/>
+        <a:cs typeface="+mn-cs"/>
+      </a:defRPr>
+    </a:lvl1pPr>
+    <a:lvl2pPr marL="457200" algn="l" defTabSz="914400" rtl="0" eaLnBrk="1" latinLnBrk="0" hangingPunct="1">
+      <a:defRPr sz="1200" kern="1200">
+        <a:solidFill>
+          <a:schemeClr val="tx1"/>
+        </a:solidFill>
+        <a:latin typeface="+mn-lt"/>
+        <a:ea typeface="+mn-ea"/>
+        <a:cs typeface="+mn-cs"/>
+      </a:defRPr>
+    </a:lvl2pPr>
+    <a:lvl3pPr marL="914400" algn="l" defTabSz="914400" rtl="0" eaLnBrk="1" latinLnBrk="0" hangingPunct="1">
+      <a:defRPr sz="1200" kern="1200">
+        <a:solidFill>
+          <a:schemeClr val="tx1"/>
+        </a:solidFill>
+        <a:latin typeface="+mn-lt"/>
+        <a:ea typeface="+mn-ea"/>
+        <a:cs typeface="+mn-cs"/>
+      </a:defRPr>
+    </a:lvl3pPr>
+    <a:lvl4pPr marL="1371600" algn="l" defTabSz="914400" rtl="0" eaLnBrk="1" latinLnBrk="0" hangingPunct="1">
+      <a:defRPr sz="1200" kern="1200">
+        <a:solidFill>
+          <a:schemeClr val="tx1"/>
+        </a:solidFill>
+        <a:latin typeface="+mn-lt"/>
+        <a:ea typeface="+mn-ea"/>
+        <a:cs typeface="+mn-cs"/>
+      </a:defRPr>
+    </a:lvl4pPr>
+    <a:lvl5pPr marL="1828800" algn="l" defTabSz="914400" rtl="0" eaLnBrk="1" latinLnBrk="0" hangingPunct="1">
+      <a:defRPr sz="1200" kern="1200">
+        <a:solidFill>
+          <a:schemeClr val="tx1"/>
+        </a:solidFill>
+        <a:latin typeface="+mn-lt"/>
+        <a:ea typeface="+mn-ea"/>
+        <a:cs typeface="+mn-cs"/>
+      </a:defRPr>
+    </a:lvl5pPr>
+    <a:lvl6pPr marL="2286000" algn="l" defTabSz="914400" rtl="0" eaLnBrk="1" latinLnBrk="0" hangingPunct="1">
+      <a:defRPr sz="1200" kern="1200">
+        <a:solidFill>
+          <a:schemeClr val="tx1"/>
+        </a:solidFill>
+        <a:latin typeface="+mn-lt"/>
+        <a:ea typeface="+mn-ea"/>
+        <a:cs typeface="+mn-cs"/>
+      </a:defRPr>
+    </a:lvl6pPr>
+    <a:lvl7pPr marL="2743200" algn="l" defTabSz="914400" rtl="0" eaLnBrk="1" latinLnBrk="0" hangingPunct="1">
+      <a:defRPr sz="1200" kern="1200">
+        <a:solidFill>
+          <a:schemeClr val="tx1"/>
+        </a:solidFill>
+        <a:latin typeface="+mn-lt"/>
+        <a:ea typeface="+mn-ea"/>
+        <a:cs typeface="+mn-cs"/>
+      </a:defRPr>
+    </a:lvl7pPr>
+    <a:lvl8pPr marL="3200400" algn="l" defTabSz="914400" rtl="0" eaLnBrk="1" latinLnBrk="0" hangingPunct="1">
+      <a:defRPr sz="1200" kern="1200">
+        <a:solidFill>
+          <a:schemeClr val="tx1"/>
+        </a:solidFill>
+        <a:latin typeface="+mn-lt"/>
+        <a:ea typeface="+mn-ea"/>
+        <a:cs typeface="+mn-cs"/>
+      </a:defRPr>
+    </a:lvl8pPr>
+    <a:lvl9pPr marL="3657600" algn="l" defTabSz="914400" rtl="0" eaLnBrk="1" latinLnBrk="0" hangingPunct="1">
+      <a:defRPr sz="1200" kern="1200">
+        <a:solidFill>
+          <a:schemeClr val="tx1"/>
+        </a:solidFill>
+        <a:latin typeface="+mn-lt"/>
+        <a:ea typeface="+mn-ea"/>
+        <a:cs typeface="+mn-cs"/>
+      </a:defRPr>
+    </a:lvl9pPr>
+  </p:notesStyle>
+</p:notesMaster>
 </file>
 
 <file path=ppt/slideLayouts/slideLayout1.xml><?xml version="1.0" encoding="utf-8"?>
@@ -462,7 +845,7 @@
           <a:p>
             <a:fld id="{F4C741E7-0659-46B3-91BB-B8C3B98C4B5D}" type="datetimeFigureOut">
               <a:rPr lang="es-MX" smtClean="0"/>
-              <a:t>05/07/2015</a:t>
+              <a:t>17/07/2015</a:t>
             </a:fld>
             <a:endParaRPr lang="es-MX"/>
           </a:p>
@@ -655,7 +1038,7 @@
           <a:p>
             <a:fld id="{F4C741E7-0659-46B3-91BB-B8C3B98C4B5D}" type="datetimeFigureOut">
               <a:rPr lang="es-MX" smtClean="0"/>
-              <a:t>05/07/2015</a:t>
+              <a:t>17/07/2015</a:t>
             </a:fld>
             <a:endParaRPr lang="es-MX"/>
           </a:p>
@@ -841,7 +1224,7 @@
           <a:p>
             <a:fld id="{F4C741E7-0659-46B3-91BB-B8C3B98C4B5D}" type="datetimeFigureOut">
               <a:rPr lang="es-MX" smtClean="0"/>
-              <a:t>05/07/2015</a:t>
+              <a:t>17/07/2015</a:t>
             </a:fld>
             <a:endParaRPr lang="es-MX"/>
           </a:p>
@@ -1027,7 +1410,7 @@
           <a:p>
             <a:fld id="{F4C741E7-0659-46B3-91BB-B8C3B98C4B5D}" type="datetimeFigureOut">
               <a:rPr lang="es-MX" smtClean="0"/>
-              <a:t>05/07/2015</a:t>
+              <a:t>17/07/2015</a:t>
             </a:fld>
             <a:endParaRPr lang="es-MX"/>
           </a:p>
@@ -1279,7 +1662,7 @@
           <a:p>
             <a:fld id="{F4C741E7-0659-46B3-91BB-B8C3B98C4B5D}" type="datetimeFigureOut">
               <a:rPr lang="es-MX" smtClean="0"/>
-              <a:t>05/07/2015</a:t>
+              <a:t>17/07/2015</a:t>
             </a:fld>
             <a:endParaRPr lang="es-MX"/>
           </a:p>
@@ -1581,7 +1964,7 @@
           <a:p>
             <a:fld id="{F4C741E7-0659-46B3-91BB-B8C3B98C4B5D}" type="datetimeFigureOut">
               <a:rPr lang="es-MX" smtClean="0"/>
-              <a:t>05/07/2015</a:t>
+              <a:t>17/07/2015</a:t>
             </a:fld>
             <a:endParaRPr lang="es-MX"/>
           </a:p>
@@ -2023,7 +2406,7 @@
           <a:p>
             <a:fld id="{F4C741E7-0659-46B3-91BB-B8C3B98C4B5D}" type="datetimeFigureOut">
               <a:rPr lang="es-MX" smtClean="0"/>
-              <a:t>05/07/2015</a:t>
+              <a:t>17/07/2015</a:t>
             </a:fld>
             <a:endParaRPr lang="es-MX"/>
           </a:p>
@@ -2149,7 +2532,7 @@
           <a:p>
             <a:fld id="{F4C741E7-0659-46B3-91BB-B8C3B98C4B5D}" type="datetimeFigureOut">
               <a:rPr lang="es-MX" smtClean="0"/>
-              <a:t>05/07/2015</a:t>
+              <a:t>17/07/2015</a:t>
             </a:fld>
             <a:endParaRPr lang="es-MX"/>
           </a:p>
@@ -2244,7 +2627,7 @@
           <a:p>
             <a:fld id="{F4C741E7-0659-46B3-91BB-B8C3B98C4B5D}" type="datetimeFigureOut">
               <a:rPr lang="es-MX" smtClean="0"/>
-              <a:t>05/07/2015</a:t>
+              <a:t>17/07/2015</a:t>
             </a:fld>
             <a:endParaRPr lang="es-MX"/>
           </a:p>
@@ -2530,7 +2913,7 @@
           <a:p>
             <a:fld id="{F4C741E7-0659-46B3-91BB-B8C3B98C4B5D}" type="datetimeFigureOut">
               <a:rPr lang="es-MX" smtClean="0"/>
-              <a:t>05/07/2015</a:t>
+              <a:t>17/07/2015</a:t>
             </a:fld>
             <a:endParaRPr lang="es-MX"/>
           </a:p>
@@ -2792,7 +3175,7 @@
           <a:p>
             <a:fld id="{F4C741E7-0659-46B3-91BB-B8C3B98C4B5D}" type="datetimeFigureOut">
               <a:rPr lang="es-MX" smtClean="0"/>
-              <a:t>05/07/2015</a:t>
+              <a:t>17/07/2015</a:t>
             </a:fld>
             <a:endParaRPr lang="es-MX"/>
           </a:p>
@@ -2910,7 +3293,7 @@
           <a:p>
             <a:fld id="{F4C741E7-0659-46B3-91BB-B8C3B98C4B5D}" type="datetimeFigureOut">
               <a:rPr lang="es-MX" smtClean="0"/>
-              <a:t>05/07/2015</a:t>
+              <a:t>17/07/2015</a:t>
             </a:fld>
             <a:endParaRPr lang="es-MX"/>
           </a:p>
@@ -2994,111 +3377,144 @@
           </a:p>
         </p:txBody>
       </p:sp>
-      <p:sp>
-        <p:nvSpPr>
-          <p:cNvPr id="7" name="6 Marcador de título"/>
-          <p:cNvSpPr>
-            <a:spLocks noGrp="1"/>
-          </p:cNvSpPr>
-          <p:nvPr>
-            <p:ph type="title"/>
-          </p:nvPr>
-        </p:nvSpPr>
-        <p:spPr>
+      <p:pic>
+        <p:nvPicPr>
+          <p:cNvPr id="1026" name="Picture 2"/>
+          <p:cNvPicPr>
+            <a:picLocks noChangeAspect="1" noChangeArrowheads="1"/>
+          </p:cNvPicPr>
+          <p:nvPr userDrawn="1"/>
+        </p:nvPicPr>
+        <p:blipFill>
+          <a:blip r:embed="rId13">
+            <a:extLst>
+              <a:ext uri="{28A0092B-C50C-407E-A947-70E740481C1C}">
+                <a14:useLocalDpi xmlns:a14="http://schemas.microsoft.com/office/drawing/2010/main" val="0"/>
+              </a:ext>
+            </a:extLst>
+          </a:blip>
+          <a:srcRect/>
+          <a:stretch>
+            <a:fillRect/>
+          </a:stretch>
+        </p:blipFill>
+        <p:spPr bwMode="auto">
           <a:xfrm>
-            <a:off x="457200" y="274638"/>
-            <a:ext cx="8229600" cy="1143000"/>
+            <a:off x="107504" y="116633"/>
+            <a:ext cx="1368152" cy="476687"/>
           </a:xfrm>
           <a:prstGeom prst="rect">
             <a:avLst/>
           </a:prstGeom>
+          <a:noFill/>
+          <a:ln>
+            <a:noFill/>
+          </a:ln>
+          <a:effectLst/>
+          <a:extLst>
+            <a:ext uri="{909E8E84-426E-40DD-AFC4-6F175D3DCCD1}">
+              <a14:hiddenFill xmlns:a14="http://schemas.microsoft.com/office/drawing/2010/main">
+                <a:solidFill>
+                  <a:schemeClr val="accent1"/>
+                </a:solidFill>
+              </a14:hiddenFill>
+            </a:ext>
+            <a:ext uri="{91240B29-F687-4F45-9708-019B960494DF}">
+              <a14:hiddenLine xmlns:a14="http://schemas.microsoft.com/office/drawing/2010/main" w="9525">
+                <a:solidFill>
+                  <a:schemeClr val="tx1"/>
+                </a:solidFill>
+                <a:miter lim="800000"/>
+                <a:headEnd/>
+                <a:tailEnd/>
+              </a14:hiddenLine>
+            </a:ext>
+            <a:ext uri="{AF507438-7753-43E0-B8FC-AC1667EBCBE1}">
+              <a14:hiddenEffects xmlns:a14="http://schemas.microsoft.com/office/drawing/2010/main">
+                <a:effectLst>
+                  <a:outerShdw dist="35921" dir="2700000" algn="ctr" rotWithShape="0">
+                    <a:schemeClr val="bg2"/>
+                  </a:outerShdw>
+                </a:effectLst>
+              </a14:hiddenEffects>
+            </a:ext>
+          </a:extLst>
         </p:spPr>
-        <p:txBody>
-          <a:bodyPr vert="horz" lIns="91440" tIns="45720" rIns="91440" bIns="45720" rtlCol="0" anchor="ctr">
-            <a:normAutofit/>
-          </a:bodyPr>
-          <a:lstStyle/>
-          <a:p>
-            <a:r>
-              <a:rPr lang="es-ES" dirty="0" smtClean="0"/>
-              <a:t>Haga clic para modificar el estilo de título del patrón</a:t>
-            </a:r>
-            <a:endParaRPr lang="es-MX" dirty="0"/>
-          </a:p>
-        </p:txBody>
-      </p:sp>
-      <p:sp>
-        <p:nvSpPr>
-          <p:cNvPr id="8" name="7 Marcador de texto"/>
-          <p:cNvSpPr>
-            <a:spLocks noGrp="1"/>
-          </p:cNvSpPr>
-          <p:nvPr>
-            <p:ph type="body" idx="1"/>
-          </p:nvPr>
-        </p:nvSpPr>
-        <p:spPr>
+      </p:pic>
+      <p:pic>
+        <p:nvPicPr>
+          <p:cNvPr id="1027" name="Picture 3"/>
+          <p:cNvPicPr>
+            <a:picLocks noChangeAspect="1" noChangeArrowheads="1"/>
+          </p:cNvPicPr>
+          <p:nvPr userDrawn="1"/>
+        </p:nvPicPr>
+        <p:blipFill>
+          <a:blip r:embed="rId14">
+            <a:extLst>
+              <a:ext uri="{28A0092B-C50C-407E-A947-70E740481C1C}">
+                <a14:useLocalDpi xmlns:a14="http://schemas.microsoft.com/office/drawing/2010/main" val="0"/>
+              </a:ext>
+            </a:extLst>
+          </a:blip>
+          <a:srcRect/>
+          <a:stretch>
+            <a:fillRect/>
+          </a:stretch>
+        </p:blipFill>
+        <p:spPr bwMode="auto">
           <a:xfrm>
-            <a:off x="457200" y="1600200"/>
-            <a:ext cx="8229600" cy="4525963"/>
+            <a:off x="0" y="631577"/>
+            <a:ext cx="9144000" cy="205135"/>
           </a:xfrm>
           <a:prstGeom prst="rect">
             <a:avLst/>
           </a:prstGeom>
+          <a:noFill/>
+          <a:ln>
+            <a:noFill/>
+          </a:ln>
+          <a:effectLst/>
+          <a:extLst>
+            <a:ext uri="{909E8E84-426E-40DD-AFC4-6F175D3DCCD1}">
+              <a14:hiddenFill xmlns:a14="http://schemas.microsoft.com/office/drawing/2010/main">
+                <a:solidFill>
+                  <a:schemeClr val="accent1"/>
+                </a:solidFill>
+              </a14:hiddenFill>
+            </a:ext>
+            <a:ext uri="{91240B29-F687-4F45-9708-019B960494DF}">
+              <a14:hiddenLine xmlns:a14="http://schemas.microsoft.com/office/drawing/2010/main" w="9525">
+                <a:solidFill>
+                  <a:schemeClr val="tx1"/>
+                </a:solidFill>
+                <a:miter lim="800000"/>
+                <a:headEnd/>
+                <a:tailEnd/>
+              </a14:hiddenLine>
+            </a:ext>
+            <a:ext uri="{AF507438-7753-43E0-B8FC-AC1667EBCBE1}">
+              <a14:hiddenEffects xmlns:a14="http://schemas.microsoft.com/office/drawing/2010/main">
+                <a:effectLst>
+                  <a:outerShdw dist="35921" dir="2700000" algn="ctr" rotWithShape="0">
+                    <a:schemeClr val="bg2"/>
+                  </a:outerShdw>
+                </a:effectLst>
+              </a14:hiddenEffects>
+            </a:ext>
+          </a:extLst>
         </p:spPr>
-        <p:txBody>
-          <a:bodyPr vert="horz" lIns="91440" tIns="45720" rIns="91440" bIns="45720" rtlCol="0">
-            <a:normAutofit/>
-          </a:bodyPr>
-          <a:lstStyle/>
-          <a:p>
-            <a:pPr lvl="0"/>
-            <a:r>
-              <a:rPr lang="es-ES" smtClean="0"/>
-              <a:t>Haga clic para modificar el estilo de texto del patrón</a:t>
-            </a:r>
-          </a:p>
-          <a:p>
-            <a:pPr lvl="1"/>
-            <a:r>
-              <a:rPr lang="es-ES" smtClean="0"/>
-              <a:t>Segundo nivel</a:t>
-            </a:r>
-          </a:p>
-          <a:p>
-            <a:pPr lvl="2"/>
-            <a:r>
-              <a:rPr lang="es-ES" smtClean="0"/>
-              <a:t>Tercer nivel</a:t>
-            </a:r>
-          </a:p>
-          <a:p>
-            <a:pPr lvl="3"/>
-            <a:r>
-              <a:rPr lang="es-ES" smtClean="0"/>
-              <a:t>Cuarto nivel</a:t>
-            </a:r>
-          </a:p>
-          <a:p>
-            <a:pPr lvl="4"/>
-            <a:r>
-              <a:rPr lang="es-ES" smtClean="0"/>
-              <a:t>Quinto nivel</a:t>
-            </a:r>
-            <a:endParaRPr lang="es-MX"/>
-          </a:p>
-        </p:txBody>
-      </p:sp>
+      </p:pic>
       <p:pic>
         <p:nvPicPr>
-          <p:cNvPr id="9" name="8 Imagen"/>
+          <p:cNvPr id="12" name="11 Imagen"/>
           <p:cNvPicPr>
             <a:picLocks noChangeAspect="1"/>
           </p:cNvPicPr>
           <p:nvPr userDrawn="1"/>
         </p:nvPicPr>
         <p:blipFill>
-          <a:blip r:embed="rId13">
+          <a:blip r:embed="rId15">
             <a:extLst>
               <a:ext uri="{28A0092B-C50C-407E-A947-70E740481C1C}">
                 <a14:useLocalDpi xmlns:a14="http://schemas.microsoft.com/office/drawing/2010/main" val="0"/>
@@ -3111,17 +3527,12 @@
         </p:blipFill>
         <p:spPr>
           <a:xfrm>
-            <a:off x="467544" y="260648"/>
-            <a:ext cx="8208912" cy="542544"/>
+            <a:off x="4356293" y="225619"/>
+            <a:ext cx="4608195" cy="323061"/>
           </a:xfrm>
           <a:prstGeom prst="rect">
             <a:avLst/>
           </a:prstGeom>
-          <a:ln>
-            <a:solidFill>
-              <a:schemeClr val="accent1"/>
-            </a:solidFill>
-          </a:ln>
         </p:spPr>
       </p:pic>
     </p:spTree>
@@ -3431,7 +3842,7 @@
           <p:nvPr>
             <p:extLst>
               <p:ext uri="{D42A27DB-BD31-4B8C-83A1-F6EECF244321}">
-                <p14:modId xmlns:p14="http://schemas.microsoft.com/office/powerpoint/2010/main" val="3358103156"/>
+                <p14:modId xmlns:p14="http://schemas.microsoft.com/office/powerpoint/2010/main" val="931468680"/>
               </p:ext>
             </p:extLst>
           </p:nvPr>
@@ -3444,7 +3855,7 @@
           <a:graphicData uri="http://schemas.openxmlformats.org/drawingml/2006/table">
             <a:tbl>
               <a:tblPr firstRow="1" bandRow="1">
-                <a:tableStyleId>{5C22544A-7EE6-4342-B048-85BDC9FD1C3A}</a:tableStyleId>
+                <a:tableStyleId>{1FECB4D8-DB02-4DC6-A0A2-4F2EBAE1DC90}</a:tableStyleId>
               </a:tblPr>
               <a:tblGrid>
                 <a:gridCol w="1187768"/>
@@ -3473,15 +3884,44 @@
                         <a:tabLst/>
                         <a:defRPr/>
                       </a:pPr>
-                      <a:r>
-                        <a:rPr lang="es-MX" sz="2000" b="1" dirty="0" smtClean="0">
-                          <a:latin typeface="Arial Narrow" panose="020B0606020202030204" pitchFamily="34" charset="0"/>
-                        </a:rPr>
-                        <a:t>Datos Generales</a:t>
-                      </a:r>
-                    </a:p>
-                  </a:txBody>
-                  <a:tcPr/>
+                      <a:endParaRPr lang="es-MX" sz="1800" b="1" dirty="0" smtClean="0">
+                        <a:solidFill>
+                          <a:schemeClr val="tx1"/>
+                        </a:solidFill>
+                        <a:latin typeface="Soberana Titular" pitchFamily="50" charset="0"/>
+                      </a:endParaRPr>
+                    </a:p>
+                  </a:txBody>
+                  <a:tcPr>
+                    <a:lnL w="28575" cap="flat" cmpd="sng" algn="ctr">
+                      <a:solidFill>
+                        <a:srgbClr val="006600"/>
+                      </a:solidFill>
+                      <a:prstDash val="solid"/>
+                      <a:round/>
+                      <a:headEnd type="none" w="med" len="med"/>
+                      <a:tailEnd type="none" w="med" len="med"/>
+                    </a:lnL>
+                    <a:lnR w="28575" cap="flat" cmpd="sng" algn="ctr">
+                      <a:solidFill>
+                        <a:srgbClr val="006600"/>
+                      </a:solidFill>
+                      <a:prstDash val="solid"/>
+                      <a:round/>
+                      <a:headEnd type="none" w="med" len="med"/>
+                      <a:tailEnd type="none" w="med" len="med"/>
+                    </a:lnR>
+                    <a:lnT w="28575" cap="flat" cmpd="sng" algn="ctr">
+                      <a:solidFill>
+                        <a:srgbClr val="006600"/>
+                      </a:solidFill>
+                      <a:prstDash val="solid"/>
+                      <a:round/>
+                      <a:headEnd type="none" w="med" len="med"/>
+                      <a:tailEnd type="none" w="med" len="med"/>
+                    </a:lnT>
+                    <a:noFill/>
+                  </a:tcPr>
                 </a:tc>
                 <a:tc hMerge="1">
                   <a:txBody>
@@ -3502,10 +3942,11 @@
                     <a:bodyPr/>
                     <a:lstStyle/>
                     <a:p>
+                      <a:endParaRPr lang="es-MX" sz="800" dirty="0" smtClean="0"/>
+                    </a:p>
+                    <a:p>
                       <a:r>
-                        <a:rPr lang="es-MX" sz="800" b="1" dirty="0" smtClean="0">
-                          <a:latin typeface="Arial Narrow" panose="020B0606020202030204" pitchFamily="34" charset="0"/>
-                        </a:rPr>
+                        <a:rPr lang="es-MX" sz="800" dirty="0" smtClean="0"/>
                         <a:t>Identificador de la obra</a:t>
                       </a:r>
                       <a:endParaRPr lang="es-MX" sz="800" b="1" dirty="0">
@@ -3513,7 +3954,18 @@
                       </a:endParaRPr>
                     </a:p>
                   </a:txBody>
-                  <a:tcPr/>
+                  <a:tcPr>
+                    <a:lnL w="28575" cap="flat" cmpd="sng" algn="ctr">
+                      <a:solidFill>
+                        <a:srgbClr val="006600"/>
+                      </a:solidFill>
+                      <a:prstDash val="solid"/>
+                      <a:round/>
+                      <a:headEnd type="none" w="med" len="med"/>
+                      <a:tailEnd type="none" w="med" len="med"/>
+                    </a:lnL>
+                    <a:noFill/>
+                  </a:tcPr>
                 </a:tc>
                 <a:tc>
                   <a:txBody>
@@ -3525,7 +3977,18 @@
                       </a:endParaRPr>
                     </a:p>
                   </a:txBody>
-                  <a:tcPr/>
+                  <a:tcPr>
+                    <a:lnR w="28575" cap="flat" cmpd="sng" algn="ctr">
+                      <a:solidFill>
+                        <a:srgbClr val="006600"/>
+                      </a:solidFill>
+                      <a:prstDash val="solid"/>
+                      <a:round/>
+                      <a:headEnd type="none" w="med" len="med"/>
+                      <a:tailEnd type="none" w="med" len="med"/>
+                    </a:lnR>
+                    <a:noFill/>
+                  </a:tcPr>
                 </a:tc>
               </a:tr>
               <a:tr h="415027">
@@ -3535,9 +3998,7 @@
                     <a:lstStyle/>
                     <a:p>
                       <a:r>
-                        <a:rPr lang="es-MX" sz="800" b="1" dirty="0" smtClean="0">
-                          <a:latin typeface="Arial Narrow" panose="020B0606020202030204" pitchFamily="34" charset="0"/>
-                        </a:rPr>
+                        <a:rPr lang="es-MX" sz="800" dirty="0" smtClean="0"/>
                         <a:t>Denominación</a:t>
                       </a:r>
                       <a:endParaRPr lang="es-MX" sz="800" b="1" dirty="0">
@@ -3545,7 +4006,18 @@
                       </a:endParaRPr>
                     </a:p>
                   </a:txBody>
-                  <a:tcPr/>
+                  <a:tcPr>
+                    <a:lnL w="28575" cap="flat" cmpd="sng" algn="ctr">
+                      <a:solidFill>
+                        <a:srgbClr val="006600"/>
+                      </a:solidFill>
+                      <a:prstDash val="solid"/>
+                      <a:round/>
+                      <a:headEnd type="none" w="med" len="med"/>
+                      <a:tailEnd type="none" w="med" len="med"/>
+                    </a:lnL>
+                    <a:noFill/>
+                  </a:tcPr>
                 </a:tc>
                 <a:tc>
                   <a:txBody>
@@ -3557,7 +4029,18 @@
                       </a:endParaRPr>
                     </a:p>
                   </a:txBody>
-                  <a:tcPr/>
+                  <a:tcPr>
+                    <a:lnR w="28575" cap="flat" cmpd="sng" algn="ctr">
+                      <a:solidFill>
+                        <a:srgbClr val="006600"/>
+                      </a:solidFill>
+                      <a:prstDash val="solid"/>
+                      <a:round/>
+                      <a:headEnd type="none" w="med" len="med"/>
+                      <a:tailEnd type="none" w="med" len="med"/>
+                    </a:lnR>
+                    <a:noFill/>
+                  </a:tcPr>
                 </a:tc>
               </a:tr>
               <a:tr h="458243">
@@ -3567,17 +4050,26 @@
                     <a:lstStyle/>
                     <a:p>
                       <a:r>
-                        <a:rPr lang="es-MX" sz="800" b="1" dirty="0" smtClean="0">
-                          <a:latin typeface="Arial Narrow" panose="020B0606020202030204" pitchFamily="34" charset="0"/>
-                        </a:rPr>
-                        <a:t>Dependencia/Organismo</a:t>
+                        <a:rPr lang="es-MX" sz="800" dirty="0" smtClean="0"/>
+                        <a:t>Dependencia / Organismo</a:t>
                       </a:r>
                       <a:endParaRPr lang="es-MX" sz="800" b="1" dirty="0">
                         <a:latin typeface="Arial Narrow" panose="020B0606020202030204" pitchFamily="34" charset="0"/>
                       </a:endParaRPr>
                     </a:p>
                   </a:txBody>
-                  <a:tcPr/>
+                  <a:tcPr>
+                    <a:lnL w="28575" cap="flat" cmpd="sng" algn="ctr">
+                      <a:solidFill>
+                        <a:srgbClr val="006600"/>
+                      </a:solidFill>
+                      <a:prstDash val="solid"/>
+                      <a:round/>
+                      <a:headEnd type="none" w="med" len="med"/>
+                      <a:tailEnd type="none" w="med" len="med"/>
+                    </a:lnL>
+                    <a:noFill/>
+                  </a:tcPr>
                 </a:tc>
                 <a:tc>
                   <a:txBody>
@@ -3589,7 +4081,18 @@
                       </a:endParaRPr>
                     </a:p>
                   </a:txBody>
-                  <a:tcPr/>
+                  <a:tcPr>
+                    <a:lnR w="28575" cap="flat" cmpd="sng" algn="ctr">
+                      <a:solidFill>
+                        <a:srgbClr val="006600"/>
+                      </a:solidFill>
+                      <a:prstDash val="solid"/>
+                      <a:round/>
+                      <a:headEnd type="none" w="med" len="med"/>
+                      <a:tailEnd type="none" w="med" len="med"/>
+                    </a:lnR>
+                    <a:noFill/>
+                  </a:tcPr>
                 </a:tc>
               </a:tr>
               <a:tr h="415027">
@@ -3599,9 +4102,7 @@
                     <a:lstStyle/>
                     <a:p>
                       <a:r>
-                        <a:rPr lang="es-MX" sz="800" b="1" dirty="0" smtClean="0">
-                          <a:latin typeface="Arial Narrow" panose="020B0606020202030204" pitchFamily="34" charset="0"/>
-                        </a:rPr>
+                        <a:rPr lang="es-MX" sz="800" dirty="0" smtClean="0"/>
                         <a:t>Estado</a:t>
                       </a:r>
                       <a:endParaRPr lang="es-MX" sz="800" b="1" dirty="0">
@@ -3609,7 +4110,18 @@
                       </a:endParaRPr>
                     </a:p>
                   </a:txBody>
-                  <a:tcPr/>
+                  <a:tcPr>
+                    <a:lnL w="28575" cap="flat" cmpd="sng" algn="ctr">
+                      <a:solidFill>
+                        <a:srgbClr val="006600"/>
+                      </a:solidFill>
+                      <a:prstDash val="solid"/>
+                      <a:round/>
+                      <a:headEnd type="none" w="med" len="med"/>
+                      <a:tailEnd type="none" w="med" len="med"/>
+                    </a:lnL>
+                    <a:noFill/>
+                  </a:tcPr>
                 </a:tc>
                 <a:tc>
                   <a:txBody>
@@ -3621,7 +4133,18 @@
                       </a:endParaRPr>
                     </a:p>
                   </a:txBody>
-                  <a:tcPr/>
+                  <a:tcPr>
+                    <a:lnR w="28575" cap="flat" cmpd="sng" algn="ctr">
+                      <a:solidFill>
+                        <a:srgbClr val="006600"/>
+                      </a:solidFill>
+                      <a:prstDash val="solid"/>
+                      <a:round/>
+                      <a:headEnd type="none" w="med" len="med"/>
+                      <a:tailEnd type="none" w="med" len="med"/>
+                    </a:lnR>
+                    <a:noFill/>
+                  </a:tcPr>
                 </a:tc>
               </a:tr>
               <a:tr h="415027">
@@ -3631,9 +4154,7 @@
                     <a:lstStyle/>
                     <a:p>
                       <a:r>
-                        <a:rPr lang="es-MX" sz="800" b="1" dirty="0" smtClean="0">
-                          <a:latin typeface="Arial Narrow" panose="020B0606020202030204" pitchFamily="34" charset="0"/>
-                        </a:rPr>
+                        <a:rPr lang="es-MX" sz="800" dirty="0" smtClean="0"/>
                         <a:t>Municipio</a:t>
                       </a:r>
                       <a:endParaRPr lang="es-MX" sz="800" b="1" dirty="0">
@@ -3641,7 +4162,18 @@
                       </a:endParaRPr>
                     </a:p>
                   </a:txBody>
-                  <a:tcPr/>
+                  <a:tcPr>
+                    <a:lnL w="28575" cap="flat" cmpd="sng" algn="ctr">
+                      <a:solidFill>
+                        <a:srgbClr val="006600"/>
+                      </a:solidFill>
+                      <a:prstDash val="solid"/>
+                      <a:round/>
+                      <a:headEnd type="none" w="med" len="med"/>
+                      <a:tailEnd type="none" w="med" len="med"/>
+                    </a:lnL>
+                    <a:noFill/>
+                  </a:tcPr>
                 </a:tc>
                 <a:tc>
                   <a:txBody>
@@ -3653,7 +4185,18 @@
                       </a:endParaRPr>
                     </a:p>
                   </a:txBody>
-                  <a:tcPr/>
+                  <a:tcPr>
+                    <a:lnR w="28575" cap="flat" cmpd="sng" algn="ctr">
+                      <a:solidFill>
+                        <a:srgbClr val="006600"/>
+                      </a:solidFill>
+                      <a:prstDash val="solid"/>
+                      <a:round/>
+                      <a:headEnd type="none" w="med" len="med"/>
+                      <a:tailEnd type="none" w="med" len="med"/>
+                    </a:lnR>
+                    <a:noFill/>
+                  </a:tcPr>
                 </a:tc>
               </a:tr>
               <a:tr h="415027">
@@ -3663,15 +4206,11 @@
                     <a:lstStyle/>
                     <a:p>
                       <a:r>
-                        <a:rPr lang="es-MX" sz="800" b="1" dirty="0" smtClean="0">
-                          <a:latin typeface="Arial Narrow" panose="020B0606020202030204" pitchFamily="34" charset="0"/>
-                        </a:rPr>
+                        <a:rPr lang="es-MX" sz="800" dirty="0" smtClean="0"/>
                         <a:t>Fecha</a:t>
                       </a:r>
                       <a:r>
-                        <a:rPr lang="es-MX" sz="800" b="1" baseline="0" dirty="0" smtClean="0">
-                          <a:latin typeface="Arial Narrow" panose="020B0606020202030204" pitchFamily="34" charset="0"/>
-                        </a:rPr>
+                        <a:rPr lang="es-MX" sz="800" baseline="0" dirty="0" smtClean="0"/>
                         <a:t> de Inicio</a:t>
                       </a:r>
                       <a:endParaRPr lang="es-MX" sz="800" b="1" dirty="0">
@@ -3679,7 +4218,18 @@
                       </a:endParaRPr>
                     </a:p>
                   </a:txBody>
-                  <a:tcPr/>
+                  <a:tcPr>
+                    <a:lnL w="28575" cap="flat" cmpd="sng" algn="ctr">
+                      <a:solidFill>
+                        <a:srgbClr val="006600"/>
+                      </a:solidFill>
+                      <a:prstDash val="solid"/>
+                      <a:round/>
+                      <a:headEnd type="none" w="med" len="med"/>
+                      <a:tailEnd type="none" w="med" len="med"/>
+                    </a:lnL>
+                    <a:noFill/>
+                  </a:tcPr>
                 </a:tc>
                 <a:tc>
                   <a:txBody>
@@ -3691,7 +4241,18 @@
                       </a:endParaRPr>
                     </a:p>
                   </a:txBody>
-                  <a:tcPr/>
+                  <a:tcPr>
+                    <a:lnR w="28575" cap="flat" cmpd="sng" algn="ctr">
+                      <a:solidFill>
+                        <a:srgbClr val="006600"/>
+                      </a:solidFill>
+                      <a:prstDash val="solid"/>
+                      <a:round/>
+                      <a:headEnd type="none" w="med" len="med"/>
+                      <a:tailEnd type="none" w="med" len="med"/>
+                    </a:lnR>
+                    <a:noFill/>
+                  </a:tcPr>
                 </a:tc>
               </a:tr>
               <a:tr h="415027">
@@ -3701,9 +4262,7 @@
                     <a:lstStyle/>
                     <a:p>
                       <a:r>
-                        <a:rPr lang="es-MX" sz="800" b="1" dirty="0" smtClean="0">
-                          <a:latin typeface="Arial Narrow" panose="020B0606020202030204" pitchFamily="34" charset="0"/>
-                        </a:rPr>
+                        <a:rPr lang="es-MX" sz="800" dirty="0" smtClean="0"/>
                         <a:t>Fecha de Término</a:t>
                       </a:r>
                       <a:endParaRPr lang="es-MX" sz="800" b="1" dirty="0">
@@ -3711,7 +4270,18 @@
                       </a:endParaRPr>
                     </a:p>
                   </a:txBody>
-                  <a:tcPr/>
+                  <a:tcPr>
+                    <a:lnL w="28575" cap="flat" cmpd="sng" algn="ctr">
+                      <a:solidFill>
+                        <a:srgbClr val="006600"/>
+                      </a:solidFill>
+                      <a:prstDash val="solid"/>
+                      <a:round/>
+                      <a:headEnd type="none" w="med" len="med"/>
+                      <a:tailEnd type="none" w="med" len="med"/>
+                    </a:lnL>
+                    <a:noFill/>
+                  </a:tcPr>
                 </a:tc>
                 <a:tc>
                   <a:txBody>
@@ -3723,7 +4293,18 @@
                       </a:endParaRPr>
                     </a:p>
                   </a:txBody>
-                  <a:tcPr/>
+                  <a:tcPr>
+                    <a:lnR w="28575" cap="flat" cmpd="sng" algn="ctr">
+                      <a:solidFill>
+                        <a:srgbClr val="006600"/>
+                      </a:solidFill>
+                      <a:prstDash val="solid"/>
+                      <a:round/>
+                      <a:headEnd type="none" w="med" len="med"/>
+                      <a:tailEnd type="none" w="med" len="med"/>
+                    </a:lnR>
+                    <a:noFill/>
+                  </a:tcPr>
                 </a:tc>
               </a:tr>
               <a:tr h="415027">
@@ -3733,9 +4314,7 @@
                     <a:lstStyle/>
                     <a:p>
                       <a:r>
-                        <a:rPr lang="es-MX" sz="800" b="1" dirty="0" smtClean="0">
-                          <a:latin typeface="Arial Narrow" panose="020B0606020202030204" pitchFamily="34" charset="0"/>
-                        </a:rPr>
+                        <a:rPr lang="es-MX" sz="800" dirty="0" smtClean="0"/>
                         <a:t>Tipo de Obra</a:t>
                       </a:r>
                       <a:endParaRPr lang="es-MX" sz="800" b="1" dirty="0">
@@ -3743,7 +4322,18 @@
                       </a:endParaRPr>
                     </a:p>
                   </a:txBody>
-                  <a:tcPr/>
+                  <a:tcPr>
+                    <a:lnL w="28575" cap="flat" cmpd="sng" algn="ctr">
+                      <a:solidFill>
+                        <a:srgbClr val="006600"/>
+                      </a:solidFill>
+                      <a:prstDash val="solid"/>
+                      <a:round/>
+                      <a:headEnd type="none" w="med" len="med"/>
+                      <a:tailEnd type="none" w="med" len="med"/>
+                    </a:lnL>
+                    <a:noFill/>
+                  </a:tcPr>
                 </a:tc>
                 <a:tc>
                   <a:txBody>
@@ -3755,7 +4345,18 @@
                       </a:endParaRPr>
                     </a:p>
                   </a:txBody>
-                  <a:tcPr/>
+                  <a:tcPr>
+                    <a:lnR w="28575" cap="flat" cmpd="sng" algn="ctr">
+                      <a:solidFill>
+                        <a:srgbClr val="006600"/>
+                      </a:solidFill>
+                      <a:prstDash val="solid"/>
+                      <a:round/>
+                      <a:headEnd type="none" w="med" len="med"/>
+                      <a:tailEnd type="none" w="med" len="med"/>
+                    </a:lnR>
+                    <a:noFill/>
+                  </a:tcPr>
                 </a:tc>
               </a:tr>
               <a:tr h="415027">
@@ -3765,9 +4366,7 @@
                     <a:lstStyle/>
                     <a:p>
                       <a:r>
-                        <a:rPr lang="es-MX" sz="800" b="1" dirty="0" smtClean="0">
-                          <a:latin typeface="Arial Narrow" panose="020B0606020202030204" pitchFamily="34" charset="0"/>
-                        </a:rPr>
+                        <a:rPr lang="es-MX" sz="800" dirty="0" smtClean="0"/>
                         <a:t>Avance</a:t>
                       </a:r>
                       <a:endParaRPr lang="es-MX" sz="800" b="1" dirty="0">
@@ -3775,7 +4374,18 @@
                       </a:endParaRPr>
                     </a:p>
                   </a:txBody>
-                  <a:tcPr/>
+                  <a:tcPr>
+                    <a:lnL w="28575" cap="flat" cmpd="sng" algn="ctr">
+                      <a:solidFill>
+                        <a:srgbClr val="006600"/>
+                      </a:solidFill>
+                      <a:prstDash val="solid"/>
+                      <a:round/>
+                      <a:headEnd type="none" w="med" len="med"/>
+                      <a:tailEnd type="none" w="med" len="med"/>
+                    </a:lnL>
+                    <a:noFill/>
+                  </a:tcPr>
                 </a:tc>
                 <a:tc>
                   <a:txBody>
@@ -3787,7 +4397,18 @@
                       </a:endParaRPr>
                     </a:p>
                   </a:txBody>
-                  <a:tcPr/>
+                  <a:tcPr>
+                    <a:lnR w="28575" cap="flat" cmpd="sng" algn="ctr">
+                      <a:solidFill>
+                        <a:srgbClr val="006600"/>
+                      </a:solidFill>
+                      <a:prstDash val="solid"/>
+                      <a:round/>
+                      <a:headEnd type="none" w="med" len="med"/>
+                      <a:tailEnd type="none" w="med" len="med"/>
+                    </a:lnR>
+                    <a:noFill/>
+                  </a:tcPr>
                 </a:tc>
               </a:tr>
               <a:tr h="415027">
@@ -3797,9 +4418,7 @@
                     <a:lstStyle/>
                     <a:p>
                       <a:r>
-                        <a:rPr lang="es-MX" sz="800" b="1" dirty="0" smtClean="0">
-                          <a:latin typeface="Arial Narrow" panose="020B0606020202030204" pitchFamily="34" charset="0"/>
-                        </a:rPr>
+                        <a:rPr lang="es-MX" sz="800" dirty="0" smtClean="0"/>
                         <a:t>Fecha de Modificación</a:t>
                       </a:r>
                       <a:endParaRPr lang="es-MX" sz="800" b="1" dirty="0">
@@ -3807,7 +4426,27 @@
                       </a:endParaRPr>
                     </a:p>
                   </a:txBody>
-                  <a:tcPr/>
+                  <a:tcPr>
+                    <a:lnL w="28575" cap="flat" cmpd="sng" algn="ctr">
+                      <a:solidFill>
+                        <a:srgbClr val="006600"/>
+                      </a:solidFill>
+                      <a:prstDash val="solid"/>
+                      <a:round/>
+                      <a:headEnd type="none" w="med" len="med"/>
+                      <a:tailEnd type="none" w="med" len="med"/>
+                    </a:lnL>
+                    <a:lnB w="28575" cap="flat" cmpd="sng" algn="ctr">
+                      <a:solidFill>
+                        <a:srgbClr val="006600"/>
+                      </a:solidFill>
+                      <a:prstDash val="solid"/>
+                      <a:round/>
+                      <a:headEnd type="none" w="med" len="med"/>
+                      <a:tailEnd type="none" w="med" len="med"/>
+                    </a:lnB>
+                    <a:noFill/>
+                  </a:tcPr>
                 </a:tc>
                 <a:tc>
                   <a:txBody>
@@ -3819,7 +4458,27 @@
                       </a:endParaRPr>
                     </a:p>
                   </a:txBody>
-                  <a:tcPr/>
+                  <a:tcPr>
+                    <a:lnR w="28575" cap="flat" cmpd="sng" algn="ctr">
+                      <a:solidFill>
+                        <a:srgbClr val="006600"/>
+                      </a:solidFill>
+                      <a:prstDash val="solid"/>
+                      <a:round/>
+                      <a:headEnd type="none" w="med" len="med"/>
+                      <a:tailEnd type="none" w="med" len="med"/>
+                    </a:lnR>
+                    <a:lnB w="28575" cap="flat" cmpd="sng" algn="ctr">
+                      <a:solidFill>
+                        <a:srgbClr val="006600"/>
+                      </a:solidFill>
+                      <a:prstDash val="solid"/>
+                      <a:round/>
+                      <a:headEnd type="none" w="med" len="med"/>
+                      <a:tailEnd type="none" w="med" len="med"/>
+                    </a:lnB>
+                    <a:noFill/>
+                  </a:tcPr>
                 </a:tc>
               </a:tr>
             </a:tbl>
@@ -3835,14 +4494,14 @@
           <p:nvPr>
             <p:extLst>
               <p:ext uri="{D42A27DB-BD31-4B8C-83A1-F6EECF244321}">
-                <p14:modId xmlns:p14="http://schemas.microsoft.com/office/powerpoint/2010/main" val="344265390"/>
+                <p14:modId xmlns:p14="http://schemas.microsoft.com/office/powerpoint/2010/main" val="3238914376"/>
               </p:ext>
             </p:extLst>
           </p:nvPr>
         </p:nvGraphicFramePr>
         <p:xfrm>
           <a:off x="3059832" y="908720"/>
-          <a:ext cx="3312368" cy="1607553"/>
+          <a:ext cx="3312368" cy="1577073"/>
         </p:xfrm>
         <a:graphic>
           <a:graphicData uri="http://schemas.openxmlformats.org/drawingml/2006/table">
@@ -3868,18 +4527,44 @@
                     <a:lstStyle/>
                     <a:p>
                       <a:pPr algn="ctr"/>
-                      <a:r>
-                        <a:rPr lang="es-MX" sz="2000" dirty="0" smtClean="0">
-                          <a:latin typeface="Arial Narrow" panose="020B0606020202030204" pitchFamily="34" charset="0"/>
-                        </a:rPr>
-                        <a:t>Inversión</a:t>
-                      </a:r>
-                      <a:endParaRPr lang="es-MX" sz="2000" dirty="0">
-                        <a:latin typeface="Arial Narrow" panose="020B0606020202030204" pitchFamily="34" charset="0"/>
-                      </a:endParaRPr>
-                    </a:p>
-                  </a:txBody>
-                  <a:tcPr/>
+                      <a:endParaRPr lang="es-MX" sz="1800" dirty="0">
+                        <a:solidFill>
+                          <a:schemeClr val="tx1"/>
+                        </a:solidFill>
+                        <a:latin typeface="Soberana Titular" pitchFamily="50" charset="0"/>
+                      </a:endParaRPr>
+                    </a:p>
+                  </a:txBody>
+                  <a:tcPr>
+                    <a:lnL w="28575" cap="flat" cmpd="sng" algn="ctr">
+                      <a:solidFill>
+                        <a:srgbClr val="006600"/>
+                      </a:solidFill>
+                      <a:prstDash val="solid"/>
+                      <a:round/>
+                      <a:headEnd type="none" w="med" len="med"/>
+                      <a:tailEnd type="none" w="med" len="med"/>
+                    </a:lnL>
+                    <a:lnR w="28575" cap="flat" cmpd="sng" algn="ctr">
+                      <a:solidFill>
+                        <a:srgbClr val="006600"/>
+                      </a:solidFill>
+                      <a:prstDash val="solid"/>
+                      <a:round/>
+                      <a:headEnd type="none" w="med" len="med"/>
+                      <a:tailEnd type="none" w="med" len="med"/>
+                    </a:lnR>
+                    <a:lnT w="28575" cap="flat" cmpd="sng" algn="ctr">
+                      <a:solidFill>
+                        <a:srgbClr val="006600"/>
+                      </a:solidFill>
+                      <a:prstDash val="solid"/>
+                      <a:round/>
+                      <a:headEnd type="none" w="med" len="med"/>
+                      <a:tailEnd type="none" w="med" len="med"/>
+                    </a:lnT>
+                    <a:noFill/>
+                  </a:tcPr>
                 </a:tc>
                 <a:tc hMerge="1">
                   <a:txBody>
@@ -3979,7 +4664,18 @@
                       </a:endParaRPr>
                     </a:p>
                   </a:txBody>
-                  <a:tcPr/>
+                  <a:tcPr>
+                    <a:lnL w="28575" cap="flat" cmpd="sng" algn="ctr">
+                      <a:solidFill>
+                        <a:srgbClr val="006600"/>
+                      </a:solidFill>
+                      <a:prstDash val="solid"/>
+                      <a:round/>
+                      <a:headEnd type="none" w="med" len="med"/>
+                      <a:tailEnd type="none" w="med" len="med"/>
+                    </a:lnL>
+                    <a:noFill/>
+                  </a:tcPr>
                 </a:tc>
                 <a:tc>
                   <a:txBody>
@@ -3997,7 +4693,9 @@
                       </a:endParaRPr>
                     </a:p>
                   </a:txBody>
-                  <a:tcPr/>
+                  <a:tcPr>
+                    <a:noFill/>
+                  </a:tcPr>
                 </a:tc>
                 <a:tc>
                   <a:txBody>
@@ -4015,7 +4713,9 @@
                       </a:endParaRPr>
                     </a:p>
                   </a:txBody>
-                  <a:tcPr/>
+                  <a:tcPr>
+                    <a:noFill/>
+                  </a:tcPr>
                 </a:tc>
                 <a:tc>
                   <a:txBody>
@@ -4027,7 +4727,9 @@
                       </a:endParaRPr>
                     </a:p>
                   </a:txBody>
-                  <a:tcPr/>
+                  <a:tcPr>
+                    <a:noFill/>
+                  </a:tcPr>
                 </a:tc>
                 <a:tc gridSpan="2">
                   <a:txBody>
@@ -4045,7 +4747,9 @@
                       </a:endParaRPr>
                     </a:p>
                   </a:txBody>
-                  <a:tcPr/>
+                  <a:tcPr>
+                    <a:noFill/>
+                  </a:tcPr>
                 </a:tc>
                 <a:tc hMerge="1">
                   <a:txBody>
@@ -4067,7 +4771,9 @@
                       </a:endParaRPr>
                     </a:p>
                   </a:txBody>
-                  <a:tcPr/>
+                  <a:tcPr>
+                    <a:noFill/>
+                  </a:tcPr>
                 </a:tc>
                 <a:tc>
                   <a:txBody>
@@ -4085,7 +4791,9 @@
                       </a:endParaRPr>
                     </a:p>
                   </a:txBody>
-                  <a:tcPr/>
+                  <a:tcPr>
+                    <a:noFill/>
+                  </a:tcPr>
                 </a:tc>
                 <a:tc>
                   <a:txBody>
@@ -4097,7 +4805,18 @@
                       </a:endParaRPr>
                     </a:p>
                   </a:txBody>
-                  <a:tcPr/>
+                  <a:tcPr>
+                    <a:lnR w="28575" cap="flat" cmpd="sng" algn="ctr">
+                      <a:solidFill>
+                        <a:srgbClr val="006600"/>
+                      </a:solidFill>
+                      <a:prstDash val="solid"/>
+                      <a:round/>
+                      <a:headEnd type="none" w="med" len="med"/>
+                      <a:tailEnd type="none" w="med" len="med"/>
+                    </a:lnR>
+                    <a:noFill/>
+                  </a:tcPr>
                 </a:tc>
               </a:tr>
               <a:tr h="403771">
@@ -4117,7 +4836,18 @@
                       </a:endParaRPr>
                     </a:p>
                   </a:txBody>
-                  <a:tcPr/>
+                  <a:tcPr>
+                    <a:lnL w="28575" cap="flat" cmpd="sng" algn="ctr">
+                      <a:solidFill>
+                        <a:srgbClr val="006600"/>
+                      </a:solidFill>
+                      <a:prstDash val="solid"/>
+                      <a:round/>
+                      <a:headEnd type="none" w="med" len="med"/>
+                      <a:tailEnd type="none" w="med" len="med"/>
+                    </a:lnL>
+                    <a:noFill/>
+                  </a:tcPr>
                 </a:tc>
                 <a:tc>
                   <a:txBody>
@@ -4129,7 +4859,9 @@
                       </a:endParaRPr>
                     </a:p>
                   </a:txBody>
-                  <a:tcPr/>
+                  <a:tcPr>
+                    <a:noFill/>
+                  </a:tcPr>
                 </a:tc>
                 <a:tc>
                   <a:txBody>
@@ -4147,7 +4879,9 @@
                       </a:endParaRPr>
                     </a:p>
                   </a:txBody>
-                  <a:tcPr/>
+                  <a:tcPr>
+                    <a:noFill/>
+                  </a:tcPr>
                 </a:tc>
                 <a:tc>
                   <a:txBody>
@@ -4159,7 +4893,9 @@
                       </a:endParaRPr>
                     </a:p>
                   </a:txBody>
-                  <a:tcPr/>
+                  <a:tcPr>
+                    <a:noFill/>
+                  </a:tcPr>
                 </a:tc>
                 <a:tc gridSpan="5">
                   <a:txBody>
@@ -4171,7 +4907,18 @@
                       </a:endParaRPr>
                     </a:p>
                   </a:txBody>
-                  <a:tcPr/>
+                  <a:tcPr>
+                    <a:lnR w="28575" cap="flat" cmpd="sng" algn="ctr">
+                      <a:solidFill>
+                        <a:srgbClr val="006600"/>
+                      </a:solidFill>
+                      <a:prstDash val="solid"/>
+                      <a:round/>
+                      <a:headEnd type="none" w="med" len="med"/>
+                      <a:tailEnd type="none" w="med" len="med"/>
+                    </a:lnR>
+                    <a:noFill/>
+                  </a:tcPr>
                 </a:tc>
                 <a:tc hMerge="1">
                   <a:txBody>
@@ -4243,7 +4990,27 @@
                       </a:endParaRPr>
                     </a:p>
                   </a:txBody>
-                  <a:tcPr/>
+                  <a:tcPr>
+                    <a:lnL w="28575" cap="flat" cmpd="sng" algn="ctr">
+                      <a:solidFill>
+                        <a:srgbClr val="006600"/>
+                      </a:solidFill>
+                      <a:prstDash val="solid"/>
+                      <a:round/>
+                      <a:headEnd type="none" w="med" len="med"/>
+                      <a:tailEnd type="none" w="med" len="med"/>
+                    </a:lnL>
+                    <a:lnB w="28575" cap="flat" cmpd="sng" algn="ctr">
+                      <a:solidFill>
+                        <a:srgbClr val="006600"/>
+                      </a:solidFill>
+                      <a:prstDash val="solid"/>
+                      <a:round/>
+                      <a:headEnd type="none" w="med" len="med"/>
+                      <a:tailEnd type="none" w="med" len="med"/>
+                    </a:lnB>
+                    <a:noFill/>
+                  </a:tcPr>
                 </a:tc>
                 <a:tc hMerge="1">
                   <a:txBody>
@@ -4267,7 +5034,18 @@
                       </a:endParaRPr>
                     </a:p>
                   </a:txBody>
-                  <a:tcPr/>
+                  <a:tcPr>
+                    <a:lnB w="28575" cap="flat" cmpd="sng" algn="ctr">
+                      <a:solidFill>
+                        <a:srgbClr val="006600"/>
+                      </a:solidFill>
+                      <a:prstDash val="solid"/>
+                      <a:round/>
+                      <a:headEnd type="none" w="med" len="med"/>
+                      <a:tailEnd type="none" w="med" len="med"/>
+                    </a:lnB>
+                    <a:noFill/>
+                  </a:tcPr>
                 </a:tc>
                 <a:tc hMerge="1">
                   <a:txBody>
@@ -4303,7 +5081,27 @@
                       </a:endParaRPr>
                     </a:p>
                   </a:txBody>
-                  <a:tcPr/>
+                  <a:tcPr>
+                    <a:lnR w="28575" cap="flat" cmpd="sng" algn="ctr">
+                      <a:solidFill>
+                        <a:srgbClr val="006600"/>
+                      </a:solidFill>
+                      <a:prstDash val="solid"/>
+                      <a:round/>
+                      <a:headEnd type="none" w="med" len="med"/>
+                      <a:tailEnd type="none" w="med" len="med"/>
+                    </a:lnR>
+                    <a:lnB w="28575" cap="flat" cmpd="sng" algn="ctr">
+                      <a:solidFill>
+                        <a:srgbClr val="006600"/>
+                      </a:solidFill>
+                      <a:prstDash val="solid"/>
+                      <a:round/>
+                      <a:headEnd type="none" w="med" len="med"/>
+                      <a:tailEnd type="none" w="med" len="med"/>
+                    </a:lnB>
+                    <a:noFill/>
+                  </a:tcPr>
                 </a:tc>
                 <a:tc hMerge="1">
                   <a:txBody>
@@ -4349,14 +5147,14 @@
           <p:nvPr>
             <p:extLst>
               <p:ext uri="{D42A27DB-BD31-4B8C-83A1-F6EECF244321}">
-                <p14:modId xmlns:p14="http://schemas.microsoft.com/office/powerpoint/2010/main" val="3883310017"/>
+                <p14:modId xmlns:p14="http://schemas.microsoft.com/office/powerpoint/2010/main" val="3039941161"/>
               </p:ext>
             </p:extLst>
           </p:nvPr>
         </p:nvGraphicFramePr>
         <p:xfrm>
           <a:off x="3059832" y="2564904"/>
-          <a:ext cx="3312368" cy="1281837"/>
+          <a:ext cx="3312368" cy="1251357"/>
         </p:xfrm>
         <a:graphic>
           <a:graphicData uri="http://schemas.openxmlformats.org/drawingml/2006/table">
@@ -4375,18 +5173,44 @@
                     <a:lstStyle/>
                     <a:p>
                       <a:pPr algn="ctr"/>
-                      <a:r>
-                        <a:rPr lang="es-MX" sz="2000" dirty="0" smtClean="0">
-                          <a:latin typeface="Arial Narrow" panose="020B0606020202030204" pitchFamily="34" charset="0"/>
-                        </a:rPr>
-                        <a:t>Población</a:t>
-                      </a:r>
-                      <a:endParaRPr lang="es-MX" sz="2000" dirty="0">
-                        <a:latin typeface="Arial Narrow" panose="020B0606020202030204" pitchFamily="34" charset="0"/>
-                      </a:endParaRPr>
-                    </a:p>
-                  </a:txBody>
-                  <a:tcPr/>
+                      <a:endParaRPr lang="es-MX" sz="1800" dirty="0">
+                        <a:solidFill>
+                          <a:schemeClr val="tx1"/>
+                        </a:solidFill>
+                        <a:latin typeface="Soberana Titular" pitchFamily="50" charset="0"/>
+                      </a:endParaRPr>
+                    </a:p>
+                  </a:txBody>
+                  <a:tcPr>
+                    <a:lnL w="28575" cap="flat" cmpd="sng" algn="ctr">
+                      <a:solidFill>
+                        <a:srgbClr val="006600"/>
+                      </a:solidFill>
+                      <a:prstDash val="solid"/>
+                      <a:round/>
+                      <a:headEnd type="none" w="med" len="med"/>
+                      <a:tailEnd type="none" w="med" len="med"/>
+                    </a:lnL>
+                    <a:lnR w="28575" cap="flat" cmpd="sng" algn="ctr">
+                      <a:solidFill>
+                        <a:srgbClr val="006600"/>
+                      </a:solidFill>
+                      <a:prstDash val="solid"/>
+                      <a:round/>
+                      <a:headEnd type="none" w="med" len="med"/>
+                      <a:tailEnd type="none" w="med" len="med"/>
+                    </a:lnR>
+                    <a:lnT w="28575" cap="flat" cmpd="sng" algn="ctr">
+                      <a:solidFill>
+                        <a:srgbClr val="006600"/>
+                      </a:solidFill>
+                      <a:prstDash val="solid"/>
+                      <a:round/>
+                      <a:headEnd type="none" w="med" len="med"/>
+                      <a:tailEnd type="none" w="med" len="med"/>
+                    </a:lnT>
+                    <a:noFill/>
+                  </a:tcPr>
                 </a:tc>
                 <a:tc hMerge="1">
                   <a:txBody>
@@ -4416,7 +5240,18 @@
                       </a:endParaRPr>
                     </a:p>
                   </a:txBody>
-                  <a:tcPr/>
+                  <a:tcPr>
+                    <a:lnL w="28575" cap="flat" cmpd="sng" algn="ctr">
+                      <a:solidFill>
+                        <a:srgbClr val="006600"/>
+                      </a:solidFill>
+                      <a:prstDash val="solid"/>
+                      <a:round/>
+                      <a:headEnd type="none" w="med" len="med"/>
+                      <a:tailEnd type="none" w="med" len="med"/>
+                    </a:lnL>
+                    <a:noFill/>
+                  </a:tcPr>
                 </a:tc>
                 <a:tc>
                   <a:txBody>
@@ -4428,7 +5263,18 @@
                       </a:endParaRPr>
                     </a:p>
                   </a:txBody>
-                  <a:tcPr/>
+                  <a:tcPr>
+                    <a:lnR w="28575" cap="flat" cmpd="sng" algn="ctr">
+                      <a:solidFill>
+                        <a:srgbClr val="006600"/>
+                      </a:solidFill>
+                      <a:prstDash val="solid"/>
+                      <a:round/>
+                      <a:headEnd type="none" w="med" len="med"/>
+                      <a:tailEnd type="none" w="med" len="med"/>
+                    </a:lnR>
+                    <a:noFill/>
+                  </a:tcPr>
                 </a:tc>
               </a:tr>
               <a:tr h="295199">
@@ -4448,7 +5294,18 @@
                       </a:endParaRPr>
                     </a:p>
                   </a:txBody>
-                  <a:tcPr/>
+                  <a:tcPr>
+                    <a:lnL w="28575" cap="flat" cmpd="sng" algn="ctr">
+                      <a:solidFill>
+                        <a:srgbClr val="006600"/>
+                      </a:solidFill>
+                      <a:prstDash val="solid"/>
+                      <a:round/>
+                      <a:headEnd type="none" w="med" len="med"/>
+                      <a:tailEnd type="none" w="med" len="med"/>
+                    </a:lnL>
+                    <a:noFill/>
+                  </a:tcPr>
                 </a:tc>
                 <a:tc>
                   <a:txBody>
@@ -4460,7 +5317,18 @@
                       </a:endParaRPr>
                     </a:p>
                   </a:txBody>
-                  <a:tcPr/>
+                  <a:tcPr>
+                    <a:lnR w="28575" cap="flat" cmpd="sng" algn="ctr">
+                      <a:solidFill>
+                        <a:srgbClr val="006600"/>
+                      </a:solidFill>
+                      <a:prstDash val="solid"/>
+                      <a:round/>
+                      <a:headEnd type="none" w="med" len="med"/>
+                      <a:tailEnd type="none" w="med" len="med"/>
+                    </a:lnR>
+                    <a:noFill/>
+                  </a:tcPr>
                 </a:tc>
               </a:tr>
               <a:tr h="295199">
@@ -4480,7 +5348,27 @@
                       </a:endParaRPr>
                     </a:p>
                   </a:txBody>
-                  <a:tcPr/>
+                  <a:tcPr>
+                    <a:lnL w="28575" cap="flat" cmpd="sng" algn="ctr">
+                      <a:solidFill>
+                        <a:srgbClr val="006600"/>
+                      </a:solidFill>
+                      <a:prstDash val="solid"/>
+                      <a:round/>
+                      <a:headEnd type="none" w="med" len="med"/>
+                      <a:tailEnd type="none" w="med" len="med"/>
+                    </a:lnL>
+                    <a:lnB w="28575" cap="flat" cmpd="sng" algn="ctr">
+                      <a:solidFill>
+                        <a:srgbClr val="006600"/>
+                      </a:solidFill>
+                      <a:prstDash val="solid"/>
+                      <a:round/>
+                      <a:headEnd type="none" w="med" len="med"/>
+                      <a:tailEnd type="none" w="med" len="med"/>
+                    </a:lnB>
+                    <a:noFill/>
+                  </a:tcPr>
                 </a:tc>
                 <a:tc>
                   <a:txBody>
@@ -4492,7 +5380,27 @@
                       </a:endParaRPr>
                     </a:p>
                   </a:txBody>
-                  <a:tcPr/>
+                  <a:tcPr>
+                    <a:lnR w="28575" cap="flat" cmpd="sng" algn="ctr">
+                      <a:solidFill>
+                        <a:srgbClr val="006600"/>
+                      </a:solidFill>
+                      <a:prstDash val="solid"/>
+                      <a:round/>
+                      <a:headEnd type="none" w="med" len="med"/>
+                      <a:tailEnd type="none" w="med" len="med"/>
+                    </a:lnR>
+                    <a:lnB w="28575" cap="flat" cmpd="sng" algn="ctr">
+                      <a:solidFill>
+                        <a:srgbClr val="006600"/>
+                      </a:solidFill>
+                      <a:prstDash val="solid"/>
+                      <a:round/>
+                      <a:headEnd type="none" w="med" len="med"/>
+                      <a:tailEnd type="none" w="med" len="med"/>
+                    </a:lnB>
+                    <a:noFill/>
+                  </a:tcPr>
                 </a:tc>
               </a:tr>
             </a:tbl>
@@ -4508,14 +5416,14 @@
           <p:nvPr>
             <p:extLst>
               <p:ext uri="{D42A27DB-BD31-4B8C-83A1-F6EECF244321}">
-                <p14:modId xmlns:p14="http://schemas.microsoft.com/office/powerpoint/2010/main" val="2167713635"/>
+                <p14:modId xmlns:p14="http://schemas.microsoft.com/office/powerpoint/2010/main" val="3319330837"/>
               </p:ext>
             </p:extLst>
           </p:nvPr>
         </p:nvGraphicFramePr>
         <p:xfrm>
           <a:off x="3059832" y="3933056"/>
-          <a:ext cx="3312368" cy="2664296"/>
+          <a:ext cx="3312368" cy="2633816"/>
         </p:xfrm>
         <a:graphic>
           <a:graphicData uri="http://schemas.openxmlformats.org/drawingml/2006/table">
@@ -4535,18 +5443,44 @@
                     <a:lstStyle/>
                     <a:p>
                       <a:pPr algn="ctr"/>
-                      <a:r>
-                        <a:rPr lang="es-MX" sz="2000" dirty="0" smtClean="0">
-                          <a:latin typeface="Arial Narrow" panose="020B0606020202030204" pitchFamily="34" charset="0"/>
-                        </a:rPr>
-                        <a:t>Clasificación</a:t>
-                      </a:r>
-                      <a:endParaRPr lang="es-MX" sz="2000" dirty="0">
-                        <a:latin typeface="Arial Narrow" panose="020B0606020202030204" pitchFamily="34" charset="0"/>
-                      </a:endParaRPr>
-                    </a:p>
-                  </a:txBody>
-                  <a:tcPr/>
+                      <a:endParaRPr lang="es-MX" sz="1800" dirty="0">
+                        <a:solidFill>
+                          <a:schemeClr val="tx1"/>
+                        </a:solidFill>
+                        <a:latin typeface="Soberana Titular" pitchFamily="50" charset="0"/>
+                      </a:endParaRPr>
+                    </a:p>
+                  </a:txBody>
+                  <a:tcPr>
+                    <a:lnL w="28575" cap="flat" cmpd="sng" algn="ctr">
+                      <a:solidFill>
+                        <a:srgbClr val="006600"/>
+                      </a:solidFill>
+                      <a:prstDash val="solid"/>
+                      <a:round/>
+                      <a:headEnd type="none" w="med" len="med"/>
+                      <a:tailEnd type="none" w="med" len="med"/>
+                    </a:lnL>
+                    <a:lnR w="28575" cap="flat" cmpd="sng" algn="ctr">
+                      <a:solidFill>
+                        <a:srgbClr val="006600"/>
+                      </a:solidFill>
+                      <a:prstDash val="solid"/>
+                      <a:round/>
+                      <a:headEnd type="none" w="med" len="med"/>
+                      <a:tailEnd type="none" w="med" len="med"/>
+                    </a:lnR>
+                    <a:lnT w="28575" cap="flat" cmpd="sng" algn="ctr">
+                      <a:solidFill>
+                        <a:srgbClr val="006600"/>
+                      </a:solidFill>
+                      <a:prstDash val="solid"/>
+                      <a:round/>
+                      <a:headEnd type="none" w="med" len="med"/>
+                      <a:tailEnd type="none" w="med" len="med"/>
+                    </a:lnT>
+                    <a:noFill/>
+                  </a:tcPr>
                 </a:tc>
                 <a:tc hMerge="1">
                   <a:txBody>
@@ -4580,7 +5514,18 @@
                       </a:endParaRPr>
                     </a:p>
                   </a:txBody>
-                  <a:tcPr/>
+                  <a:tcPr>
+                    <a:lnL w="28575" cap="flat" cmpd="sng" algn="ctr">
+                      <a:solidFill>
+                        <a:srgbClr val="006600"/>
+                      </a:solidFill>
+                      <a:prstDash val="solid"/>
+                      <a:round/>
+                      <a:headEnd type="none" w="med" len="med"/>
+                      <a:tailEnd type="none" w="med" len="med"/>
+                    </a:lnL>
+                    <a:noFill/>
+                  </a:tcPr>
                 </a:tc>
                 <a:tc>
                   <a:txBody>
@@ -4598,7 +5543,9 @@
                       </a:endParaRPr>
                     </a:p>
                   </a:txBody>
-                  <a:tcPr/>
+                  <a:tcPr>
+                    <a:noFill/>
+                  </a:tcPr>
                 </a:tc>
                 <a:tc>
                   <a:txBody>
@@ -4610,7 +5557,18 @@
                       </a:endParaRPr>
                     </a:p>
                   </a:txBody>
-                  <a:tcPr/>
+                  <a:tcPr>
+                    <a:lnR w="28575" cap="flat" cmpd="sng" algn="ctr">
+                      <a:solidFill>
+                        <a:srgbClr val="006600"/>
+                      </a:solidFill>
+                      <a:prstDash val="solid"/>
+                      <a:round/>
+                      <a:headEnd type="none" w="med" len="med"/>
+                      <a:tailEnd type="none" w="med" len="med"/>
+                    </a:lnR>
+                    <a:noFill/>
+                  </a:tcPr>
                 </a:tc>
               </a:tr>
               <a:tr h="370840">
@@ -4624,7 +5582,18 @@
                       </a:endParaRPr>
                     </a:p>
                   </a:txBody>
-                  <a:tcPr/>
+                  <a:tcPr>
+                    <a:lnL w="28575" cap="flat" cmpd="sng" algn="ctr">
+                      <a:solidFill>
+                        <a:srgbClr val="006600"/>
+                      </a:solidFill>
+                      <a:prstDash val="solid"/>
+                      <a:round/>
+                      <a:headEnd type="none" w="med" len="med"/>
+                      <a:tailEnd type="none" w="med" len="med"/>
+                    </a:lnL>
+                    <a:noFill/>
+                  </a:tcPr>
                 </a:tc>
                 <a:tc gridSpan="2">
                   <a:txBody>
@@ -4642,7 +5611,18 @@
                       </a:endParaRPr>
                     </a:p>
                   </a:txBody>
-                  <a:tcPr/>
+                  <a:tcPr>
+                    <a:lnR w="28575" cap="flat" cmpd="sng" algn="ctr">
+                      <a:solidFill>
+                        <a:srgbClr val="006600"/>
+                      </a:solidFill>
+                      <a:prstDash val="solid"/>
+                      <a:round/>
+                      <a:headEnd type="none" w="med" len="med"/>
+                      <a:tailEnd type="none" w="med" len="med"/>
+                    </a:lnR>
+                    <a:noFill/>
+                  </a:tcPr>
                 </a:tc>
                 <a:tc hMerge="1">
                   <a:txBody>
@@ -4668,7 +5648,18 @@
                       </a:endParaRPr>
                     </a:p>
                   </a:txBody>
-                  <a:tcPr/>
+                  <a:tcPr>
+                    <a:lnL w="28575" cap="flat" cmpd="sng" algn="ctr">
+                      <a:solidFill>
+                        <a:srgbClr val="006600"/>
+                      </a:solidFill>
+                      <a:prstDash val="solid"/>
+                      <a:round/>
+                      <a:headEnd type="none" w="med" len="med"/>
+                      <a:tailEnd type="none" w="med" len="med"/>
+                    </a:lnL>
+                    <a:noFill/>
+                  </a:tcPr>
                 </a:tc>
                 <a:tc gridSpan="2">
                   <a:txBody>
@@ -4686,7 +5677,18 @@
                       </a:endParaRPr>
                     </a:p>
                   </a:txBody>
-                  <a:tcPr/>
+                  <a:tcPr>
+                    <a:lnR w="28575" cap="flat" cmpd="sng" algn="ctr">
+                      <a:solidFill>
+                        <a:srgbClr val="006600"/>
+                      </a:solidFill>
+                      <a:prstDash val="solid"/>
+                      <a:round/>
+                      <a:headEnd type="none" w="med" len="med"/>
+                      <a:tailEnd type="none" w="med" len="med"/>
+                    </a:lnR>
+                    <a:noFill/>
+                  </a:tcPr>
                 </a:tc>
                 <a:tc hMerge="1">
                   <a:txBody>
@@ -4712,7 +5714,18 @@
                       </a:endParaRPr>
                     </a:p>
                   </a:txBody>
-                  <a:tcPr/>
+                  <a:tcPr>
+                    <a:lnL w="28575" cap="flat" cmpd="sng" algn="ctr">
+                      <a:solidFill>
+                        <a:srgbClr val="006600"/>
+                      </a:solidFill>
+                      <a:prstDash val="solid"/>
+                      <a:round/>
+                      <a:headEnd type="none" w="med" len="med"/>
+                      <a:tailEnd type="none" w="med" len="med"/>
+                    </a:lnL>
+                    <a:noFill/>
+                  </a:tcPr>
                 </a:tc>
                 <a:tc gridSpan="2">
                   <a:txBody>
@@ -4730,7 +5743,18 @@
                       </a:endParaRPr>
                     </a:p>
                   </a:txBody>
-                  <a:tcPr/>
+                  <a:tcPr>
+                    <a:lnR w="28575" cap="flat" cmpd="sng" algn="ctr">
+                      <a:solidFill>
+                        <a:srgbClr val="006600"/>
+                      </a:solidFill>
+                      <a:prstDash val="solid"/>
+                      <a:round/>
+                      <a:headEnd type="none" w="med" len="med"/>
+                      <a:tailEnd type="none" w="med" len="med"/>
+                    </a:lnR>
+                    <a:noFill/>
+                  </a:tcPr>
                 </a:tc>
                 <a:tc hMerge="1">
                   <a:txBody>
@@ -4756,7 +5780,18 @@
                       </a:endParaRPr>
                     </a:p>
                   </a:txBody>
-                  <a:tcPr/>
+                  <a:tcPr>
+                    <a:lnL w="28575" cap="flat" cmpd="sng" algn="ctr">
+                      <a:solidFill>
+                        <a:srgbClr val="006600"/>
+                      </a:solidFill>
+                      <a:prstDash val="solid"/>
+                      <a:round/>
+                      <a:headEnd type="none" w="med" len="med"/>
+                      <a:tailEnd type="none" w="med" len="med"/>
+                    </a:lnL>
+                    <a:noFill/>
+                  </a:tcPr>
                 </a:tc>
                 <a:tc gridSpan="2">
                   <a:txBody>
@@ -4774,7 +5809,18 @@
                       </a:endParaRPr>
                     </a:p>
                   </a:txBody>
-                  <a:tcPr/>
+                  <a:tcPr>
+                    <a:lnR w="28575" cap="flat" cmpd="sng" algn="ctr">
+                      <a:solidFill>
+                        <a:srgbClr val="006600"/>
+                      </a:solidFill>
+                      <a:prstDash val="solid"/>
+                      <a:round/>
+                      <a:headEnd type="none" w="med" len="med"/>
+                      <a:tailEnd type="none" w="med" len="med"/>
+                    </a:lnR>
+                    <a:noFill/>
+                  </a:tcPr>
                 </a:tc>
                 <a:tc hMerge="1">
                   <a:txBody>
@@ -4800,7 +5846,27 @@
                       </a:endParaRPr>
                     </a:p>
                   </a:txBody>
-                  <a:tcPr/>
+                  <a:tcPr>
+                    <a:lnL w="28575" cap="flat" cmpd="sng" algn="ctr">
+                      <a:solidFill>
+                        <a:srgbClr val="006600"/>
+                      </a:solidFill>
+                      <a:prstDash val="solid"/>
+                      <a:round/>
+                      <a:headEnd type="none" w="med" len="med"/>
+                      <a:tailEnd type="none" w="med" len="med"/>
+                    </a:lnL>
+                    <a:lnB w="28575" cap="flat" cmpd="sng" algn="ctr">
+                      <a:solidFill>
+                        <a:srgbClr val="006600"/>
+                      </a:solidFill>
+                      <a:prstDash val="solid"/>
+                      <a:round/>
+                      <a:headEnd type="none" w="med" len="med"/>
+                      <a:tailEnd type="none" w="med" len="med"/>
+                    </a:lnB>
+                    <a:noFill/>
+                  </a:tcPr>
                 </a:tc>
                 <a:tc gridSpan="2">
                   <a:txBody>
@@ -4818,7 +5884,27 @@
                       </a:endParaRPr>
                     </a:p>
                   </a:txBody>
-                  <a:tcPr/>
+                  <a:tcPr>
+                    <a:lnR w="28575" cap="flat" cmpd="sng" algn="ctr">
+                      <a:solidFill>
+                        <a:srgbClr val="006600"/>
+                      </a:solidFill>
+                      <a:prstDash val="solid"/>
+                      <a:round/>
+                      <a:headEnd type="none" w="med" len="med"/>
+                      <a:tailEnd type="none" w="med" len="med"/>
+                    </a:lnR>
+                    <a:lnB w="28575" cap="flat" cmpd="sng" algn="ctr">
+                      <a:solidFill>
+                        <a:srgbClr val="006600"/>
+                      </a:solidFill>
+                      <a:prstDash val="solid"/>
+                      <a:round/>
+                      <a:headEnd type="none" w="med" len="med"/>
+                      <a:tailEnd type="none" w="med" len="med"/>
+                    </a:lnB>
+                    <a:noFill/>
+                  </a:tcPr>
                 </a:tc>
                 <a:tc hMerge="1">
                   <a:txBody>
@@ -4846,14 +5932,14 @@
           <p:nvPr>
             <p:extLst>
               <p:ext uri="{D42A27DB-BD31-4B8C-83A1-F6EECF244321}">
-                <p14:modId xmlns:p14="http://schemas.microsoft.com/office/powerpoint/2010/main" val="1759558726"/>
+                <p14:modId xmlns:p14="http://schemas.microsoft.com/office/powerpoint/2010/main" val="3261177285"/>
               </p:ext>
             </p:extLst>
           </p:nvPr>
         </p:nvGraphicFramePr>
         <p:xfrm>
           <a:off x="6444208" y="908721"/>
-          <a:ext cx="2232248" cy="2688157"/>
+          <a:ext cx="2304256" cy="2671540"/>
         </p:xfrm>
         <a:graphic>
           <a:graphicData uri="http://schemas.openxmlformats.org/drawingml/2006/table">
@@ -4862,7 +5948,7 @@
                 <a:tableStyleId>{5C22544A-7EE6-4342-B048-85BDC9FD1C3A}</a:tableStyleId>
               </a:tblPr>
               <a:tblGrid>
-                <a:gridCol w="2232248"/>
+                <a:gridCol w="2304256"/>
               </a:tblGrid>
               <a:tr h="379623">
                 <a:tc>
@@ -4871,18 +5957,44 @@
                     <a:lstStyle/>
                     <a:p>
                       <a:pPr algn="ctr"/>
-                      <a:r>
-                        <a:rPr lang="es-MX" sz="2000" dirty="0" smtClean="0">
-                          <a:latin typeface="Arial Narrow" panose="020B0606020202030204" pitchFamily="34" charset="0"/>
-                        </a:rPr>
-                        <a:t>Descripción</a:t>
-                      </a:r>
-                      <a:endParaRPr lang="es-MX" sz="2000" dirty="0">
-                        <a:latin typeface="Arial Narrow" panose="020B0606020202030204" pitchFamily="34" charset="0"/>
-                      </a:endParaRPr>
-                    </a:p>
-                  </a:txBody>
-                  <a:tcPr/>
+                      <a:endParaRPr lang="es-MX" sz="1800" dirty="0">
+                        <a:solidFill>
+                          <a:schemeClr val="tx1"/>
+                        </a:solidFill>
+                        <a:latin typeface="Soberana Titular" pitchFamily="50" charset="0"/>
+                      </a:endParaRPr>
+                    </a:p>
+                  </a:txBody>
+                  <a:tcPr>
+                    <a:lnL w="28575" cap="flat" cmpd="sng" algn="ctr">
+                      <a:solidFill>
+                        <a:srgbClr val="006600"/>
+                      </a:solidFill>
+                      <a:prstDash val="solid"/>
+                      <a:round/>
+                      <a:headEnd type="none" w="med" len="med"/>
+                      <a:tailEnd type="none" w="med" len="med"/>
+                    </a:lnL>
+                    <a:lnR w="28575" cap="flat" cmpd="sng" algn="ctr">
+                      <a:solidFill>
+                        <a:srgbClr val="006600"/>
+                      </a:solidFill>
+                      <a:prstDash val="solid"/>
+                      <a:round/>
+                      <a:headEnd type="none" w="med" len="med"/>
+                      <a:tailEnd type="none" w="med" len="med"/>
+                    </a:lnR>
+                    <a:lnT w="28575" cap="flat" cmpd="sng" algn="ctr">
+                      <a:solidFill>
+                        <a:srgbClr val="006600"/>
+                      </a:solidFill>
+                      <a:prstDash val="solid"/>
+                      <a:round/>
+                      <a:headEnd type="none" w="med" len="med"/>
+                      <a:tailEnd type="none" w="med" len="med"/>
+                    </a:lnT>
+                    <a:noFill/>
+                  </a:tcPr>
                 </a:tc>
               </a:tr>
               <a:tr h="905254">
@@ -4926,7 +6038,27 @@
                       </a:endParaRPr>
                     </a:p>
                   </a:txBody>
-                  <a:tcPr/>
+                  <a:tcPr>
+                    <a:lnL w="28575" cap="flat" cmpd="sng" algn="ctr">
+                      <a:solidFill>
+                        <a:srgbClr val="006600"/>
+                      </a:solidFill>
+                      <a:prstDash val="solid"/>
+                      <a:round/>
+                      <a:headEnd type="none" w="med" len="med"/>
+                      <a:tailEnd type="none" w="med" len="med"/>
+                    </a:lnL>
+                    <a:lnR w="28575" cap="flat" cmpd="sng" algn="ctr">
+                      <a:solidFill>
+                        <a:srgbClr val="006600"/>
+                      </a:solidFill>
+                      <a:prstDash val="solid"/>
+                      <a:round/>
+                      <a:headEnd type="none" w="med" len="med"/>
+                      <a:tailEnd type="none" w="med" len="med"/>
+                    </a:lnR>
+                    <a:noFill/>
+                  </a:tcPr>
                 </a:tc>
               </a:tr>
               <a:tr h="402157">
@@ -4935,18 +6067,36 @@
                     <a:bodyPr/>
                     <a:lstStyle/>
                     <a:p>
-                      <a:r>
-                        <a:rPr lang="es-MX" sz="800" b="1" dirty="0" smtClean="0">
-                          <a:latin typeface="Arial Narrow" panose="020B0606020202030204" pitchFamily="34" charset="0"/>
-                        </a:rPr>
-                        <a:t>Observaciones</a:t>
-                      </a:r>
-                      <a:endParaRPr lang="es-MX" sz="800" b="1" dirty="0">
-                        <a:latin typeface="Arial Narrow" panose="020B0606020202030204" pitchFamily="34" charset="0"/>
-                      </a:endParaRPr>
-                    </a:p>
-                  </a:txBody>
-                  <a:tcPr/>
+                      <a:pPr algn="ctr"/>
+                      <a:endParaRPr lang="es-MX" sz="1600" b="1" dirty="0">
+                        <a:solidFill>
+                          <a:schemeClr val="tx1"/>
+                        </a:solidFill>
+                        <a:latin typeface="Soberana Titular" pitchFamily="50" charset="0"/>
+                      </a:endParaRPr>
+                    </a:p>
+                  </a:txBody>
+                  <a:tcPr>
+                    <a:lnL w="28575" cap="flat" cmpd="sng" algn="ctr">
+                      <a:solidFill>
+                        <a:srgbClr val="006600"/>
+                      </a:solidFill>
+                      <a:prstDash val="solid"/>
+                      <a:round/>
+                      <a:headEnd type="none" w="med" len="med"/>
+                      <a:tailEnd type="none" w="med" len="med"/>
+                    </a:lnL>
+                    <a:lnR w="28575" cap="flat" cmpd="sng" algn="ctr">
+                      <a:solidFill>
+                        <a:srgbClr val="006600"/>
+                      </a:solidFill>
+                      <a:prstDash val="solid"/>
+                      <a:round/>
+                      <a:headEnd type="none" w="med" len="med"/>
+                      <a:tailEnd type="none" w="med" len="med"/>
+                    </a:lnR>
+                    <a:noFill/>
+                  </a:tcPr>
                 </a:tc>
               </a:tr>
               <a:tr h="905254">
@@ -4990,7 +6140,36 @@
                       </a:endParaRPr>
                     </a:p>
                   </a:txBody>
-                  <a:tcPr/>
+                  <a:tcPr>
+                    <a:lnL w="28575" cap="flat" cmpd="sng" algn="ctr">
+                      <a:solidFill>
+                        <a:srgbClr val="006600"/>
+                      </a:solidFill>
+                      <a:prstDash val="solid"/>
+                      <a:round/>
+                      <a:headEnd type="none" w="med" len="med"/>
+                      <a:tailEnd type="none" w="med" len="med"/>
+                    </a:lnL>
+                    <a:lnR w="28575" cap="flat" cmpd="sng" algn="ctr">
+                      <a:solidFill>
+                        <a:srgbClr val="006600"/>
+                      </a:solidFill>
+                      <a:prstDash val="solid"/>
+                      <a:round/>
+                      <a:headEnd type="none" w="med" len="med"/>
+                      <a:tailEnd type="none" w="med" len="med"/>
+                    </a:lnR>
+                    <a:lnB w="28575" cap="flat" cmpd="sng" algn="ctr">
+                      <a:solidFill>
+                        <a:srgbClr val="006600"/>
+                      </a:solidFill>
+                      <a:prstDash val="solid"/>
+                      <a:round/>
+                      <a:headEnd type="none" w="med" len="med"/>
+                      <a:tailEnd type="none" w="med" len="med"/>
+                    </a:lnB>
+                    <a:noFill/>
+                  </a:tcPr>
                 </a:tc>
               </a:tr>
             </a:tbl>
@@ -5006,14 +6185,14 @@
           <p:nvPr>
             <p:extLst>
               <p:ext uri="{D42A27DB-BD31-4B8C-83A1-F6EECF244321}">
-                <p14:modId xmlns:p14="http://schemas.microsoft.com/office/powerpoint/2010/main" val="2375103945"/>
+                <p14:modId xmlns:p14="http://schemas.microsoft.com/office/powerpoint/2010/main" val="1663516041"/>
               </p:ext>
             </p:extLst>
           </p:nvPr>
         </p:nvGraphicFramePr>
         <p:xfrm>
-          <a:off x="6444208" y="3645024"/>
-          <a:ext cx="2255912" cy="1080120"/>
+          <a:off x="6444208" y="3717032"/>
+          <a:ext cx="2304256" cy="1049640"/>
         </p:xfrm>
         <a:graphic>
           <a:graphicData uri="http://schemas.openxmlformats.org/drawingml/2006/table">
@@ -5022,8 +6201,8 @@
                 <a:tableStyleId>{5C22544A-7EE6-4342-B048-85BDC9FD1C3A}</a:tableStyleId>
               </a:tblPr>
               <a:tblGrid>
-                <a:gridCol w="1127956"/>
-                <a:gridCol w="1127956"/>
+                <a:gridCol w="1152128"/>
+                <a:gridCol w="1152128"/>
               </a:tblGrid>
               <a:tr h="360040">
                 <a:tc gridSpan="2">
@@ -5032,18 +6211,44 @@
                     <a:lstStyle/>
                     <a:p>
                       <a:pPr algn="ctr"/>
-                      <a:r>
-                        <a:rPr lang="es-MX" sz="2000" dirty="0" smtClean="0">
-                          <a:latin typeface="Arial Narrow" panose="020B0606020202030204" pitchFamily="34" charset="0"/>
-                        </a:rPr>
-                        <a:t>Inauguración</a:t>
-                      </a:r>
-                      <a:endParaRPr lang="es-MX" sz="2000" dirty="0">
-                        <a:latin typeface="Arial Narrow" panose="020B0606020202030204" pitchFamily="34" charset="0"/>
-                      </a:endParaRPr>
-                    </a:p>
-                  </a:txBody>
-                  <a:tcPr/>
+                      <a:endParaRPr lang="es-MX" sz="1800" dirty="0">
+                        <a:solidFill>
+                          <a:schemeClr val="tx1"/>
+                        </a:solidFill>
+                        <a:latin typeface="Soberana Titular" pitchFamily="50" charset="0"/>
+                      </a:endParaRPr>
+                    </a:p>
+                  </a:txBody>
+                  <a:tcPr>
+                    <a:lnL w="28575" cap="flat" cmpd="sng" algn="ctr">
+                      <a:solidFill>
+                        <a:srgbClr val="006600"/>
+                      </a:solidFill>
+                      <a:prstDash val="solid"/>
+                      <a:round/>
+                      <a:headEnd type="none" w="med" len="med"/>
+                      <a:tailEnd type="none" w="med" len="med"/>
+                    </a:lnL>
+                    <a:lnR w="28575" cap="flat" cmpd="sng" algn="ctr">
+                      <a:solidFill>
+                        <a:srgbClr val="006600"/>
+                      </a:solidFill>
+                      <a:prstDash val="solid"/>
+                      <a:round/>
+                      <a:headEnd type="none" w="med" len="med"/>
+                      <a:tailEnd type="none" w="med" len="med"/>
+                    </a:lnR>
+                    <a:lnT w="28575" cap="flat" cmpd="sng" algn="ctr">
+                      <a:solidFill>
+                        <a:srgbClr val="006600"/>
+                      </a:solidFill>
+                      <a:prstDash val="solid"/>
+                      <a:round/>
+                      <a:headEnd type="none" w="med" len="med"/>
+                      <a:tailEnd type="none" w="med" len="med"/>
+                    </a:lnT>
+                    <a:noFill/>
+                  </a:tcPr>
                 </a:tc>
                 <a:tc hMerge="1">
                   <a:txBody>
@@ -5073,7 +6278,18 @@
                       </a:endParaRPr>
                     </a:p>
                   </a:txBody>
-                  <a:tcPr/>
+                  <a:tcPr>
+                    <a:lnL w="28575" cap="flat" cmpd="sng" algn="ctr">
+                      <a:solidFill>
+                        <a:srgbClr val="006600"/>
+                      </a:solidFill>
+                      <a:prstDash val="solid"/>
+                      <a:round/>
+                      <a:headEnd type="none" w="med" len="med"/>
+                      <a:tailEnd type="none" w="med" len="med"/>
+                    </a:lnL>
+                    <a:noFill/>
+                  </a:tcPr>
                 </a:tc>
                 <a:tc>
                   <a:txBody>
@@ -5085,7 +6301,18 @@
                       </a:endParaRPr>
                     </a:p>
                   </a:txBody>
-                  <a:tcPr/>
+                  <a:tcPr>
+                    <a:lnR w="28575" cap="flat" cmpd="sng" algn="ctr">
+                      <a:solidFill>
+                        <a:srgbClr val="006600"/>
+                      </a:solidFill>
+                      <a:prstDash val="solid"/>
+                      <a:round/>
+                      <a:headEnd type="none" w="med" len="med"/>
+                      <a:tailEnd type="none" w="med" len="med"/>
+                    </a:lnR>
+                    <a:noFill/>
+                  </a:tcPr>
                 </a:tc>
               </a:tr>
               <a:tr h="229833">
@@ -5105,7 +6332,18 @@
                       </a:endParaRPr>
                     </a:p>
                   </a:txBody>
-                  <a:tcPr/>
+                  <a:tcPr>
+                    <a:lnL w="28575" cap="flat" cmpd="sng" algn="ctr">
+                      <a:solidFill>
+                        <a:srgbClr val="006600"/>
+                      </a:solidFill>
+                      <a:prstDash val="solid"/>
+                      <a:round/>
+                      <a:headEnd type="none" w="med" len="med"/>
+                      <a:tailEnd type="none" w="med" len="med"/>
+                    </a:lnL>
+                    <a:noFill/>
+                  </a:tcPr>
                 </a:tc>
                 <a:tc>
                   <a:txBody>
@@ -5117,7 +6355,18 @@
                       </a:endParaRPr>
                     </a:p>
                   </a:txBody>
-                  <a:tcPr/>
+                  <a:tcPr>
+                    <a:lnR w="28575" cap="flat" cmpd="sng" algn="ctr">
+                      <a:solidFill>
+                        <a:srgbClr val="006600"/>
+                      </a:solidFill>
+                      <a:prstDash val="solid"/>
+                      <a:round/>
+                      <a:headEnd type="none" w="med" len="med"/>
+                      <a:tailEnd type="none" w="med" len="med"/>
+                    </a:lnR>
+                    <a:noFill/>
+                  </a:tcPr>
                 </a:tc>
               </a:tr>
               <a:tr h="240687">
@@ -5137,7 +6386,27 @@
                       </a:endParaRPr>
                     </a:p>
                   </a:txBody>
-                  <a:tcPr/>
+                  <a:tcPr>
+                    <a:lnL w="28575" cap="flat" cmpd="sng" algn="ctr">
+                      <a:solidFill>
+                        <a:srgbClr val="006600"/>
+                      </a:solidFill>
+                      <a:prstDash val="solid"/>
+                      <a:round/>
+                      <a:headEnd type="none" w="med" len="med"/>
+                      <a:tailEnd type="none" w="med" len="med"/>
+                    </a:lnL>
+                    <a:lnB w="28575" cap="flat" cmpd="sng" algn="ctr">
+                      <a:solidFill>
+                        <a:srgbClr val="006600"/>
+                      </a:solidFill>
+                      <a:prstDash val="solid"/>
+                      <a:round/>
+                      <a:headEnd type="none" w="med" len="med"/>
+                      <a:tailEnd type="none" w="med" len="med"/>
+                    </a:lnB>
+                    <a:noFill/>
+                  </a:tcPr>
                 </a:tc>
                 <a:tc>
                   <a:txBody>
@@ -5149,7 +6418,27 @@
                       </a:endParaRPr>
                     </a:p>
                   </a:txBody>
-                  <a:tcPr/>
+                  <a:tcPr>
+                    <a:lnR w="28575" cap="flat" cmpd="sng" algn="ctr">
+                      <a:solidFill>
+                        <a:srgbClr val="006600"/>
+                      </a:solidFill>
+                      <a:prstDash val="solid"/>
+                      <a:round/>
+                      <a:headEnd type="none" w="med" len="med"/>
+                      <a:tailEnd type="none" w="med" len="med"/>
+                    </a:lnR>
+                    <a:lnB w="28575" cap="flat" cmpd="sng" algn="ctr">
+                      <a:solidFill>
+                        <a:srgbClr val="006600"/>
+                      </a:solidFill>
+                      <a:prstDash val="solid"/>
+                      <a:round/>
+                      <a:headEnd type="none" w="med" len="med"/>
+                      <a:tailEnd type="none" w="med" len="med"/>
+                    </a:lnB>
+                    <a:noFill/>
+                  </a:tcPr>
                 </a:tc>
               </a:tr>
             </a:tbl>
@@ -5165,14 +6454,14 @@
           <p:nvPr>
             <p:extLst>
               <p:ext uri="{D42A27DB-BD31-4B8C-83A1-F6EECF244321}">
-                <p14:modId xmlns:p14="http://schemas.microsoft.com/office/powerpoint/2010/main" val="644268556"/>
+                <p14:modId xmlns:p14="http://schemas.microsoft.com/office/powerpoint/2010/main" val="3967446963"/>
               </p:ext>
             </p:extLst>
           </p:nvPr>
         </p:nvGraphicFramePr>
         <p:xfrm>
           <a:off x="6444208" y="4941168"/>
-          <a:ext cx="2304256" cy="1656184"/>
+          <a:ext cx="2304256" cy="1625704"/>
         </p:xfrm>
         <a:graphic>
           <a:graphicData uri="http://schemas.openxmlformats.org/drawingml/2006/table">
@@ -5192,18 +6481,53 @@
                     <a:lstStyle/>
                     <a:p>
                       <a:pPr algn="ctr"/>
-                      <a:r>
-                        <a:rPr lang="es-MX" sz="2000" dirty="0" smtClean="0">
-                          <a:latin typeface="Arial Narrow" panose="020B0606020202030204" pitchFamily="34" charset="0"/>
-                        </a:rPr>
-                        <a:t>Fotografías</a:t>
-                      </a:r>
-                      <a:endParaRPr lang="es-MX" sz="2000" dirty="0">
-                        <a:latin typeface="Arial Narrow" panose="020B0606020202030204" pitchFamily="34" charset="0"/>
-                      </a:endParaRPr>
-                    </a:p>
-                  </a:txBody>
-                  <a:tcPr/>
+                      <a:endParaRPr lang="es-MX" sz="1800" dirty="0">
+                        <a:solidFill>
+                          <a:schemeClr val="tx1"/>
+                        </a:solidFill>
+                        <a:latin typeface="Soberana Titular" pitchFamily="50" charset="0"/>
+                      </a:endParaRPr>
+                    </a:p>
+                  </a:txBody>
+                  <a:tcPr>
+                    <a:lnL w="28575" cap="flat" cmpd="sng" algn="ctr">
+                      <a:solidFill>
+                        <a:srgbClr val="006600"/>
+                      </a:solidFill>
+                      <a:prstDash val="solid"/>
+                      <a:round/>
+                      <a:headEnd type="none" w="med" len="med"/>
+                      <a:tailEnd type="none" w="med" len="med"/>
+                    </a:lnL>
+                    <a:lnR w="28575" cap="flat" cmpd="sng" algn="ctr">
+                      <a:solidFill>
+                        <a:srgbClr val="006600"/>
+                      </a:solidFill>
+                      <a:prstDash val="solid"/>
+                      <a:round/>
+                      <a:headEnd type="none" w="med" len="med"/>
+                      <a:tailEnd type="none" w="med" len="med"/>
+                    </a:lnR>
+                    <a:lnT w="28575" cap="flat" cmpd="sng" algn="ctr">
+                      <a:solidFill>
+                        <a:srgbClr val="006600"/>
+                      </a:solidFill>
+                      <a:prstDash val="solid"/>
+                      <a:round/>
+                      <a:headEnd type="none" w="med" len="med"/>
+                      <a:tailEnd type="none" w="med" len="med"/>
+                    </a:lnT>
+                    <a:lnB w="28575" cap="flat" cmpd="sng" algn="ctr">
+                      <a:solidFill>
+                        <a:srgbClr val="008000"/>
+                      </a:solidFill>
+                      <a:prstDash val="solid"/>
+                      <a:round/>
+                      <a:headEnd type="none" w="med" len="med"/>
+                      <a:tailEnd type="none" w="med" len="med"/>
+                    </a:lnB>
+                    <a:noFill/>
+                  </a:tcPr>
                 </a:tc>
                 <a:tc hMerge="1">
                   <a:txBody>
@@ -5244,7 +6568,45 @@
                       </a:endParaRPr>
                     </a:p>
                   </a:txBody>
-                  <a:tcPr anchor="b"/>
+                  <a:tcPr anchor="b">
+                    <a:lnL w="28575" cap="flat" cmpd="sng" algn="ctr">
+                      <a:solidFill>
+                        <a:srgbClr val="006600"/>
+                      </a:solidFill>
+                      <a:prstDash val="solid"/>
+                      <a:round/>
+                      <a:headEnd type="none" w="med" len="med"/>
+                      <a:tailEnd type="none" w="med" len="med"/>
+                    </a:lnL>
+                    <a:lnR w="28575" cap="flat" cmpd="sng" algn="ctr">
+                      <a:solidFill>
+                        <a:srgbClr val="008000"/>
+                      </a:solidFill>
+                      <a:prstDash val="solid"/>
+                      <a:round/>
+                      <a:headEnd type="none" w="med" len="med"/>
+                      <a:tailEnd type="none" w="med" len="med"/>
+                    </a:lnR>
+                    <a:lnT w="28575" cap="flat" cmpd="sng" algn="ctr">
+                      <a:solidFill>
+                        <a:srgbClr val="008000"/>
+                      </a:solidFill>
+                      <a:prstDash val="solid"/>
+                      <a:round/>
+                      <a:headEnd type="none" w="med" len="med"/>
+                      <a:tailEnd type="none" w="med" len="med"/>
+                    </a:lnT>
+                    <a:lnB w="28575" cap="flat" cmpd="sng" algn="ctr">
+                      <a:solidFill>
+                        <a:srgbClr val="006600"/>
+                      </a:solidFill>
+                      <a:prstDash val="solid"/>
+                      <a:round/>
+                      <a:headEnd type="none" w="med" len="med"/>
+                      <a:tailEnd type="none" w="med" len="med"/>
+                    </a:lnB>
+                    <a:noFill/>
+                  </a:tcPr>
                 </a:tc>
                 <a:tc>
                   <a:txBody>
@@ -5263,7 +6625,45 @@
                       </a:endParaRPr>
                     </a:p>
                   </a:txBody>
-                  <a:tcPr anchor="b"/>
+                  <a:tcPr anchor="b">
+                    <a:lnL w="28575" cap="flat" cmpd="sng" algn="ctr">
+                      <a:solidFill>
+                        <a:srgbClr val="008000"/>
+                      </a:solidFill>
+                      <a:prstDash val="solid"/>
+                      <a:round/>
+                      <a:headEnd type="none" w="med" len="med"/>
+                      <a:tailEnd type="none" w="med" len="med"/>
+                    </a:lnL>
+                    <a:lnR w="28575" cap="flat" cmpd="sng" algn="ctr">
+                      <a:solidFill>
+                        <a:srgbClr val="008000"/>
+                      </a:solidFill>
+                      <a:prstDash val="solid"/>
+                      <a:round/>
+                      <a:headEnd type="none" w="med" len="med"/>
+                      <a:tailEnd type="none" w="med" len="med"/>
+                    </a:lnR>
+                    <a:lnT w="28575" cap="flat" cmpd="sng" algn="ctr">
+                      <a:solidFill>
+                        <a:srgbClr val="008000"/>
+                      </a:solidFill>
+                      <a:prstDash val="solid"/>
+                      <a:round/>
+                      <a:headEnd type="none" w="med" len="med"/>
+                      <a:tailEnd type="none" w="med" len="med"/>
+                    </a:lnT>
+                    <a:lnB w="28575" cap="flat" cmpd="sng" algn="ctr">
+                      <a:solidFill>
+                        <a:srgbClr val="006600"/>
+                      </a:solidFill>
+                      <a:prstDash val="solid"/>
+                      <a:round/>
+                      <a:headEnd type="none" w="med" len="med"/>
+                      <a:tailEnd type="none" w="med" len="med"/>
+                    </a:lnB>
+                    <a:noFill/>
+                  </a:tcPr>
                 </a:tc>
                 <a:tc>
                   <a:txBody>
@@ -5282,42 +6682,51 @@
                       </a:endParaRPr>
                     </a:p>
                   </a:txBody>
-                  <a:tcPr anchor="b"/>
+                  <a:tcPr anchor="b">
+                    <a:lnL w="28575" cap="flat" cmpd="sng" algn="ctr">
+                      <a:solidFill>
+                        <a:srgbClr val="008000"/>
+                      </a:solidFill>
+                      <a:prstDash val="solid"/>
+                      <a:round/>
+                      <a:headEnd type="none" w="med" len="med"/>
+                      <a:tailEnd type="none" w="med" len="med"/>
+                    </a:lnL>
+                    <a:lnR w="28575" cap="flat" cmpd="sng" algn="ctr">
+                      <a:solidFill>
+                        <a:srgbClr val="006600"/>
+                      </a:solidFill>
+                      <a:prstDash val="solid"/>
+                      <a:round/>
+                      <a:headEnd type="none" w="med" len="med"/>
+                      <a:tailEnd type="none" w="med" len="med"/>
+                    </a:lnR>
+                    <a:lnT w="28575" cap="flat" cmpd="sng" algn="ctr">
+                      <a:solidFill>
+                        <a:srgbClr val="008000"/>
+                      </a:solidFill>
+                      <a:prstDash val="solid"/>
+                      <a:round/>
+                      <a:headEnd type="none" w="med" len="med"/>
+                      <a:tailEnd type="none" w="med" len="med"/>
+                    </a:lnT>
+                    <a:lnB w="28575" cap="flat" cmpd="sng" algn="ctr">
+                      <a:solidFill>
+                        <a:srgbClr val="006600"/>
+                      </a:solidFill>
+                      <a:prstDash val="solid"/>
+                      <a:round/>
+                      <a:headEnd type="none" w="med" len="med"/>
+                      <a:tailEnd type="none" w="med" len="med"/>
+                    </a:lnB>
+                    <a:noFill/>
+                  </a:tcPr>
                 </a:tc>
               </a:tr>
             </a:tbl>
           </a:graphicData>
         </a:graphic>
       </p:graphicFrame>
-      <p:sp>
-        <p:nvSpPr>
-          <p:cNvPr id="28" name="27 CuadroTexto"/>
-          <p:cNvSpPr txBox="1"/>
-          <p:nvPr/>
-        </p:nvSpPr>
-        <p:spPr>
-          <a:xfrm>
-            <a:off x="4355976" y="1743716"/>
-            <a:ext cx="288032" cy="338554"/>
-          </a:xfrm>
-          <a:prstGeom prst="rect">
-            <a:avLst/>
-          </a:prstGeom>
-          <a:noFill/>
-        </p:spPr>
-        <p:txBody>
-          <a:bodyPr wrap="square" rtlCol="0">
-            <a:spAutoFit/>
-          </a:bodyPr>
-          <a:lstStyle/>
-          <a:p>
-            <a:endParaRPr lang="es-MX" sz="800" dirty="0" smtClean="0"/>
-          </a:p>
-          <a:p>
-            <a:endParaRPr lang="es-MX" sz="800" dirty="0"/>
-          </a:p>
-        </p:txBody>
-      </p:sp>
       <p:sp>
         <p:nvSpPr>
           <p:cNvPr id="4" name="3 CuadroTexto"/>
@@ -5368,10 +6777,11 @@
           </a:bodyPr>
           <a:lstStyle/>
           <a:p>
-            <a:r>
-              <a:rPr lang="es-MX" sz="800" smtClean="0">
-                <a:latin typeface="Arial Narrow" panose="020B0606020202030204" pitchFamily="34" charset="0"/>
-              </a:rPr>
+            <a:pPr>
+              <a:defRPr sz="800"/>
+            </a:pPr>
+            <a:r>
+              <a:rPr lang="es-MX" dirty="0" smtClean="0"/>
               <a:t>x</a:t>
             </a:r>
             <a:endParaRPr lang="es-MX" sz="800" dirty="0">
@@ -5389,7 +6799,7 @@
         <p:spPr>
           <a:xfrm>
             <a:off x="1547664" y="2780928"/>
-            <a:ext cx="1440160" cy="184666"/>
+            <a:ext cx="1440160" cy="215444"/>
           </a:xfrm>
           <a:prstGeom prst="rect">
             <a:avLst/>
@@ -5402,10 +6812,11 @@
           </a:bodyPr>
           <a:lstStyle/>
           <a:p>
-            <a:r>
-              <a:rPr lang="es-MX" sz="600" dirty="0" smtClean="0">
-                <a:latin typeface="Arial Narrow" panose="020B0606020202030204" pitchFamily="34" charset="0"/>
-              </a:rPr>
+            <a:pPr>
+              <a:defRPr sz="800"/>
+            </a:pPr>
+            <a:r>
+              <a:rPr lang="es-MX" dirty="0" smtClean="0"/>
               <a:t>x</a:t>
             </a:r>
             <a:endParaRPr lang="es-MX" sz="600" dirty="0">
@@ -5436,10 +6847,11 @@
           </a:bodyPr>
           <a:lstStyle/>
           <a:p>
-            <a:r>
-              <a:rPr lang="es-MX" sz="800" smtClean="0">
-                <a:latin typeface="Arial Narrow" panose="020B0606020202030204" pitchFamily="34" charset="0"/>
-              </a:rPr>
+            <a:pPr>
+              <a:defRPr sz="800"/>
+            </a:pPr>
+            <a:r>
+              <a:rPr lang="es-MX" dirty="0" smtClean="0"/>
               <a:t>x</a:t>
             </a:r>
             <a:endParaRPr lang="es-MX" sz="800" dirty="0">
@@ -5470,10 +6882,11 @@
           </a:bodyPr>
           <a:lstStyle/>
           <a:p>
-            <a:r>
-              <a:rPr lang="es-MX" sz="800" smtClean="0">
-                <a:latin typeface="Arial Narrow" panose="020B0606020202030204" pitchFamily="34" charset="0"/>
-              </a:rPr>
+            <a:pPr>
+              <a:defRPr sz="800"/>
+            </a:pPr>
+            <a:r>
+              <a:rPr lang="es-MX" dirty="0" smtClean="0"/>
               <a:t>x</a:t>
             </a:r>
             <a:endParaRPr lang="es-MX" sz="800" dirty="0">
@@ -5490,7 +6903,7 @@
         </p:nvSpPr>
         <p:spPr>
           <a:xfrm>
-            <a:off x="1547664" y="4221668"/>
+            <a:off x="1547664" y="4140957"/>
             <a:ext cx="1117550" cy="215444"/>
           </a:xfrm>
           <a:prstGeom prst="rect">
@@ -5504,10 +6917,11 @@
           </a:bodyPr>
           <a:lstStyle/>
           <a:p>
-            <a:r>
-              <a:rPr lang="es-MX" sz="800" smtClean="0">
-                <a:latin typeface="Arial Narrow" panose="020B0606020202030204" pitchFamily="34" charset="0"/>
-              </a:rPr>
+            <a:pPr>
+              <a:defRPr sz="800"/>
+            </a:pPr>
+            <a:r>
+              <a:rPr lang="es-MX" dirty="0" smtClean="0"/>
               <a:t>x</a:t>
             </a:r>
             <a:endParaRPr lang="es-MX" sz="800" dirty="0">
@@ -5538,10 +6952,11 @@
           </a:bodyPr>
           <a:lstStyle/>
           <a:p>
-            <a:r>
-              <a:rPr lang="es-MX" sz="800" smtClean="0">
-                <a:latin typeface="Arial Narrow" panose="020B0606020202030204" pitchFamily="34" charset="0"/>
-              </a:rPr>
+            <a:pPr>
+              <a:defRPr sz="800"/>
+            </a:pPr>
+            <a:r>
+              <a:rPr lang="es-MX" dirty="0" smtClean="0"/>
               <a:t>x</a:t>
             </a:r>
             <a:endParaRPr lang="es-MX" sz="800" dirty="0">
@@ -5572,10 +6987,11 @@
           </a:bodyPr>
           <a:lstStyle/>
           <a:p>
-            <a:r>
-              <a:rPr lang="es-MX" sz="800" smtClean="0">
-                <a:latin typeface="Arial Narrow" panose="020B0606020202030204" pitchFamily="34" charset="0"/>
-              </a:rPr>
+            <a:pPr>
+              <a:defRPr sz="800"/>
+            </a:pPr>
+            <a:r>
+              <a:rPr lang="es-MX" dirty="0" smtClean="0"/>
               <a:t>x</a:t>
             </a:r>
             <a:endParaRPr lang="es-MX" sz="800" dirty="0">
@@ -5606,10 +7022,11 @@
           </a:bodyPr>
           <a:lstStyle/>
           <a:p>
-            <a:r>
-              <a:rPr lang="es-MX" sz="800" smtClean="0">
-                <a:latin typeface="Arial Narrow" panose="020B0606020202030204" pitchFamily="34" charset="0"/>
-              </a:rPr>
+            <a:pPr>
+              <a:defRPr sz="800"/>
+            </a:pPr>
+            <a:r>
+              <a:rPr lang="es-MX" dirty="0" smtClean="0"/>
               <a:t>x</a:t>
             </a:r>
             <a:endParaRPr lang="es-MX" sz="800" dirty="0">
@@ -5640,10 +7057,11 @@
           </a:bodyPr>
           <a:lstStyle/>
           <a:p>
-            <a:r>
-              <a:rPr lang="es-MX" sz="800" smtClean="0">
-                <a:latin typeface="Arial Narrow" panose="020B0606020202030204" pitchFamily="34" charset="0"/>
-              </a:rPr>
+            <a:pPr>
+              <a:defRPr sz="800"/>
+            </a:pPr>
+            <a:r>
+              <a:rPr lang="es-MX" dirty="0" smtClean="0"/>
               <a:t>x</a:t>
             </a:r>
             <a:endParaRPr lang="es-MX" sz="800" dirty="0">
@@ -5674,10 +7092,11 @@
           </a:bodyPr>
           <a:lstStyle/>
           <a:p>
-            <a:r>
-              <a:rPr lang="es-MX" sz="800" smtClean="0">
-                <a:latin typeface="Arial Narrow" panose="020B0606020202030204" pitchFamily="34" charset="0"/>
-              </a:rPr>
+            <a:pPr>
+              <a:defRPr sz="800"/>
+            </a:pPr>
+            <a:r>
+              <a:rPr lang="es-MX" dirty="0" smtClean="0"/>
               <a:t>x</a:t>
             </a:r>
             <a:endParaRPr lang="es-MX" sz="800" dirty="0">
@@ -5708,10 +7127,11 @@
           </a:bodyPr>
           <a:lstStyle/>
           <a:p>
-            <a:r>
-              <a:rPr lang="es-MX" sz="800" smtClean="0">
-                <a:latin typeface="Arial Narrow" panose="020B0606020202030204" pitchFamily="34" charset="0"/>
-              </a:rPr>
+            <a:pPr>
+              <a:defRPr sz="800"/>
+            </a:pPr>
+            <a:r>
+              <a:rPr lang="es-MX" dirty="0" smtClean="0"/>
               <a:t>x</a:t>
             </a:r>
             <a:endParaRPr lang="es-MX" sz="800" dirty="0">
@@ -5742,10 +7162,11 @@
           </a:bodyPr>
           <a:lstStyle/>
           <a:p>
-            <a:r>
-              <a:rPr lang="es-MX" sz="800" smtClean="0">
-                <a:latin typeface="Arial Narrow" panose="020B0606020202030204" pitchFamily="34" charset="0"/>
-              </a:rPr>
+            <a:pPr>
+              <a:defRPr sz="800"/>
+            </a:pPr>
+            <a:r>
+              <a:rPr lang="es-MX" dirty="0" smtClean="0"/>
               <a:t>x</a:t>
             </a:r>
             <a:endParaRPr lang="es-MX" sz="800" dirty="0">
@@ -5776,11 +7197,12 @@
           </a:bodyPr>
           <a:lstStyle/>
           <a:p>
-            <a:r>
-              <a:rPr lang="es-MX" sz="800" smtClean="0">
-                <a:latin typeface="Arial Narrow" panose="020B0606020202030204" pitchFamily="34" charset="0"/>
-              </a:rPr>
-              <a:t>xx</a:t>
+            <a:pPr>
+              <a:defRPr sz="800"/>
+            </a:pPr>
+            <a:r>
+              <a:rPr lang="es-MX" dirty="0" smtClean="0"/>
+              <a:t>x</a:t>
             </a:r>
             <a:endParaRPr lang="es-MX" sz="800" dirty="0">
               <a:latin typeface="Arial Narrow" panose="020B0606020202030204" pitchFamily="34" charset="0"/>
@@ -5810,11 +7232,12 @@
           </a:bodyPr>
           <a:lstStyle/>
           <a:p>
-            <a:r>
-              <a:rPr lang="es-MX" sz="800" smtClean="0">
-                <a:latin typeface="Arial Narrow" panose="020B0606020202030204" pitchFamily="34" charset="0"/>
-              </a:rPr>
-              <a:t>xx</a:t>
+            <a:pPr>
+              <a:defRPr sz="800"/>
+            </a:pPr>
+            <a:r>
+              <a:rPr lang="es-MX" dirty="0" smtClean="0"/>
+              <a:t>x</a:t>
             </a:r>
             <a:endParaRPr lang="es-MX" sz="800" dirty="0">
               <a:latin typeface="Arial Narrow" panose="020B0606020202030204" pitchFamily="34" charset="0"/>
@@ -5844,11 +7267,12 @@
           </a:bodyPr>
           <a:lstStyle/>
           <a:p>
-            <a:r>
-              <a:rPr lang="es-MX" sz="800" smtClean="0">
-                <a:latin typeface="Arial Narrow" panose="020B0606020202030204" pitchFamily="34" charset="0"/>
-              </a:rPr>
-              <a:t>xx</a:t>
+            <a:pPr>
+              <a:defRPr sz="800"/>
+            </a:pPr>
+            <a:r>
+              <a:rPr lang="es-MX" dirty="0" smtClean="0"/>
+              <a:t>x</a:t>
             </a:r>
             <a:endParaRPr lang="es-MX" sz="800" dirty="0">
               <a:latin typeface="Arial Narrow" panose="020B0606020202030204" pitchFamily="34" charset="0"/>
@@ -5878,11 +7302,12 @@
           </a:bodyPr>
           <a:lstStyle/>
           <a:p>
-            <a:r>
-              <a:rPr lang="es-MX" sz="800" smtClean="0">
-                <a:latin typeface="Arial Narrow" panose="020B0606020202030204" pitchFamily="34" charset="0"/>
-              </a:rPr>
-              <a:t>xx</a:t>
+            <a:pPr>
+              <a:defRPr sz="800"/>
+            </a:pPr>
+            <a:r>
+              <a:rPr lang="es-MX" dirty="0" smtClean="0"/>
+              <a:t>x</a:t>
             </a:r>
             <a:endParaRPr lang="es-MX" sz="800" dirty="0">
               <a:latin typeface="Arial Narrow" panose="020B0606020202030204" pitchFamily="34" charset="0"/>
@@ -5912,10 +7337,11 @@
           </a:bodyPr>
           <a:lstStyle/>
           <a:p>
-            <a:r>
-              <a:rPr lang="es-MX" sz="800" smtClean="0">
-                <a:latin typeface="Arial Narrow" panose="020B0606020202030204" pitchFamily="34" charset="0"/>
-              </a:rPr>
+            <a:pPr>
+              <a:defRPr sz="800"/>
+            </a:pPr>
+            <a:r>
+              <a:rPr lang="es-MX" dirty="0" smtClean="0"/>
               <a:t>x</a:t>
             </a:r>
             <a:endParaRPr lang="es-MX" sz="800" dirty="0">
@@ -5946,10 +7372,11 @@
           </a:bodyPr>
           <a:lstStyle/>
           <a:p>
-            <a:r>
-              <a:rPr lang="es-MX" sz="800" smtClean="0">
-                <a:latin typeface="Arial Narrow" panose="020B0606020202030204" pitchFamily="34" charset="0"/>
-              </a:rPr>
+            <a:pPr>
+              <a:defRPr sz="800"/>
+            </a:pPr>
+            <a:r>
+              <a:rPr lang="es-MX" dirty="0" smtClean="0"/>
               <a:t>x</a:t>
             </a:r>
             <a:endParaRPr lang="es-MX" sz="800" dirty="0">
@@ -5980,10 +7407,11 @@
           </a:bodyPr>
           <a:lstStyle/>
           <a:p>
-            <a:r>
-              <a:rPr lang="es-MX" sz="800" smtClean="0">
-                <a:latin typeface="Arial Narrow" panose="020B0606020202030204" pitchFamily="34" charset="0"/>
-              </a:rPr>
+            <a:pPr>
+              <a:defRPr sz="800"/>
+            </a:pPr>
+            <a:r>
+              <a:rPr lang="es-MX" dirty="0" smtClean="0"/>
               <a:t>x</a:t>
             </a:r>
             <a:endParaRPr lang="es-MX" sz="800" dirty="0">
@@ -6014,10 +7442,11 @@
           </a:bodyPr>
           <a:lstStyle/>
           <a:p>
-            <a:r>
-              <a:rPr lang="es-MX" sz="800" smtClean="0">
-                <a:latin typeface="Arial Narrow" panose="020B0606020202030204" pitchFamily="34" charset="0"/>
-              </a:rPr>
+            <a:pPr>
+              <a:defRPr sz="800"/>
+            </a:pPr>
+            <a:r>
+              <a:rPr lang="es-MX" dirty="0" smtClean="0"/>
               <a:t>x</a:t>
             </a:r>
             <a:endParaRPr lang="es-MX" sz="800" dirty="0">
@@ -6048,10 +7477,11 @@
           </a:bodyPr>
           <a:lstStyle/>
           <a:p>
-            <a:r>
-              <a:rPr lang="es-MX" sz="800" smtClean="0">
-                <a:latin typeface="Arial Narrow" panose="020B0606020202030204" pitchFamily="34" charset="0"/>
-              </a:rPr>
+            <a:pPr>
+              <a:defRPr sz="800"/>
+            </a:pPr>
+            <a:r>
+              <a:rPr lang="es-MX" dirty="0" smtClean="0"/>
               <a:t>x</a:t>
             </a:r>
             <a:endParaRPr lang="es-MX" sz="800" dirty="0">
@@ -6068,7 +7498,7 @@
         </p:nvSpPr>
         <p:spPr>
           <a:xfrm>
-            <a:off x="4067944" y="3573596"/>
+            <a:off x="4067944" y="3501008"/>
             <a:ext cx="2088232" cy="215444"/>
           </a:xfrm>
           <a:prstGeom prst="rect">
@@ -6082,10 +7512,11 @@
           </a:bodyPr>
           <a:lstStyle/>
           <a:p>
-            <a:r>
-              <a:rPr lang="es-MX" sz="800" smtClean="0">
-                <a:latin typeface="Arial Narrow" panose="020B0606020202030204" pitchFamily="34" charset="0"/>
-              </a:rPr>
+            <a:pPr>
+              <a:defRPr sz="800"/>
+            </a:pPr>
+            <a:r>
+              <a:rPr lang="es-MX" dirty="0" smtClean="0"/>
               <a:t>x</a:t>
             </a:r>
             <a:endParaRPr lang="es-MX" sz="800" dirty="0">
@@ -6102,7 +7533,7 @@
         </p:nvSpPr>
         <p:spPr>
           <a:xfrm>
-            <a:off x="3059832" y="4365104"/>
+            <a:off x="3059832" y="4293096"/>
             <a:ext cx="432048" cy="215444"/>
           </a:xfrm>
           <a:prstGeom prst="rect">
@@ -6116,11 +7547,12 @@
           </a:bodyPr>
           <a:lstStyle/>
           <a:p>
-            <a:r>
-              <a:rPr lang="es-MX" sz="800" dirty="0" smtClean="0">
-                <a:latin typeface="Arial Narrow" panose="020B0606020202030204" pitchFamily="34" charset="0"/>
-              </a:rPr>
-              <a:t>xx</a:t>
+            <a:pPr>
+              <a:defRPr sz="800"/>
+            </a:pPr>
+            <a:r>
+              <a:rPr lang="es-MX" dirty="0" smtClean="0"/>
+              <a:t>x</a:t>
             </a:r>
             <a:endParaRPr lang="es-MX" sz="800" dirty="0">
               <a:latin typeface="Arial Narrow" panose="020B0606020202030204" pitchFamily="34" charset="0"/>
@@ -6136,7 +7568,7 @@
         </p:nvSpPr>
         <p:spPr>
           <a:xfrm>
-            <a:off x="4572000" y="4365104"/>
+            <a:off x="4572000" y="4293096"/>
             <a:ext cx="1584176" cy="215444"/>
           </a:xfrm>
           <a:prstGeom prst="rect">
@@ -6172,7 +7604,7 @@
         </p:nvSpPr>
         <p:spPr>
           <a:xfrm>
-            <a:off x="3059832" y="4725144"/>
+            <a:off x="3059832" y="4653136"/>
             <a:ext cx="432048" cy="215444"/>
           </a:xfrm>
           <a:prstGeom prst="rect">
@@ -6186,11 +7618,12 @@
           </a:bodyPr>
           <a:lstStyle/>
           <a:p>
-            <a:r>
-              <a:rPr lang="es-MX" sz="800" smtClean="0">
-                <a:latin typeface="Arial Narrow" panose="020B0606020202030204" pitchFamily="34" charset="0"/>
-              </a:rPr>
-              <a:t>xx</a:t>
+            <a:pPr>
+              <a:defRPr sz="800"/>
+            </a:pPr>
+            <a:r>
+              <a:rPr lang="es-MX" dirty="0" smtClean="0"/>
+              <a:t>x</a:t>
             </a:r>
             <a:endParaRPr lang="es-MX" sz="800" dirty="0">
               <a:latin typeface="Arial Narrow" panose="020B0606020202030204" pitchFamily="34" charset="0"/>
@@ -6206,7 +7639,7 @@
         </p:nvSpPr>
         <p:spPr>
           <a:xfrm>
-            <a:off x="3059832" y="5120898"/>
+            <a:off x="3059832" y="5013176"/>
             <a:ext cx="360040" cy="215444"/>
           </a:xfrm>
           <a:prstGeom prst="rect">
@@ -6220,11 +7653,12 @@
           </a:bodyPr>
           <a:lstStyle/>
           <a:p>
-            <a:r>
-              <a:rPr lang="es-MX" sz="800" smtClean="0">
-                <a:latin typeface="Arial Narrow" panose="020B0606020202030204" pitchFamily="34" charset="0"/>
-              </a:rPr>
-              <a:t>xx</a:t>
+            <a:pPr>
+              <a:defRPr sz="800"/>
+            </a:pPr>
+            <a:r>
+              <a:rPr lang="es-MX" dirty="0" smtClean="0"/>
+              <a:t>x</a:t>
             </a:r>
             <a:endParaRPr lang="es-MX" sz="800" dirty="0">
               <a:latin typeface="Arial Narrow" panose="020B0606020202030204" pitchFamily="34" charset="0"/>
@@ -6240,7 +7674,7 @@
         </p:nvSpPr>
         <p:spPr>
           <a:xfrm>
-            <a:off x="3059832" y="5517232"/>
+            <a:off x="3059832" y="5445804"/>
             <a:ext cx="360040" cy="215444"/>
           </a:xfrm>
           <a:prstGeom prst="rect">
@@ -6254,11 +7688,12 @@
           </a:bodyPr>
           <a:lstStyle/>
           <a:p>
-            <a:r>
-              <a:rPr lang="es-MX" sz="800" smtClean="0">
-                <a:latin typeface="Arial Narrow" panose="020B0606020202030204" pitchFamily="34" charset="0"/>
-              </a:rPr>
-              <a:t>xx</a:t>
+            <a:pPr>
+              <a:defRPr sz="800"/>
+            </a:pPr>
+            <a:r>
+              <a:rPr lang="es-MX" dirty="0" smtClean="0"/>
+              <a:t>x</a:t>
             </a:r>
             <a:endParaRPr lang="es-MX" sz="800" dirty="0">
               <a:latin typeface="Arial Narrow" panose="020B0606020202030204" pitchFamily="34" charset="0"/>
@@ -6274,7 +7709,7 @@
         </p:nvSpPr>
         <p:spPr>
           <a:xfrm>
-            <a:off x="3059832" y="5877272"/>
+            <a:off x="3059832" y="5805264"/>
             <a:ext cx="360040" cy="215444"/>
           </a:xfrm>
           <a:prstGeom prst="rect">
@@ -6288,11 +7723,12 @@
           </a:bodyPr>
           <a:lstStyle/>
           <a:p>
-            <a:r>
-              <a:rPr lang="es-MX" sz="800" smtClean="0">
-                <a:latin typeface="Arial Narrow" panose="020B0606020202030204" pitchFamily="34" charset="0"/>
-              </a:rPr>
-              <a:t>xx</a:t>
+            <a:pPr>
+              <a:defRPr sz="800"/>
+            </a:pPr>
+            <a:r>
+              <a:rPr lang="es-MX" dirty="0" smtClean="0"/>
+              <a:t>x</a:t>
             </a:r>
             <a:endParaRPr lang="es-MX" sz="800" dirty="0">
               <a:latin typeface="Arial Narrow" panose="020B0606020202030204" pitchFamily="34" charset="0"/>
@@ -6308,7 +7744,7 @@
         </p:nvSpPr>
         <p:spPr>
           <a:xfrm>
-            <a:off x="3059832" y="6237312"/>
+            <a:off x="3059832" y="6165304"/>
             <a:ext cx="360040" cy="215444"/>
           </a:xfrm>
           <a:prstGeom prst="rect">
@@ -6322,11 +7758,12 @@
           </a:bodyPr>
           <a:lstStyle/>
           <a:p>
-            <a:r>
-              <a:rPr lang="es-MX" sz="800" smtClean="0">
-                <a:latin typeface="Arial Narrow" panose="020B0606020202030204" pitchFamily="34" charset="0"/>
-              </a:rPr>
-              <a:t>xx</a:t>
+            <a:pPr>
+              <a:defRPr sz="800"/>
+            </a:pPr>
+            <a:r>
+              <a:rPr lang="es-MX" dirty="0" smtClean="0"/>
+              <a:t>x</a:t>
             </a:r>
             <a:endParaRPr lang="es-MX" sz="800" dirty="0">
               <a:latin typeface="Arial Narrow" panose="020B0606020202030204" pitchFamily="34" charset="0"/>
@@ -6356,10 +7793,11 @@
           </a:bodyPr>
           <a:lstStyle/>
           <a:p>
-            <a:r>
-              <a:rPr lang="es-MX" sz="800" smtClean="0">
-                <a:latin typeface="Arial Narrow" panose="020B0606020202030204" pitchFamily="34" charset="0"/>
-              </a:rPr>
+            <a:pPr>
+              <a:defRPr sz="800"/>
+            </a:pPr>
+            <a:r>
+              <a:rPr lang="es-MX" dirty="0" smtClean="0"/>
               <a:t>x</a:t>
             </a:r>
             <a:endParaRPr lang="es-MX" sz="800" dirty="0">
@@ -6390,10 +7828,11 @@
           </a:bodyPr>
           <a:lstStyle/>
           <a:p>
-            <a:r>
-              <a:rPr lang="es-MX" sz="800" smtClean="0">
-                <a:latin typeface="Arial Narrow" panose="020B0606020202030204" pitchFamily="34" charset="0"/>
-              </a:rPr>
+            <a:pPr>
+              <a:defRPr sz="800"/>
+            </a:pPr>
+            <a:r>
+              <a:rPr lang="es-MX" dirty="0" smtClean="0"/>
               <a:t>x</a:t>
             </a:r>
             <a:endParaRPr lang="es-MX" sz="800" dirty="0">
@@ -6410,7 +7849,7 @@
         </p:nvSpPr>
         <p:spPr>
           <a:xfrm>
-            <a:off x="7524328" y="4005064"/>
+            <a:off x="7524328" y="4077652"/>
             <a:ext cx="936104" cy="215444"/>
           </a:xfrm>
           <a:prstGeom prst="rect">
@@ -6424,10 +7863,11 @@
           </a:bodyPr>
           <a:lstStyle/>
           <a:p>
-            <a:r>
-              <a:rPr lang="es-MX" sz="800" smtClean="0">
-                <a:latin typeface="Arial Narrow" panose="020B0606020202030204" pitchFamily="34" charset="0"/>
-              </a:rPr>
+            <a:pPr>
+              <a:defRPr sz="800"/>
+            </a:pPr>
+            <a:r>
+              <a:rPr lang="es-MX" dirty="0" smtClean="0"/>
               <a:t>x</a:t>
             </a:r>
             <a:endParaRPr lang="es-MX" sz="800" dirty="0">
@@ -6444,7 +7884,7 @@
         </p:nvSpPr>
         <p:spPr>
           <a:xfrm>
-            <a:off x="7524328" y="4221088"/>
+            <a:off x="7524328" y="4293676"/>
             <a:ext cx="1008112" cy="215444"/>
           </a:xfrm>
           <a:prstGeom prst="rect">
@@ -6458,10 +7898,11 @@
           </a:bodyPr>
           <a:lstStyle/>
           <a:p>
-            <a:r>
-              <a:rPr lang="es-MX" sz="800" smtClean="0">
-                <a:latin typeface="Arial Narrow" panose="020B0606020202030204" pitchFamily="34" charset="0"/>
-              </a:rPr>
+            <a:pPr>
+              <a:defRPr sz="800"/>
+            </a:pPr>
+            <a:r>
+              <a:rPr lang="es-MX" dirty="0" smtClean="0"/>
               <a:t>x</a:t>
             </a:r>
             <a:endParaRPr lang="es-MX" sz="800" dirty="0">
@@ -6492,10 +7933,11 @@
           </a:bodyPr>
           <a:lstStyle/>
           <a:p>
-            <a:r>
-              <a:rPr lang="es-MX" sz="800" smtClean="0">
-                <a:latin typeface="Arial Narrow" panose="020B0606020202030204" pitchFamily="34" charset="0"/>
-              </a:rPr>
+            <a:pPr>
+              <a:defRPr sz="800"/>
+            </a:pPr>
+            <a:r>
+              <a:rPr lang="es-MX" dirty="0" smtClean="0"/>
               <a:t>x</a:t>
             </a:r>
             <a:endParaRPr lang="es-MX" sz="800" dirty="0">
@@ -6504,6 +7946,246 @@
           </a:p>
         </p:txBody>
       </p:sp>
+      <p:pic>
+        <p:nvPicPr>
+          <p:cNvPr id="56" name="55 Imagen"/>
+          <p:cNvPicPr>
+            <a:picLocks noChangeAspect="1"/>
+          </p:cNvPicPr>
+          <p:nvPr/>
+        </p:nvPicPr>
+        <p:blipFill>
+          <a:blip r:embed="rId2">
+            <a:extLst>
+              <a:ext uri="{28A0092B-C50C-407E-A947-70E740481C1C}">
+                <a14:useLocalDpi xmlns:a14="http://schemas.microsoft.com/office/drawing/2010/main" val="0"/>
+              </a:ext>
+            </a:extLst>
+          </a:blip>
+          <a:stretch>
+            <a:fillRect/>
+          </a:stretch>
+        </p:blipFill>
+        <p:spPr>
+          <a:xfrm>
+            <a:off x="686806" y="1988840"/>
+            <a:ext cx="1944463" cy="493735"/>
+          </a:xfrm>
+          <a:prstGeom prst="rect">
+            <a:avLst/>
+          </a:prstGeom>
+        </p:spPr>
+      </p:pic>
+      <p:pic>
+        <p:nvPicPr>
+          <p:cNvPr id="57" name="56 Imagen"/>
+          <p:cNvPicPr>
+            <a:picLocks noChangeAspect="1"/>
+          </p:cNvPicPr>
+          <p:nvPr/>
+        </p:nvPicPr>
+        <p:blipFill>
+          <a:blip r:embed="rId3">
+            <a:extLst>
+              <a:ext uri="{28A0092B-C50C-407E-A947-70E740481C1C}">
+                <a14:useLocalDpi xmlns:a14="http://schemas.microsoft.com/office/drawing/2010/main" val="0"/>
+              </a:ext>
+            </a:extLst>
+          </a:blip>
+          <a:stretch>
+            <a:fillRect/>
+          </a:stretch>
+        </p:blipFill>
+        <p:spPr>
+          <a:xfrm>
+            <a:off x="3707904" y="908720"/>
+            <a:ext cx="1944463" cy="493735"/>
+          </a:xfrm>
+          <a:prstGeom prst="rect">
+            <a:avLst/>
+          </a:prstGeom>
+        </p:spPr>
+      </p:pic>
+      <p:pic>
+        <p:nvPicPr>
+          <p:cNvPr id="59" name="58 Imagen"/>
+          <p:cNvPicPr>
+            <a:picLocks noChangeAspect="1"/>
+          </p:cNvPicPr>
+          <p:nvPr/>
+        </p:nvPicPr>
+        <p:blipFill>
+          <a:blip r:embed="rId4">
+            <a:extLst>
+              <a:ext uri="{28A0092B-C50C-407E-A947-70E740481C1C}">
+                <a14:useLocalDpi xmlns:a14="http://schemas.microsoft.com/office/drawing/2010/main" val="0"/>
+              </a:ext>
+            </a:extLst>
+          </a:blip>
+          <a:stretch>
+            <a:fillRect/>
+          </a:stretch>
+        </p:blipFill>
+        <p:spPr>
+          <a:xfrm>
+            <a:off x="3671653" y="2569194"/>
+            <a:ext cx="1944463" cy="493735"/>
+          </a:xfrm>
+          <a:prstGeom prst="rect">
+            <a:avLst/>
+          </a:prstGeom>
+        </p:spPr>
+      </p:pic>
+      <p:pic>
+        <p:nvPicPr>
+          <p:cNvPr id="60" name="59 Imagen"/>
+          <p:cNvPicPr>
+            <a:picLocks noChangeAspect="1"/>
+          </p:cNvPicPr>
+          <p:nvPr/>
+        </p:nvPicPr>
+        <p:blipFill>
+          <a:blip r:embed="rId5">
+            <a:extLst>
+              <a:ext uri="{28A0092B-C50C-407E-A947-70E740481C1C}">
+                <a14:useLocalDpi xmlns:a14="http://schemas.microsoft.com/office/drawing/2010/main" val="0"/>
+              </a:ext>
+            </a:extLst>
+          </a:blip>
+          <a:stretch>
+            <a:fillRect/>
+          </a:stretch>
+        </p:blipFill>
+        <p:spPr>
+          <a:xfrm>
+            <a:off x="3489762" y="3933056"/>
+            <a:ext cx="2450390" cy="493735"/>
+          </a:xfrm>
+          <a:prstGeom prst="rect">
+            <a:avLst/>
+          </a:prstGeom>
+        </p:spPr>
+      </p:pic>
+      <p:pic>
+        <p:nvPicPr>
+          <p:cNvPr id="61" name="60 Imagen"/>
+          <p:cNvPicPr>
+            <a:picLocks noChangeAspect="1"/>
+          </p:cNvPicPr>
+          <p:nvPr/>
+        </p:nvPicPr>
+        <p:blipFill>
+          <a:blip r:embed="rId6">
+            <a:extLst>
+              <a:ext uri="{28A0092B-C50C-407E-A947-70E740481C1C}">
+                <a14:useLocalDpi xmlns:a14="http://schemas.microsoft.com/office/drawing/2010/main" val="0"/>
+              </a:ext>
+            </a:extLst>
+          </a:blip>
+          <a:stretch>
+            <a:fillRect/>
+          </a:stretch>
+        </p:blipFill>
+        <p:spPr>
+          <a:xfrm>
+            <a:off x="6341255" y="942577"/>
+            <a:ext cx="2450390" cy="493735"/>
+          </a:xfrm>
+          <a:prstGeom prst="rect">
+            <a:avLst/>
+          </a:prstGeom>
+        </p:spPr>
+      </p:pic>
+      <p:pic>
+        <p:nvPicPr>
+          <p:cNvPr id="62" name="61 Imagen"/>
+          <p:cNvPicPr>
+            <a:picLocks noChangeAspect="1"/>
+          </p:cNvPicPr>
+          <p:nvPr/>
+        </p:nvPicPr>
+        <p:blipFill>
+          <a:blip r:embed="rId7">
+            <a:extLst>
+              <a:ext uri="{28A0092B-C50C-407E-A947-70E740481C1C}">
+                <a14:useLocalDpi xmlns:a14="http://schemas.microsoft.com/office/drawing/2010/main" val="0"/>
+              </a:ext>
+            </a:extLst>
+          </a:blip>
+          <a:stretch>
+            <a:fillRect/>
+          </a:stretch>
+        </p:blipFill>
+        <p:spPr>
+          <a:xfrm>
+            <a:off x="6372200" y="2353750"/>
+            <a:ext cx="2450390" cy="493735"/>
+          </a:xfrm>
+          <a:prstGeom prst="rect">
+            <a:avLst/>
+          </a:prstGeom>
+        </p:spPr>
+      </p:pic>
+      <p:pic>
+        <p:nvPicPr>
+          <p:cNvPr id="63" name="62 Imagen"/>
+          <p:cNvPicPr>
+            <a:picLocks noChangeAspect="1"/>
+          </p:cNvPicPr>
+          <p:nvPr/>
+        </p:nvPicPr>
+        <p:blipFill>
+          <a:blip r:embed="rId8">
+            <a:extLst>
+              <a:ext uri="{28A0092B-C50C-407E-A947-70E740481C1C}">
+                <a14:useLocalDpi xmlns:a14="http://schemas.microsoft.com/office/drawing/2010/main" val="0"/>
+              </a:ext>
+            </a:extLst>
+          </a:blip>
+          <a:stretch>
+            <a:fillRect/>
+          </a:stretch>
+        </p:blipFill>
+        <p:spPr>
+          <a:xfrm>
+            <a:off x="6372200" y="3694948"/>
+            <a:ext cx="2450390" cy="493735"/>
+          </a:xfrm>
+          <a:prstGeom prst="rect">
+            <a:avLst/>
+          </a:prstGeom>
+        </p:spPr>
+      </p:pic>
+      <p:pic>
+        <p:nvPicPr>
+          <p:cNvPr id="64" name="63 Imagen"/>
+          <p:cNvPicPr>
+            <a:picLocks noChangeAspect="1"/>
+          </p:cNvPicPr>
+          <p:nvPr/>
+        </p:nvPicPr>
+        <p:blipFill>
+          <a:blip r:embed="rId9">
+            <a:extLst>
+              <a:ext uri="{28A0092B-C50C-407E-A947-70E740481C1C}">
+                <a14:useLocalDpi xmlns:a14="http://schemas.microsoft.com/office/drawing/2010/main" val="0"/>
+              </a:ext>
+            </a:extLst>
+          </a:blip>
+          <a:stretch>
+            <a:fillRect/>
+          </a:stretch>
+        </p:blipFill>
+        <p:spPr>
+          <a:xfrm>
+            <a:off x="6366846" y="4931899"/>
+            <a:ext cx="2450390" cy="493735"/>
+          </a:xfrm>
+          <a:prstGeom prst="rect">
+            <a:avLst/>
+          </a:prstGeom>
+        </p:spPr>
+      </p:pic>
     </p:spTree>
     <p:extLst>
       <p:ext uri="{BB962C8B-B14F-4D97-AF65-F5344CB8AC3E}">
@@ -7092,4 +8774,289 @@
   <a:objectDefaults/>
   <a:extraClrSchemeLst/>
 </a:theme>
+</file>
+
+<file path=ppt/theme/theme3.xml><?xml version="1.0" encoding="utf-8"?>
+<a:theme xmlns:a="http://schemas.openxmlformats.org/drawingml/2006/main" name="Tema de Office">
+  <a:themeElements>
+    <a:clrScheme name="Office">
+      <a:dk1>
+        <a:sysClr val="windowText" lastClr="000000"/>
+      </a:dk1>
+      <a:lt1>
+        <a:sysClr val="window" lastClr="FFFFFF"/>
+      </a:lt1>
+      <a:dk2>
+        <a:srgbClr val="1F497D"/>
+      </a:dk2>
+      <a:lt2>
+        <a:srgbClr val="EEECE1"/>
+      </a:lt2>
+      <a:accent1>
+        <a:srgbClr val="4F81BD"/>
+      </a:accent1>
+      <a:accent2>
+        <a:srgbClr val="C0504D"/>
+      </a:accent2>
+      <a:accent3>
+        <a:srgbClr val="9BBB59"/>
+      </a:accent3>
+      <a:accent4>
+        <a:srgbClr val="8064A2"/>
+      </a:accent4>
+      <a:accent5>
+        <a:srgbClr val="4BACC6"/>
+      </a:accent5>
+      <a:accent6>
+        <a:srgbClr val="F79646"/>
+      </a:accent6>
+      <a:hlink>
+        <a:srgbClr val="0000FF"/>
+      </a:hlink>
+      <a:folHlink>
+        <a:srgbClr val="800080"/>
+      </a:folHlink>
+    </a:clrScheme>
+    <a:fontScheme name="Office">
+      <a:majorFont>
+        <a:latin typeface="Calibri"/>
+        <a:ea typeface=""/>
+        <a:cs typeface=""/>
+        <a:font script="Jpan" typeface="ＭＳ Ｐゴシック"/>
+        <a:font script="Hang" typeface="맑은 고딕"/>
+        <a:font script="Hans" typeface="宋体"/>
+        <a:font script="Hant" typeface="新細明體"/>
+        <a:font script="Arab" typeface="Times New Roman"/>
+        <a:font script="Hebr" typeface="Times New Roman"/>
+        <a:font script="Thai" typeface="Angsana New"/>
+        <a:font script="Ethi" typeface="Nyala"/>
+        <a:font script="Beng" typeface="Vrinda"/>
+        <a:font script="Gujr" typeface="Shruti"/>
+        <a:font script="Khmr" typeface="MoolBoran"/>
+        <a:font script="Knda" typeface="Tunga"/>
+        <a:font script="Guru" typeface="Raavi"/>
+        <a:font script="Cans" typeface="Euphemia"/>
+        <a:font script="Cher" typeface="Plantagenet Cherokee"/>
+        <a:font script="Yiii" typeface="Microsoft Yi Baiti"/>
+        <a:font script="Tibt" typeface="Microsoft Himalaya"/>
+        <a:font script="Thaa" typeface="MV Boli"/>
+        <a:font script="Deva" typeface="Mangal"/>
+        <a:font script="Telu" typeface="Gautami"/>
+        <a:font script="Taml" typeface="Latha"/>
+        <a:font script="Syrc" typeface="Estrangelo Edessa"/>
+        <a:font script="Orya" typeface="Kalinga"/>
+        <a:font script="Mlym" typeface="Kartika"/>
+        <a:font script="Laoo" typeface="DokChampa"/>
+        <a:font script="Sinh" typeface="Iskoola Pota"/>
+        <a:font script="Mong" typeface="Mongolian Baiti"/>
+        <a:font script="Viet" typeface="Times New Roman"/>
+        <a:font script="Uigh" typeface="Microsoft Uighur"/>
+        <a:font script="Geor" typeface="Sylfaen"/>
+      </a:majorFont>
+      <a:minorFont>
+        <a:latin typeface="Calibri"/>
+        <a:ea typeface=""/>
+        <a:cs typeface=""/>
+        <a:font script="Jpan" typeface="ＭＳ Ｐゴシック"/>
+        <a:font script="Hang" typeface="맑은 고딕"/>
+        <a:font script="Hans" typeface="宋体"/>
+        <a:font script="Hant" typeface="新細明體"/>
+        <a:font script="Arab" typeface="Arial"/>
+        <a:font script="Hebr" typeface="Arial"/>
+        <a:font script="Thai" typeface="Cordia New"/>
+        <a:font script="Ethi" typeface="Nyala"/>
+        <a:font script="Beng" typeface="Vrinda"/>
+        <a:font script="Gujr" typeface="Shruti"/>
+        <a:font script="Khmr" typeface="DaunPenh"/>
+        <a:font script="Knda" typeface="Tunga"/>
+        <a:font script="Guru" typeface="Raavi"/>
+        <a:font script="Cans" typeface="Euphemia"/>
+        <a:font script="Cher" typeface="Plantagenet Cherokee"/>
+        <a:font script="Yiii" typeface="Microsoft Yi Baiti"/>
+        <a:font script="Tibt" typeface="Microsoft Himalaya"/>
+        <a:font script="Thaa" typeface="MV Boli"/>
+        <a:font script="Deva" typeface="Mangal"/>
+        <a:font script="Telu" typeface="Gautami"/>
+        <a:font script="Taml" typeface="Latha"/>
+        <a:font script="Syrc" typeface="Estrangelo Edessa"/>
+        <a:font script="Orya" typeface="Kalinga"/>
+        <a:font script="Mlym" typeface="Kartika"/>
+        <a:font script="Laoo" typeface="DokChampa"/>
+        <a:font script="Sinh" typeface="Iskoola Pota"/>
+        <a:font script="Mong" typeface="Mongolian Baiti"/>
+        <a:font script="Viet" typeface="Arial"/>
+        <a:font script="Uigh" typeface="Microsoft Uighur"/>
+        <a:font script="Geor" typeface="Sylfaen"/>
+      </a:minorFont>
+    </a:fontScheme>
+    <a:fmtScheme name="Office">
+      <a:fillStyleLst>
+        <a:solidFill>
+          <a:schemeClr val="phClr"/>
+        </a:solidFill>
+        <a:gradFill rotWithShape="1">
+          <a:gsLst>
+            <a:gs pos="0">
+              <a:schemeClr val="phClr">
+                <a:tint val="50000"/>
+                <a:satMod val="300000"/>
+              </a:schemeClr>
+            </a:gs>
+            <a:gs pos="35000">
+              <a:schemeClr val="phClr">
+                <a:tint val="37000"/>
+                <a:satMod val="300000"/>
+              </a:schemeClr>
+            </a:gs>
+            <a:gs pos="100000">
+              <a:schemeClr val="phClr">
+                <a:tint val="15000"/>
+                <a:satMod val="350000"/>
+              </a:schemeClr>
+            </a:gs>
+          </a:gsLst>
+          <a:lin ang="16200000" scaled="1"/>
+        </a:gradFill>
+        <a:gradFill rotWithShape="1">
+          <a:gsLst>
+            <a:gs pos="0">
+              <a:schemeClr val="phClr">
+                <a:shade val="51000"/>
+                <a:satMod val="130000"/>
+              </a:schemeClr>
+            </a:gs>
+            <a:gs pos="80000">
+              <a:schemeClr val="phClr">
+                <a:shade val="93000"/>
+                <a:satMod val="130000"/>
+              </a:schemeClr>
+            </a:gs>
+            <a:gs pos="100000">
+              <a:schemeClr val="phClr">
+                <a:shade val="94000"/>
+                <a:satMod val="135000"/>
+              </a:schemeClr>
+            </a:gs>
+          </a:gsLst>
+          <a:lin ang="16200000" scaled="0"/>
+        </a:gradFill>
+      </a:fillStyleLst>
+      <a:lnStyleLst>
+        <a:ln w="9525" cap="flat" cmpd="sng" algn="ctr">
+          <a:solidFill>
+            <a:schemeClr val="phClr">
+              <a:shade val="95000"/>
+              <a:satMod val="105000"/>
+            </a:schemeClr>
+          </a:solidFill>
+          <a:prstDash val="solid"/>
+        </a:ln>
+        <a:ln w="25400" cap="flat" cmpd="sng" algn="ctr">
+          <a:solidFill>
+            <a:schemeClr val="phClr"/>
+          </a:solidFill>
+          <a:prstDash val="solid"/>
+        </a:ln>
+        <a:ln w="38100" cap="flat" cmpd="sng" algn="ctr">
+          <a:solidFill>
+            <a:schemeClr val="phClr"/>
+          </a:solidFill>
+          <a:prstDash val="solid"/>
+        </a:ln>
+      </a:lnStyleLst>
+      <a:effectStyleLst>
+        <a:effectStyle>
+          <a:effectLst>
+            <a:outerShdw blurRad="40000" dist="20000" dir="5400000" rotWithShape="0">
+              <a:srgbClr val="000000">
+                <a:alpha val="38000"/>
+              </a:srgbClr>
+            </a:outerShdw>
+          </a:effectLst>
+        </a:effectStyle>
+        <a:effectStyle>
+          <a:effectLst>
+            <a:outerShdw blurRad="40000" dist="23000" dir="5400000" rotWithShape="0">
+              <a:srgbClr val="000000">
+                <a:alpha val="35000"/>
+              </a:srgbClr>
+            </a:outerShdw>
+          </a:effectLst>
+        </a:effectStyle>
+        <a:effectStyle>
+          <a:effectLst>
+            <a:outerShdw blurRad="40000" dist="23000" dir="5400000" rotWithShape="0">
+              <a:srgbClr val="000000">
+                <a:alpha val="35000"/>
+              </a:srgbClr>
+            </a:outerShdw>
+          </a:effectLst>
+          <a:scene3d>
+            <a:camera prst="orthographicFront">
+              <a:rot lat="0" lon="0" rev="0"/>
+            </a:camera>
+            <a:lightRig rig="threePt" dir="t">
+              <a:rot lat="0" lon="0" rev="1200000"/>
+            </a:lightRig>
+          </a:scene3d>
+          <a:sp3d>
+            <a:bevelT w="63500" h="25400"/>
+          </a:sp3d>
+        </a:effectStyle>
+      </a:effectStyleLst>
+      <a:bgFillStyleLst>
+        <a:solidFill>
+          <a:schemeClr val="phClr"/>
+        </a:solidFill>
+        <a:gradFill rotWithShape="1">
+          <a:gsLst>
+            <a:gs pos="0">
+              <a:schemeClr val="phClr">
+                <a:tint val="40000"/>
+                <a:satMod val="350000"/>
+              </a:schemeClr>
+            </a:gs>
+            <a:gs pos="40000">
+              <a:schemeClr val="phClr">
+                <a:tint val="45000"/>
+                <a:shade val="99000"/>
+                <a:satMod val="350000"/>
+              </a:schemeClr>
+            </a:gs>
+            <a:gs pos="100000">
+              <a:schemeClr val="phClr">
+                <a:shade val="20000"/>
+                <a:satMod val="255000"/>
+              </a:schemeClr>
+            </a:gs>
+          </a:gsLst>
+          <a:path path="circle">
+            <a:fillToRect l="50000" t="-80000" r="50000" b="180000"/>
+          </a:path>
+        </a:gradFill>
+        <a:gradFill rotWithShape="1">
+          <a:gsLst>
+            <a:gs pos="0">
+              <a:schemeClr val="phClr">
+                <a:tint val="80000"/>
+                <a:satMod val="300000"/>
+              </a:schemeClr>
+            </a:gs>
+            <a:gs pos="100000">
+              <a:schemeClr val="phClr">
+                <a:shade val="30000"/>
+                <a:satMod val="200000"/>
+              </a:schemeClr>
+            </a:gs>
+          </a:gsLst>
+          <a:path path="circle">
+            <a:fillToRect l="50000" t="50000" r="50000" b="50000"/>
+          </a:path>
+        </a:gradFill>
+      </a:bgFillStyleLst>
+    </a:fmtScheme>
+  </a:themeElements>
+  <a:objectDefaults/>
+  <a:extraClrSchemeLst/>
+</a:theme>
 </file>
</xml_diff>

<commit_message>
formato correcto de ficha ey gran imagen
</commit_message>
<xml_diff>
--- a/obras/static/ppt/FichaTecnicaObras.pptx
+++ b/obras/static/ppt/FichaTecnicaObras.pptx
@@ -110,36 +110,6 @@
       </a:defRPr>
     </a:lvl9pPr>
   </p:defaultTextStyle>
-  <p:extLst>
-    <p:ext uri="{EFAFB233-063F-42B5-8137-9DF3F51BA10A}">
-      <p15:sldGuideLst xmlns:p15="http://schemas.microsoft.com/office/powerpoint/2012/main">
-        <p15:guide id="1" orient="horz" pos="2160">
-          <p15:clr>
-            <a:srgbClr val="A4A3A4"/>
-          </p15:clr>
-        </p15:guide>
-        <p15:guide id="2" pos="2880">
-          <p15:clr>
-            <a:srgbClr val="A4A3A4"/>
-          </p15:clr>
-        </p15:guide>
-      </p15:sldGuideLst>
-    </p:ext>
-    <p:ext uri="{2D200454-40CA-4A62-9FC3-DE9A4176ACB9}">
-      <p15:notesGuideLst xmlns:p15="http://schemas.microsoft.com/office/powerpoint/2012/main">
-        <p15:guide id="1" orient="horz" pos="2880">
-          <p15:clr>
-            <a:srgbClr val="A4A3A4"/>
-          </p15:clr>
-        </p15:guide>
-        <p15:guide id="2" pos="2160">
-          <p15:clr>
-            <a:srgbClr val="A4A3A4"/>
-          </p15:clr>
-        </p15:guide>
-      </p15:notesGuideLst>
-    </p:ext>
-  </p:extLst>
 </p:presentation>
 </file>
 
@@ -225,7 +195,7 @@
           <a:p>
             <a:fld id="{A12F159B-2BA9-4A4C-8F37-6A12CA4521B5}" type="datetimeFigureOut">
               <a:rPr lang="es-MX" smtClean="0"/>
-              <a:t>17/07/2015</a:t>
+              <a:t>01/09/2015</a:t>
             </a:fld>
             <a:endParaRPr lang="es-MX"/>
           </a:p>
@@ -390,7 +360,7 @@
           <a:p>
             <a:fld id="{E725DF0C-0434-4166-AFB2-E9FB5C8C5747}" type="datetimeFigureOut">
               <a:rPr lang="es-MX" smtClean="0"/>
-              <a:t>17/07/2015</a:t>
+              <a:t>01/09/2015</a:t>
             </a:fld>
             <a:endParaRPr lang="es-MX"/>
           </a:p>
@@ -845,7 +815,7 @@
           <a:p>
             <a:fld id="{F4C741E7-0659-46B3-91BB-B8C3B98C4B5D}" type="datetimeFigureOut">
               <a:rPr lang="es-MX" smtClean="0"/>
-              <a:t>17/07/2015</a:t>
+              <a:t>01/09/2015</a:t>
             </a:fld>
             <a:endParaRPr lang="es-MX"/>
           </a:p>
@@ -1038,7 +1008,7 @@
           <a:p>
             <a:fld id="{F4C741E7-0659-46B3-91BB-B8C3B98C4B5D}" type="datetimeFigureOut">
               <a:rPr lang="es-MX" smtClean="0"/>
-              <a:t>17/07/2015</a:t>
+              <a:t>01/09/2015</a:t>
             </a:fld>
             <a:endParaRPr lang="es-MX"/>
           </a:p>
@@ -1224,7 +1194,7 @@
           <a:p>
             <a:fld id="{F4C741E7-0659-46B3-91BB-B8C3B98C4B5D}" type="datetimeFigureOut">
               <a:rPr lang="es-MX" smtClean="0"/>
-              <a:t>17/07/2015</a:t>
+              <a:t>01/09/2015</a:t>
             </a:fld>
             <a:endParaRPr lang="es-MX"/>
           </a:p>
@@ -1410,7 +1380,7 @@
           <a:p>
             <a:fld id="{F4C741E7-0659-46B3-91BB-B8C3B98C4B5D}" type="datetimeFigureOut">
               <a:rPr lang="es-MX" smtClean="0"/>
-              <a:t>17/07/2015</a:t>
+              <a:t>01/09/2015</a:t>
             </a:fld>
             <a:endParaRPr lang="es-MX"/>
           </a:p>
@@ -1662,7 +1632,7 @@
           <a:p>
             <a:fld id="{F4C741E7-0659-46B3-91BB-B8C3B98C4B5D}" type="datetimeFigureOut">
               <a:rPr lang="es-MX" smtClean="0"/>
-              <a:t>17/07/2015</a:t>
+              <a:t>01/09/2015</a:t>
             </a:fld>
             <a:endParaRPr lang="es-MX"/>
           </a:p>
@@ -1964,7 +1934,7 @@
           <a:p>
             <a:fld id="{F4C741E7-0659-46B3-91BB-B8C3B98C4B5D}" type="datetimeFigureOut">
               <a:rPr lang="es-MX" smtClean="0"/>
-              <a:t>17/07/2015</a:t>
+              <a:t>01/09/2015</a:t>
             </a:fld>
             <a:endParaRPr lang="es-MX"/>
           </a:p>
@@ -2406,7 +2376,7 @@
           <a:p>
             <a:fld id="{F4C741E7-0659-46B3-91BB-B8C3B98C4B5D}" type="datetimeFigureOut">
               <a:rPr lang="es-MX" smtClean="0"/>
-              <a:t>17/07/2015</a:t>
+              <a:t>01/09/2015</a:t>
             </a:fld>
             <a:endParaRPr lang="es-MX"/>
           </a:p>
@@ -2532,7 +2502,7 @@
           <a:p>
             <a:fld id="{F4C741E7-0659-46B3-91BB-B8C3B98C4B5D}" type="datetimeFigureOut">
               <a:rPr lang="es-MX" smtClean="0"/>
-              <a:t>17/07/2015</a:t>
+              <a:t>01/09/2015</a:t>
             </a:fld>
             <a:endParaRPr lang="es-MX"/>
           </a:p>
@@ -2627,7 +2597,7 @@
           <a:p>
             <a:fld id="{F4C741E7-0659-46B3-91BB-B8C3B98C4B5D}" type="datetimeFigureOut">
               <a:rPr lang="es-MX" smtClean="0"/>
-              <a:t>17/07/2015</a:t>
+              <a:t>01/09/2015</a:t>
             </a:fld>
             <a:endParaRPr lang="es-MX"/>
           </a:p>
@@ -2913,7 +2883,7 @@
           <a:p>
             <a:fld id="{F4C741E7-0659-46B3-91BB-B8C3B98C4B5D}" type="datetimeFigureOut">
               <a:rPr lang="es-MX" smtClean="0"/>
-              <a:t>17/07/2015</a:t>
+              <a:t>01/09/2015</a:t>
             </a:fld>
             <a:endParaRPr lang="es-MX"/>
           </a:p>
@@ -3175,7 +3145,7 @@
           <a:p>
             <a:fld id="{F4C741E7-0659-46B3-91BB-B8C3B98C4B5D}" type="datetimeFigureOut">
               <a:rPr lang="es-MX" smtClean="0"/>
-              <a:t>17/07/2015</a:t>
+              <a:t>01/09/2015</a:t>
             </a:fld>
             <a:endParaRPr lang="es-MX"/>
           </a:p>
@@ -3293,7 +3263,7 @@
           <a:p>
             <a:fld id="{F4C741E7-0659-46B3-91BB-B8C3B98C4B5D}" type="datetimeFigureOut">
               <a:rPr lang="es-MX" smtClean="0"/>
-              <a:t>17/07/2015</a:t>
+              <a:t>01/09/2015</a:t>
             </a:fld>
             <a:endParaRPr lang="es-MX"/>
           </a:p>
@@ -3379,7 +3349,7 @@
       </p:sp>
       <p:pic>
         <p:nvPicPr>
-          <p:cNvPr id="1026" name="Picture 2"/>
+          <p:cNvPr id="1027" name="Picture 3"/>
           <p:cNvPicPr>
             <a:picLocks noChangeAspect="1" noChangeArrowheads="1"/>
           </p:cNvPicPr>
@@ -3400,71 +3370,7 @@
         </p:blipFill>
         <p:spPr bwMode="auto">
           <a:xfrm>
-            <a:off x="107504" y="116633"/>
-            <a:ext cx="1368152" cy="476687"/>
-          </a:xfrm>
-          <a:prstGeom prst="rect">
-            <a:avLst/>
-          </a:prstGeom>
-          <a:noFill/>
-          <a:ln>
-            <a:noFill/>
-          </a:ln>
-          <a:effectLst/>
-          <a:extLst>
-            <a:ext uri="{909E8E84-426E-40DD-AFC4-6F175D3DCCD1}">
-              <a14:hiddenFill xmlns:a14="http://schemas.microsoft.com/office/drawing/2010/main">
-                <a:solidFill>
-                  <a:schemeClr val="accent1"/>
-                </a:solidFill>
-              </a14:hiddenFill>
-            </a:ext>
-            <a:ext uri="{91240B29-F687-4F45-9708-019B960494DF}">
-              <a14:hiddenLine xmlns:a14="http://schemas.microsoft.com/office/drawing/2010/main" w="9525">
-                <a:solidFill>
-                  <a:schemeClr val="tx1"/>
-                </a:solidFill>
-                <a:miter lim="800000"/>
-                <a:headEnd/>
-                <a:tailEnd/>
-              </a14:hiddenLine>
-            </a:ext>
-            <a:ext uri="{AF507438-7753-43E0-B8FC-AC1667EBCBE1}">
-              <a14:hiddenEffects xmlns:a14="http://schemas.microsoft.com/office/drawing/2010/main">
-                <a:effectLst>
-                  <a:outerShdw dist="35921" dir="2700000" algn="ctr" rotWithShape="0">
-                    <a:schemeClr val="bg2"/>
-                  </a:outerShdw>
-                </a:effectLst>
-              </a14:hiddenEffects>
-            </a:ext>
-          </a:extLst>
-        </p:spPr>
-      </p:pic>
-      <p:pic>
-        <p:nvPicPr>
-          <p:cNvPr id="1027" name="Picture 3"/>
-          <p:cNvPicPr>
-            <a:picLocks noChangeAspect="1" noChangeArrowheads="1"/>
-          </p:cNvPicPr>
-          <p:nvPr userDrawn="1"/>
-        </p:nvPicPr>
-        <p:blipFill>
-          <a:blip r:embed="rId14">
-            <a:extLst>
-              <a:ext uri="{28A0092B-C50C-407E-A947-70E740481C1C}">
-                <a14:useLocalDpi xmlns:a14="http://schemas.microsoft.com/office/drawing/2010/main" val="0"/>
-              </a:ext>
-            </a:extLst>
-          </a:blip>
-          <a:srcRect/>
-          <a:stretch>
-            <a:fillRect/>
-          </a:stretch>
-        </p:blipFill>
-        <p:spPr bwMode="auto">
-          <a:xfrm>
-            <a:off x="0" y="631577"/>
+            <a:off x="0" y="620688"/>
             <a:ext cx="9144000" cy="205135"/>
           </a:xfrm>
           <a:prstGeom prst="rect">
@@ -3507,14 +3413,14 @@
       </p:pic>
       <p:pic>
         <p:nvPicPr>
-          <p:cNvPr id="12" name="11 Imagen"/>
+          <p:cNvPr id="3" name="2 Imagen"/>
           <p:cNvPicPr>
             <a:picLocks noChangeAspect="1"/>
           </p:cNvPicPr>
           <p:nvPr userDrawn="1"/>
         </p:nvPicPr>
         <p:blipFill>
-          <a:blip r:embed="rId15">
+          <a:blip r:embed="rId14">
             <a:extLst>
               <a:ext uri="{28A0092B-C50C-407E-A947-70E740481C1C}">
                 <a14:useLocalDpi xmlns:a14="http://schemas.microsoft.com/office/drawing/2010/main" val="0"/>
@@ -3527,8 +3433,37 @@
         </p:blipFill>
         <p:spPr>
           <a:xfrm>
-            <a:off x="4356293" y="225619"/>
-            <a:ext cx="4608195" cy="323061"/>
+            <a:off x="3817613" y="116632"/>
+            <a:ext cx="5290891" cy="475449"/>
+          </a:xfrm>
+          <a:prstGeom prst="rect">
+            <a:avLst/>
+          </a:prstGeom>
+        </p:spPr>
+      </p:pic>
+      <p:pic>
+        <p:nvPicPr>
+          <p:cNvPr id="7" name="6 Imagen"/>
+          <p:cNvPicPr>
+            <a:picLocks noChangeAspect="1"/>
+          </p:cNvPicPr>
+          <p:nvPr userDrawn="1"/>
+        </p:nvPicPr>
+        <p:blipFill rotWithShape="1">
+          <a:blip r:embed="rId15" cstate="print">
+            <a:extLst>
+              <a:ext uri="{28A0092B-C50C-407E-A947-70E740481C1C}">
+                <a14:useLocalDpi xmlns:a14="http://schemas.microsoft.com/office/drawing/2010/main" val="0"/>
+              </a:ext>
+            </a:extLst>
+          </a:blip>
+          <a:srcRect l="3735" t="27418" r="3494" b="26087"/>
+          <a:stretch/>
+        </p:blipFill>
+        <p:spPr>
+          <a:xfrm>
+            <a:off x="119917" y="47761"/>
+            <a:ext cx="1787787" cy="608312"/>
           </a:xfrm>
           <a:prstGeom prst="rect">
             <a:avLst/>
@@ -3842,14 +3777,14 @@
           <p:nvPr>
             <p:extLst>
               <p:ext uri="{D42A27DB-BD31-4B8C-83A1-F6EECF244321}">
-                <p14:modId xmlns:p14="http://schemas.microsoft.com/office/powerpoint/2010/main" val="931468680"/>
+                <p14:modId xmlns:p14="http://schemas.microsoft.com/office/powerpoint/2010/main" val="2688668618"/>
               </p:ext>
             </p:extLst>
           </p:nvPr>
         </p:nvGraphicFramePr>
         <p:xfrm>
           <a:off x="395536" y="1988840"/>
-          <a:ext cx="2555920" cy="4608513"/>
+          <a:ext cx="2555920" cy="4742126"/>
         </p:xfrm>
         <a:graphic>
           <a:graphicData uri="http://schemas.openxmlformats.org/drawingml/2006/table">
@@ -3942,14 +3877,14 @@
                     <a:bodyPr/>
                     <a:lstStyle/>
                     <a:p>
-                      <a:endParaRPr lang="es-MX" sz="800" dirty="0" smtClean="0"/>
+                      <a:endParaRPr lang="es-MX" sz="1000" dirty="0" smtClean="0"/>
                     </a:p>
                     <a:p>
                       <a:r>
-                        <a:rPr lang="es-MX" sz="800" dirty="0" smtClean="0"/>
+                        <a:rPr lang="es-MX" sz="1000" dirty="0" smtClean="0"/>
                         <a:t>Identificador de la obra</a:t>
                       </a:r>
-                      <a:endParaRPr lang="es-MX" sz="800" b="1" dirty="0">
+                      <a:endParaRPr lang="es-MX" sz="1000" b="1" dirty="0">
                         <a:latin typeface="Arial Narrow" panose="020B0606020202030204" pitchFamily="34" charset="0"/>
                       </a:endParaRPr>
                     </a:p>
@@ -3998,10 +3933,10 @@
                     <a:lstStyle/>
                     <a:p>
                       <a:r>
-                        <a:rPr lang="es-MX" sz="800" dirty="0" smtClean="0"/>
+                        <a:rPr lang="es-MX" sz="1000" dirty="0" smtClean="0"/>
                         <a:t>Denominación</a:t>
                       </a:r>
-                      <a:endParaRPr lang="es-MX" sz="800" b="1" dirty="0">
+                      <a:endParaRPr lang="es-MX" sz="1000" b="1" dirty="0">
                         <a:latin typeface="Arial Narrow" panose="020B0606020202030204" pitchFamily="34" charset="0"/>
                       </a:endParaRPr>
                     </a:p>
@@ -4050,10 +3985,10 @@
                     <a:lstStyle/>
                     <a:p>
                       <a:r>
-                        <a:rPr lang="es-MX" sz="800" dirty="0" smtClean="0"/>
+                        <a:rPr lang="es-MX" sz="1000" dirty="0" smtClean="0"/>
                         <a:t>Dependencia / Organismo</a:t>
                       </a:r>
-                      <a:endParaRPr lang="es-MX" sz="800" b="1" dirty="0">
+                      <a:endParaRPr lang="es-MX" sz="1000" b="1" dirty="0">
                         <a:latin typeface="Arial Narrow" panose="020B0606020202030204" pitchFamily="34" charset="0"/>
                       </a:endParaRPr>
                     </a:p>
@@ -4102,10 +4037,10 @@
                     <a:lstStyle/>
                     <a:p>
                       <a:r>
-                        <a:rPr lang="es-MX" sz="800" dirty="0" smtClean="0"/>
+                        <a:rPr lang="es-MX" sz="1000" dirty="0" smtClean="0"/>
                         <a:t>Estado</a:t>
                       </a:r>
-                      <a:endParaRPr lang="es-MX" sz="800" b="1" dirty="0">
+                      <a:endParaRPr lang="es-MX" sz="1000" b="1" dirty="0">
                         <a:latin typeface="Arial Narrow" panose="020B0606020202030204" pitchFamily="34" charset="0"/>
                       </a:endParaRPr>
                     </a:p>
@@ -4154,10 +4089,10 @@
                     <a:lstStyle/>
                     <a:p>
                       <a:r>
-                        <a:rPr lang="es-MX" sz="800" dirty="0" smtClean="0"/>
+                        <a:rPr lang="es-MX" sz="1000" dirty="0" smtClean="0"/>
                         <a:t>Municipio</a:t>
                       </a:r>
-                      <a:endParaRPr lang="es-MX" sz="800" b="1" dirty="0">
+                      <a:endParaRPr lang="es-MX" sz="1000" b="1" dirty="0">
                         <a:latin typeface="Arial Narrow" panose="020B0606020202030204" pitchFamily="34" charset="0"/>
                       </a:endParaRPr>
                     </a:p>
@@ -4206,14 +4141,14 @@
                     <a:lstStyle/>
                     <a:p>
                       <a:r>
-                        <a:rPr lang="es-MX" sz="800" dirty="0" smtClean="0"/>
+                        <a:rPr lang="es-MX" sz="1000" dirty="0" smtClean="0"/>
                         <a:t>Fecha</a:t>
                       </a:r>
                       <a:r>
-                        <a:rPr lang="es-MX" sz="800" baseline="0" dirty="0" smtClean="0"/>
+                        <a:rPr lang="es-MX" sz="1000" baseline="0" dirty="0" smtClean="0"/>
                         <a:t> de Inicio</a:t>
                       </a:r>
-                      <a:endParaRPr lang="es-MX" sz="800" b="1" dirty="0">
+                      <a:endParaRPr lang="es-MX" sz="1000" b="1" dirty="0">
                         <a:latin typeface="Arial Narrow" panose="020B0606020202030204" pitchFamily="34" charset="0"/>
                       </a:endParaRPr>
                     </a:p>
@@ -4262,10 +4197,10 @@
                     <a:lstStyle/>
                     <a:p>
                       <a:r>
-                        <a:rPr lang="es-MX" sz="800" dirty="0" smtClean="0"/>
+                        <a:rPr lang="es-MX" sz="1000" dirty="0" smtClean="0"/>
                         <a:t>Fecha de Término</a:t>
                       </a:r>
-                      <a:endParaRPr lang="es-MX" sz="800" b="1" dirty="0">
+                      <a:endParaRPr lang="es-MX" sz="1000" b="1" dirty="0">
                         <a:latin typeface="Arial Narrow" panose="020B0606020202030204" pitchFamily="34" charset="0"/>
                       </a:endParaRPr>
                     </a:p>
@@ -4314,10 +4249,10 @@
                     <a:lstStyle/>
                     <a:p>
                       <a:r>
-                        <a:rPr lang="es-MX" sz="800" dirty="0" smtClean="0"/>
+                        <a:rPr lang="es-MX" sz="1000" dirty="0" smtClean="0"/>
                         <a:t>Tipo de Obra</a:t>
                       </a:r>
-                      <a:endParaRPr lang="es-MX" sz="800" b="1" dirty="0">
+                      <a:endParaRPr lang="es-MX" sz="1000" b="1" dirty="0">
                         <a:latin typeface="Arial Narrow" panose="020B0606020202030204" pitchFamily="34" charset="0"/>
                       </a:endParaRPr>
                     </a:p>
@@ -4366,10 +4301,10 @@
                     <a:lstStyle/>
                     <a:p>
                       <a:r>
-                        <a:rPr lang="es-MX" sz="800" dirty="0" smtClean="0"/>
+                        <a:rPr lang="es-MX" sz="1000" dirty="0" smtClean="0"/>
                         <a:t>Avance</a:t>
                       </a:r>
-                      <a:endParaRPr lang="es-MX" sz="800" b="1" dirty="0">
+                      <a:endParaRPr lang="es-MX" sz="1000" b="1" dirty="0">
                         <a:latin typeface="Arial Narrow" panose="020B0606020202030204" pitchFamily="34" charset="0"/>
                       </a:endParaRPr>
                     </a:p>
@@ -4418,10 +4353,10 @@
                     <a:lstStyle/>
                     <a:p>
                       <a:r>
-                        <a:rPr lang="es-MX" sz="800" dirty="0" smtClean="0"/>
+                        <a:rPr lang="es-MX" sz="1000" dirty="0" smtClean="0"/>
                         <a:t>Fecha de Modificación</a:t>
                       </a:r>
-                      <a:endParaRPr lang="es-MX" sz="800" b="1" dirty="0">
+                      <a:endParaRPr lang="es-MX" sz="1000" b="1" dirty="0">
                         <a:latin typeface="Arial Narrow" panose="020B0606020202030204" pitchFamily="34" charset="0"/>
                       </a:endParaRPr>
                     </a:p>
@@ -4494,7 +4429,7 @@
           <p:nvPr>
             <p:extLst>
               <p:ext uri="{D42A27DB-BD31-4B8C-83A1-F6EECF244321}">
-                <p14:modId xmlns:p14="http://schemas.microsoft.com/office/powerpoint/2010/main" val="3238914376"/>
+                <p14:modId xmlns:p14="http://schemas.microsoft.com/office/powerpoint/2010/main" val="4116423866"/>
               </p:ext>
             </p:extLst>
           </p:nvPr>
@@ -4507,16 +4442,16 @@
           <a:graphicData uri="http://schemas.openxmlformats.org/drawingml/2006/table">
             <a:tbl>
               <a:tblPr firstRow="1" bandRow="1">
-                <a:tableStyleId>{5C22544A-7EE6-4342-B048-85BDC9FD1C3A}</a:tableStyleId>
+                <a:tableStyleId>{F5AB1C69-6EDB-4FF4-983F-18BD219EF322}</a:tableStyleId>
               </a:tblPr>
               <a:tblGrid>
-                <a:gridCol w="487680"/>
-                <a:gridCol w="313055"/>
-                <a:gridCol w="462280"/>
-                <a:gridCol w="313055"/>
+                <a:gridCol w="576064"/>
+                <a:gridCol w="224671"/>
+                <a:gridCol w="567055"/>
+                <a:gridCol w="208280"/>
                 <a:gridCol w="463068"/>
-                <a:gridCol w="129387"/>
-                <a:gridCol w="313055"/>
+                <a:gridCol w="234162"/>
+                <a:gridCol w="208280"/>
                 <a:gridCol w="529919"/>
                 <a:gridCol w="300869"/>
               </a:tblGrid>
@@ -4654,12 +4589,10 @@
                     <a:lstStyle/>
                     <a:p>
                       <a:r>
-                        <a:rPr lang="es-MX" sz="800" b="1" dirty="0" smtClean="0">
-                          <a:latin typeface="Arial Narrow" panose="020B0606020202030204" pitchFamily="34" charset="0"/>
-                        </a:rPr>
+                        <a:rPr lang="es-MX" sz="1000" dirty="0" smtClean="0"/>
                         <a:t>Federal</a:t>
                       </a:r>
-                      <a:endParaRPr lang="es-MX" sz="800" b="1" dirty="0">
+                      <a:endParaRPr lang="es-MX" sz="1000" b="1" dirty="0">
                         <a:latin typeface="Arial Narrow" panose="020B0606020202030204" pitchFamily="34" charset="0"/>
                       </a:endParaRPr>
                     </a:p>
@@ -4683,12 +4616,10 @@
                     <a:lstStyle/>
                     <a:p>
                       <a:r>
-                        <a:rPr lang="es-MX" sz="800" dirty="0" smtClean="0">
-                          <a:latin typeface="Arial Narrow" panose="020B0606020202030204" pitchFamily="34" charset="0"/>
-                        </a:rPr>
+                        <a:rPr lang="es-MX" sz="1000" dirty="0" smtClean="0"/>
                         <a:t> </a:t>
                       </a:r>
-                      <a:endParaRPr lang="es-MX" sz="800" dirty="0">
+                      <a:endParaRPr lang="es-MX" sz="1000" dirty="0">
                         <a:latin typeface="Arial Narrow" panose="020B0606020202030204" pitchFamily="34" charset="0"/>
                       </a:endParaRPr>
                     </a:p>
@@ -4703,12 +4634,10 @@
                     <a:lstStyle/>
                     <a:p>
                       <a:r>
-                        <a:rPr lang="es-MX" sz="800" b="1" dirty="0" smtClean="0">
-                          <a:latin typeface="Arial Narrow" panose="020B0606020202030204" pitchFamily="34" charset="0"/>
-                        </a:rPr>
+                        <a:rPr lang="es-MX" sz="1000" dirty="0" smtClean="0"/>
                         <a:t>Estatal</a:t>
                       </a:r>
-                      <a:endParaRPr lang="es-MX" sz="800" b="1" dirty="0">
+                      <a:endParaRPr lang="es-MX" sz="1000" b="1" dirty="0">
                         <a:latin typeface="Arial Narrow" panose="020B0606020202030204" pitchFamily="34" charset="0"/>
                       </a:endParaRPr>
                     </a:p>
@@ -4722,7 +4651,7 @@
                     <a:bodyPr/>
                     <a:lstStyle/>
                     <a:p>
-                      <a:endParaRPr lang="es-MX" sz="800" dirty="0">
+                      <a:endParaRPr lang="es-MX" sz="1000" dirty="0">
                         <a:latin typeface="Arial Narrow" panose="020B0606020202030204" pitchFamily="34" charset="0"/>
                       </a:endParaRPr>
                     </a:p>
@@ -4737,12 +4666,10 @@
                     <a:lstStyle/>
                     <a:p>
                       <a:r>
-                        <a:rPr lang="es-MX" sz="800" b="1" dirty="0" smtClean="0">
-                          <a:latin typeface="Arial Narrow" panose="020B0606020202030204" pitchFamily="34" charset="0"/>
-                        </a:rPr>
+                        <a:rPr lang="es-MX" sz="1000" dirty="0" smtClean="0"/>
                         <a:t>Municipal</a:t>
                       </a:r>
-                      <a:endParaRPr lang="es-MX" sz="800" b="1" dirty="0">
+                      <a:endParaRPr lang="es-MX" sz="1000" b="1" dirty="0">
                         <a:latin typeface="Arial Narrow" panose="020B0606020202030204" pitchFamily="34" charset="0"/>
                       </a:endParaRPr>
                     </a:p>
@@ -4766,7 +4693,7 @@
                     <a:bodyPr/>
                     <a:lstStyle/>
                     <a:p>
-                      <a:endParaRPr lang="es-MX" sz="800" dirty="0">
+                      <a:endParaRPr lang="es-MX" sz="1000" dirty="0">
                         <a:latin typeface="Arial Narrow" panose="020B0606020202030204" pitchFamily="34" charset="0"/>
                       </a:endParaRPr>
                     </a:p>
@@ -4781,12 +4708,10 @@
                     <a:lstStyle/>
                     <a:p>
                       <a:r>
-                        <a:rPr lang="es-MX" sz="800" b="1" dirty="0" smtClean="0">
-                          <a:latin typeface="Arial Narrow" panose="020B0606020202030204" pitchFamily="34" charset="0"/>
-                        </a:rPr>
+                        <a:rPr lang="es-MX" sz="1000" dirty="0" smtClean="0"/>
                         <a:t>Social</a:t>
                       </a:r>
-                      <a:endParaRPr lang="es-MX" sz="800" b="1" dirty="0">
+                      <a:endParaRPr lang="es-MX" sz="1000" b="1" dirty="0">
                         <a:latin typeface="Arial Narrow" panose="020B0606020202030204" pitchFamily="34" charset="0"/>
                       </a:endParaRPr>
                     </a:p>
@@ -4800,7 +4725,7 @@
                     <a:bodyPr/>
                     <a:lstStyle/>
                     <a:p>
-                      <a:endParaRPr lang="es-MX" sz="800" dirty="0">
+                      <a:endParaRPr lang="es-MX" sz="1000" dirty="0">
                         <a:latin typeface="Arial Narrow" panose="020B0606020202030204" pitchFamily="34" charset="0"/>
                       </a:endParaRPr>
                     </a:p>
@@ -4826,12 +4751,10 @@
                     <a:lstStyle/>
                     <a:p>
                       <a:r>
-                        <a:rPr lang="es-MX" sz="800" b="1" dirty="0" smtClean="0">
-                          <a:latin typeface="Arial Narrow" panose="020B0606020202030204" pitchFamily="34" charset="0"/>
-                        </a:rPr>
+                        <a:rPr lang="es-MX" sz="1000" dirty="0" smtClean="0"/>
                         <a:t>Privada</a:t>
                       </a:r>
-                      <a:endParaRPr lang="es-MX" sz="800" b="1" dirty="0">
+                      <a:endParaRPr lang="es-MX" sz="1000" b="1" dirty="0">
                         <a:latin typeface="Arial Narrow" panose="020B0606020202030204" pitchFamily="34" charset="0"/>
                       </a:endParaRPr>
                     </a:p>
@@ -4854,7 +4777,7 @@
                     <a:bodyPr/>
                     <a:lstStyle/>
                     <a:p>
-                      <a:endParaRPr lang="es-MX" sz="800" dirty="0">
+                      <a:endParaRPr lang="es-MX" sz="1000" dirty="0">
                         <a:latin typeface="Arial Narrow" panose="020B0606020202030204" pitchFamily="34" charset="0"/>
                       </a:endParaRPr>
                     </a:p>
@@ -4869,12 +4792,10 @@
                     <a:lstStyle/>
                     <a:p>
                       <a:r>
-                        <a:rPr lang="es-MX" sz="800" b="1" dirty="0" smtClean="0">
-                          <a:latin typeface="Arial Narrow" panose="020B0606020202030204" pitchFamily="34" charset="0"/>
-                        </a:rPr>
+                        <a:rPr lang="es-MX" sz="1000" dirty="0" smtClean="0"/>
                         <a:t>Otros</a:t>
                       </a:r>
-                      <a:endParaRPr lang="es-MX" sz="800" b="1" dirty="0">
+                      <a:endParaRPr lang="es-MX" sz="1000" b="1" dirty="0">
                         <a:latin typeface="Arial Narrow" panose="020B0606020202030204" pitchFamily="34" charset="0"/>
                       </a:endParaRPr>
                     </a:p>
@@ -4888,7 +4809,7 @@
                     <a:bodyPr/>
                     <a:lstStyle/>
                     <a:p>
-                      <a:endParaRPr lang="es-MX" sz="800" dirty="0">
+                      <a:endParaRPr lang="es-MX" sz="1000" dirty="0">
                         <a:latin typeface="Arial Narrow" panose="020B0606020202030204" pitchFamily="34" charset="0"/>
                       </a:endParaRPr>
                     </a:p>
@@ -4902,7 +4823,7 @@
                     <a:bodyPr/>
                     <a:lstStyle/>
                     <a:p>
-                      <a:endParaRPr lang="es-MX" sz="800" dirty="0">
+                      <a:endParaRPr lang="es-MX" sz="1000" dirty="0">
                         <a:latin typeface="Arial Narrow" panose="020B0606020202030204" pitchFamily="34" charset="0"/>
                       </a:endParaRPr>
                     </a:p>
@@ -4974,18 +4895,14 @@
                     <a:lstStyle/>
                     <a:p>
                       <a:r>
-                        <a:rPr lang="es-MX" sz="800" b="1" dirty="0" smtClean="0">
-                          <a:latin typeface="Arial Narrow" panose="020B0606020202030204" pitchFamily="34" charset="0"/>
-                        </a:rPr>
+                        <a:rPr lang="es-MX" sz="1000" dirty="0" smtClean="0"/>
                         <a:t>Inversión</a:t>
                       </a:r>
                       <a:r>
-                        <a:rPr lang="es-MX" sz="800" b="1" baseline="0" dirty="0" smtClean="0">
-                          <a:latin typeface="Arial Narrow" panose="020B0606020202030204" pitchFamily="34" charset="0"/>
-                        </a:rPr>
+                        <a:rPr lang="es-MX" sz="1000" baseline="0" dirty="0" smtClean="0"/>
                         <a:t> Total</a:t>
                       </a:r>
-                      <a:endParaRPr lang="es-MX" sz="800" b="1" dirty="0">
+                      <a:endParaRPr lang="es-MX" sz="1000" b="1" dirty="0">
                         <a:latin typeface="Arial Narrow" panose="020B0606020202030204" pitchFamily="34" charset="0"/>
                       </a:endParaRPr>
                     </a:p>
@@ -5029,7 +4946,7 @@
                     <a:bodyPr/>
                     <a:lstStyle/>
                     <a:p>
-                      <a:endParaRPr lang="es-MX" sz="800" b="0" dirty="0">
+                      <a:endParaRPr lang="es-MX" sz="1000" b="0" dirty="0">
                         <a:latin typeface="Arial Narrow" panose="020B0606020202030204" pitchFamily="34" charset="0"/>
                       </a:endParaRPr>
                     </a:p>
@@ -5076,7 +4993,7 @@
                     <a:bodyPr/>
                     <a:lstStyle/>
                     <a:p>
-                      <a:endParaRPr lang="es-MX" sz="800" dirty="0">
+                      <a:endParaRPr lang="es-MX" sz="1000" dirty="0">
                         <a:latin typeface="Arial Narrow" panose="020B0606020202030204" pitchFamily="34" charset="0"/>
                       </a:endParaRPr>
                     </a:p>
@@ -5147,14 +5064,14 @@
           <p:nvPr>
             <p:extLst>
               <p:ext uri="{D42A27DB-BD31-4B8C-83A1-F6EECF244321}">
-                <p14:modId xmlns:p14="http://schemas.microsoft.com/office/powerpoint/2010/main" val="3039941161"/>
+                <p14:modId xmlns:p14="http://schemas.microsoft.com/office/powerpoint/2010/main" val="1161424258"/>
               </p:ext>
             </p:extLst>
           </p:nvPr>
         </p:nvGraphicFramePr>
         <p:xfrm>
           <a:off x="3059832" y="2564904"/>
-          <a:ext cx="3312368" cy="1251357"/>
+          <a:ext cx="3312368" cy="1352398"/>
         </p:xfrm>
         <a:graphic>
           <a:graphicData uri="http://schemas.openxmlformats.org/drawingml/2006/table">
@@ -5230,13 +5147,13 @@
                     <a:lstStyle/>
                     <a:p>
                       <a:r>
-                        <a:rPr lang="es-MX" sz="800" b="1" dirty="0" smtClean="0">
-                          <a:latin typeface="Arial Narrow" panose="020B0606020202030204" pitchFamily="34" charset="0"/>
+                        <a:rPr lang="es-MX" sz="1000" b="0" dirty="0" smtClean="0">
+                          <a:latin typeface="+mj-lt"/>
                         </a:rPr>
                         <a:t>Población Objetivo</a:t>
                       </a:r>
-                      <a:endParaRPr lang="es-MX" sz="800" b="1" dirty="0">
-                        <a:latin typeface="Arial Narrow" panose="020B0606020202030204" pitchFamily="34" charset="0"/>
+                      <a:endParaRPr lang="es-MX" sz="1000" b="0" dirty="0">
+                        <a:latin typeface="+mj-lt"/>
                       </a:endParaRPr>
                     </a:p>
                   </a:txBody>
@@ -5284,13 +5201,13 @@
                     <a:lstStyle/>
                     <a:p>
                       <a:r>
-                        <a:rPr lang="es-MX" sz="800" b="1" dirty="0" smtClean="0">
-                          <a:latin typeface="Arial Narrow" panose="020B0606020202030204" pitchFamily="34" charset="0"/>
+                        <a:rPr lang="es-MX" sz="1000" b="0" dirty="0" smtClean="0">
+                          <a:latin typeface="+mj-lt"/>
                         </a:rPr>
                         <a:t>Impacto</a:t>
                       </a:r>
-                      <a:endParaRPr lang="es-MX" sz="800" b="1" dirty="0">
-                        <a:latin typeface="Arial Narrow" panose="020B0606020202030204" pitchFamily="34" charset="0"/>
+                      <a:endParaRPr lang="es-MX" sz="1000" b="0" dirty="0">
+                        <a:latin typeface="+mj-lt"/>
                       </a:endParaRPr>
                     </a:p>
                   </a:txBody>
@@ -5338,13 +5255,13 @@
                     <a:lstStyle/>
                     <a:p>
                       <a:r>
-                        <a:rPr lang="es-MX" sz="800" b="1" dirty="0" smtClean="0">
-                          <a:latin typeface="Arial Narrow" panose="020B0606020202030204" pitchFamily="34" charset="0"/>
+                        <a:rPr lang="es-MX" sz="1000" b="0" dirty="0" smtClean="0">
+                          <a:latin typeface="+mj-lt"/>
                         </a:rPr>
                         <a:t>Señalización</a:t>
                       </a:r>
-                      <a:endParaRPr lang="es-MX" sz="800" b="1" dirty="0">
-                        <a:latin typeface="Arial Narrow" panose="020B0606020202030204" pitchFamily="34" charset="0"/>
+                      <a:endParaRPr lang="es-MX" sz="1000" b="0" dirty="0">
+                        <a:latin typeface="+mj-lt"/>
                       </a:endParaRPr>
                     </a:p>
                   </a:txBody>
@@ -5416,14 +5333,14 @@
           <p:nvPr>
             <p:extLst>
               <p:ext uri="{D42A27DB-BD31-4B8C-83A1-F6EECF244321}">
-                <p14:modId xmlns:p14="http://schemas.microsoft.com/office/powerpoint/2010/main" val="3319330837"/>
+                <p14:modId xmlns:p14="http://schemas.microsoft.com/office/powerpoint/2010/main" val="3751331233"/>
               </p:ext>
             </p:extLst>
           </p:nvPr>
         </p:nvGraphicFramePr>
         <p:xfrm>
-          <a:off x="3059832" y="3933056"/>
-          <a:ext cx="3312368" cy="2633816"/>
+          <a:off x="3059832" y="4005065"/>
+          <a:ext cx="3312368" cy="2736303"/>
         </p:xfrm>
         <a:graphic>
           <a:graphicData uri="http://schemas.openxmlformats.org/drawingml/2006/table">
@@ -5436,7 +5353,7 @@
                 <a:gridCol w="1235393"/>
                 <a:gridCol w="1763920"/>
               </a:tblGrid>
-              <a:tr h="288032">
+              <a:tr h="376363">
                 <a:tc gridSpan="3">
                   <a:txBody>
                     <a:bodyPr/>
@@ -5503,7 +5420,7 @@
                   <a:tcPr/>
                 </a:tc>
               </a:tr>
-              <a:tr h="370840">
+              <a:tr h="407727">
                 <a:tc>
                   <a:txBody>
                     <a:bodyPr/>
@@ -5533,13 +5450,13 @@
                     <a:lstStyle/>
                     <a:p>
                       <a:r>
-                        <a:rPr lang="es-MX" sz="800" b="1" dirty="0" smtClean="0">
-                          <a:latin typeface="Arial Narrow" panose="020B0606020202030204" pitchFamily="34" charset="0"/>
+                        <a:rPr lang="es-MX" sz="1000" b="0" dirty="0" smtClean="0">
+                          <a:latin typeface="+mj-lt"/>
                         </a:rPr>
                         <a:t>Compromiso de Gobierno</a:t>
                       </a:r>
-                      <a:endParaRPr lang="es-MX" sz="800" b="1" dirty="0">
-                        <a:latin typeface="Arial Narrow" panose="020B0606020202030204" pitchFamily="34" charset="0"/>
+                      <a:endParaRPr lang="es-MX" sz="1000" b="0" dirty="0">
+                        <a:latin typeface="+mj-lt"/>
                       </a:endParaRPr>
                     </a:p>
                   </a:txBody>
@@ -5571,7 +5488,7 @@
                   </a:tcPr>
                 </a:tc>
               </a:tr>
-              <a:tr h="370840">
+              <a:tr h="381590">
                 <a:tc>
                   <a:txBody>
                     <a:bodyPr/>
@@ -5601,13 +5518,13 @@
                     <a:lstStyle/>
                     <a:p>
                       <a:r>
-                        <a:rPr lang="es-MX" sz="800" b="1" dirty="0" smtClean="0">
-                          <a:latin typeface="Arial Narrow" panose="020B0606020202030204" pitchFamily="34" charset="0"/>
+                        <a:rPr lang="es-MX" sz="1000" b="0" dirty="0" smtClean="0">
+                          <a:latin typeface="+mj-lt"/>
                         </a:rPr>
                         <a:t>Plan Nuevo Guerrero</a:t>
                       </a:r>
-                      <a:endParaRPr lang="es-MX" sz="800" b="1" dirty="0">
-                        <a:latin typeface="Arial Narrow" panose="020B0606020202030204" pitchFamily="34" charset="0"/>
+                      <a:endParaRPr lang="es-MX" sz="1000" b="0" dirty="0">
+                        <a:latin typeface="+mj-lt"/>
                       </a:endParaRPr>
                     </a:p>
                   </a:txBody>
@@ -5637,7 +5554,7 @@
                   <a:tcPr/>
                 </a:tc>
               </a:tr>
-              <a:tr h="370840">
+              <a:tr h="381590">
                 <a:tc>
                   <a:txBody>
                     <a:bodyPr/>
@@ -5667,13 +5584,13 @@
                     <a:lstStyle/>
                     <a:p>
                       <a:r>
-                        <a:rPr lang="es-MX" sz="800" b="1" dirty="0" smtClean="0">
-                          <a:latin typeface="Arial Narrow" panose="020B0606020202030204" pitchFamily="34" charset="0"/>
+                        <a:rPr lang="es-MX" sz="1000" b="0" dirty="0" smtClean="0">
+                          <a:latin typeface="+mj-lt"/>
                         </a:rPr>
                         <a:t>Plan Michoacán</a:t>
                       </a:r>
-                      <a:endParaRPr lang="es-MX" sz="800" b="1" dirty="0">
-                        <a:latin typeface="Arial Narrow" panose="020B0606020202030204" pitchFamily="34" charset="0"/>
+                      <a:endParaRPr lang="es-MX" sz="1000" b="0" dirty="0">
+                        <a:latin typeface="+mj-lt"/>
                       </a:endParaRPr>
                     </a:p>
                   </a:txBody>
@@ -5703,7 +5620,7 @@
                   <a:tcPr/>
                 </a:tc>
               </a:tr>
-              <a:tr h="370840">
+              <a:tr h="381590">
                 <a:tc>
                   <a:txBody>
                     <a:bodyPr/>
@@ -5733,13 +5650,13 @@
                     <a:lstStyle/>
                     <a:p>
                       <a:r>
-                        <a:rPr lang="es-MX" sz="800" b="1" dirty="0" smtClean="0">
-                          <a:latin typeface="Arial Narrow" panose="020B0606020202030204" pitchFamily="34" charset="0"/>
+                        <a:rPr lang="es-MX" sz="1000" b="0" dirty="0" smtClean="0">
+                          <a:latin typeface="+mj-lt"/>
                         </a:rPr>
                         <a:t>Plan Nacional de Infraestructura</a:t>
                       </a:r>
-                      <a:endParaRPr lang="es-MX" sz="800" b="1" dirty="0">
-                        <a:latin typeface="Arial Narrow" panose="020B0606020202030204" pitchFamily="34" charset="0"/>
+                      <a:endParaRPr lang="es-MX" sz="1000" b="0" dirty="0">
+                        <a:latin typeface="+mj-lt"/>
                       </a:endParaRPr>
                     </a:p>
                   </a:txBody>
@@ -5769,7 +5686,7 @@
                   <a:tcPr/>
                 </a:tc>
               </a:tr>
-              <a:tr h="370840">
+              <a:tr h="381590">
                 <a:tc>
                   <a:txBody>
                     <a:bodyPr/>
@@ -5799,13 +5716,13 @@
                     <a:lstStyle/>
                     <a:p>
                       <a:r>
-                        <a:rPr lang="es-MX" sz="800" b="1" dirty="0" smtClean="0">
-                          <a:latin typeface="Arial Narrow" panose="020B0606020202030204" pitchFamily="34" charset="0"/>
+                        <a:rPr lang="es-MX" sz="1000" b="0" dirty="0" smtClean="0">
+                          <a:latin typeface="+mj-lt"/>
                         </a:rPr>
                         <a:t>Cruzada Nacional contra el Hambre</a:t>
                       </a:r>
-                      <a:endParaRPr lang="es-MX" sz="800" b="1" dirty="0">
-                        <a:latin typeface="Arial Narrow" panose="020B0606020202030204" pitchFamily="34" charset="0"/>
+                      <a:endParaRPr lang="es-MX" sz="1000" b="0" dirty="0">
+                        <a:latin typeface="+mj-lt"/>
                       </a:endParaRPr>
                     </a:p>
                   </a:txBody>
@@ -5835,7 +5752,7 @@
                   <a:tcPr/>
                 </a:tc>
               </a:tr>
-              <a:tr h="413856">
+              <a:tr h="425853">
                 <a:tc>
                   <a:txBody>
                     <a:bodyPr/>
@@ -5874,13 +5791,13 @@
                     <a:lstStyle/>
                     <a:p>
                       <a:r>
-                        <a:rPr lang="es-MX" sz="800" b="1" dirty="0" smtClean="0">
-                          <a:latin typeface="Arial Narrow" panose="020B0606020202030204" pitchFamily="34" charset="0"/>
+                        <a:rPr lang="es-MX" sz="1000" b="0" dirty="0" smtClean="0">
+                          <a:latin typeface="+mj-lt"/>
                         </a:rPr>
                         <a:t>Otra clasificación</a:t>
                       </a:r>
-                      <a:endParaRPr lang="es-MX" sz="800" b="1" dirty="0">
-                        <a:latin typeface="Arial Narrow" panose="020B0606020202030204" pitchFamily="34" charset="0"/>
+                      <a:endParaRPr lang="es-MX" sz="1000" b="0" dirty="0">
+                        <a:latin typeface="+mj-lt"/>
                       </a:endParaRPr>
                     </a:p>
                   </a:txBody>
@@ -5932,7 +5849,7 @@
           <p:nvPr>
             <p:extLst>
               <p:ext uri="{D42A27DB-BD31-4B8C-83A1-F6EECF244321}">
-                <p14:modId xmlns:p14="http://schemas.microsoft.com/office/powerpoint/2010/main" val="3261177285"/>
+                <p14:modId xmlns:p14="http://schemas.microsoft.com/office/powerpoint/2010/main" val="1136383236"/>
               </p:ext>
             </p:extLst>
           </p:nvPr>
@@ -6185,14 +6102,14 @@
           <p:nvPr>
             <p:extLst>
               <p:ext uri="{D42A27DB-BD31-4B8C-83A1-F6EECF244321}">
-                <p14:modId xmlns:p14="http://schemas.microsoft.com/office/powerpoint/2010/main" val="1663516041"/>
+                <p14:modId xmlns:p14="http://schemas.microsoft.com/office/powerpoint/2010/main" val="71855369"/>
               </p:ext>
             </p:extLst>
           </p:nvPr>
         </p:nvGraphicFramePr>
         <p:xfrm>
-          <a:off x="6444208" y="3717032"/>
-          <a:ext cx="2304256" cy="1049640"/>
+          <a:off x="6444208" y="3645024"/>
+          <a:ext cx="2304256" cy="1428544"/>
         </p:xfrm>
         <a:graphic>
           <a:graphicData uri="http://schemas.openxmlformats.org/drawingml/2006/table">
@@ -6201,10 +6118,10 @@
                 <a:tableStyleId>{5C22544A-7EE6-4342-B048-85BDC9FD1C3A}</a:tableStyleId>
               </a:tblPr>
               <a:tblGrid>
-                <a:gridCol w="1152128"/>
-                <a:gridCol w="1152128"/>
+                <a:gridCol w="1368152"/>
+                <a:gridCol w="936104"/>
               </a:tblGrid>
-              <a:tr h="360040">
+              <a:tr h="418111">
                 <a:tc gridSpan="2">
                   <a:txBody>
                     <a:bodyPr/>
@@ -6261,20 +6178,20 @@
                   <a:tcPr/>
                 </a:tc>
               </a:tr>
-              <a:tr h="200948">
+              <a:tr h="278740">
                 <a:tc>
                   <a:txBody>
                     <a:bodyPr/>
                     <a:lstStyle/>
                     <a:p>
                       <a:r>
-                        <a:rPr lang="es-MX" sz="800" b="1" dirty="0" smtClean="0">
-                          <a:latin typeface="Arial Narrow" panose="020B0606020202030204" pitchFamily="34" charset="0"/>
+                        <a:rPr lang="es-MX" sz="1000" b="0" dirty="0" smtClean="0">
+                          <a:latin typeface="+mj-lt"/>
                         </a:rPr>
                         <a:t>Inaugurada</a:t>
                       </a:r>
-                      <a:endParaRPr lang="es-MX" sz="800" b="1" dirty="0">
-                        <a:latin typeface="Arial Narrow" panose="020B0606020202030204" pitchFamily="34" charset="0"/>
+                      <a:endParaRPr lang="es-MX" sz="1000" b="0" dirty="0">
+                        <a:latin typeface="+mj-lt"/>
                       </a:endParaRPr>
                     </a:p>
                   </a:txBody>
@@ -6315,20 +6232,20 @@
                   </a:tcPr>
                 </a:tc>
               </a:tr>
-              <a:tr h="229833">
+              <a:tr h="452953">
                 <a:tc>
                   <a:txBody>
                     <a:bodyPr/>
                     <a:lstStyle/>
                     <a:p>
                       <a:r>
-                        <a:rPr lang="es-MX" sz="800" b="1" dirty="0" smtClean="0">
-                          <a:latin typeface="Arial Narrow" panose="020B0606020202030204" pitchFamily="34" charset="0"/>
+                        <a:rPr lang="es-MX" sz="1000" b="0" dirty="0" smtClean="0">
+                          <a:latin typeface="+mj-lt"/>
                         </a:rPr>
                         <a:t>Susceptible a inaugurar</a:t>
                       </a:r>
-                      <a:endParaRPr lang="es-MX" sz="800" b="1" dirty="0">
-                        <a:latin typeface="Arial Narrow" panose="020B0606020202030204" pitchFamily="34" charset="0"/>
+                      <a:endParaRPr lang="es-MX" sz="1000" b="0" dirty="0">
+                        <a:latin typeface="+mj-lt"/>
                       </a:endParaRPr>
                     </a:p>
                   </a:txBody>
@@ -6369,20 +6286,20 @@
                   </a:tcPr>
                 </a:tc>
               </a:tr>
-              <a:tr h="240687">
+              <a:tr h="278740">
                 <a:tc>
                   <a:txBody>
                     <a:bodyPr/>
                     <a:lstStyle/>
                     <a:p>
                       <a:r>
-                        <a:rPr lang="es-MX" sz="800" b="1" dirty="0" smtClean="0">
-                          <a:latin typeface="Arial Narrow" panose="020B0606020202030204" pitchFamily="34" charset="0"/>
+                        <a:rPr lang="es-MX" sz="1000" b="0" dirty="0" smtClean="0">
+                          <a:latin typeface="+mj-lt"/>
                         </a:rPr>
                         <a:t>Cargo que inauguró</a:t>
                       </a:r>
-                      <a:endParaRPr lang="es-MX" sz="800" b="1" dirty="0">
-                        <a:latin typeface="Arial Narrow" panose="020B0606020202030204" pitchFamily="34" charset="0"/>
+                      <a:endParaRPr lang="es-MX" sz="1000" b="0" dirty="0">
+                        <a:latin typeface="+mj-lt"/>
                       </a:endParaRPr>
                     </a:p>
                   </a:txBody>
@@ -6454,13 +6371,13 @@
           <p:nvPr>
             <p:extLst>
               <p:ext uri="{D42A27DB-BD31-4B8C-83A1-F6EECF244321}">
-                <p14:modId xmlns:p14="http://schemas.microsoft.com/office/powerpoint/2010/main" val="3967446963"/>
+                <p14:modId xmlns:p14="http://schemas.microsoft.com/office/powerpoint/2010/main" val="101761822"/>
               </p:ext>
             </p:extLst>
           </p:nvPr>
         </p:nvGraphicFramePr>
         <p:xfrm>
-          <a:off x="6444208" y="4941168"/>
+          <a:off x="6444208" y="5115664"/>
           <a:ext cx="2304256" cy="1625704"/>
         </p:xfrm>
         <a:graphic>
@@ -6558,13 +6475,13 @@
                     <a:p>
                       <a:pPr algn="ctr"/>
                       <a:r>
-                        <a:rPr lang="es-MX" sz="800" dirty="0" smtClean="0">
-                          <a:latin typeface="Arial Narrow" panose="020B0606020202030204" pitchFamily="34" charset="0"/>
+                        <a:rPr lang="es-MX" sz="1000" dirty="0" smtClean="0">
+                          <a:latin typeface="+mj-lt"/>
                         </a:rPr>
                         <a:t>Antes</a:t>
                       </a:r>
-                      <a:endParaRPr lang="es-MX" sz="800" dirty="0">
-                        <a:latin typeface="Arial Narrow" panose="020B0606020202030204" pitchFamily="34" charset="0"/>
+                      <a:endParaRPr lang="es-MX" sz="1000" dirty="0">
+                        <a:latin typeface="+mj-lt"/>
                       </a:endParaRPr>
                     </a:p>
                   </a:txBody>
@@ -6615,13 +6532,13 @@
                     <a:p>
                       <a:pPr algn="ctr"/>
                       <a:r>
-                        <a:rPr lang="es-MX" sz="800" dirty="0" smtClean="0">
-                          <a:latin typeface="Arial Narrow" panose="020B0606020202030204" pitchFamily="34" charset="0"/>
+                        <a:rPr lang="es-MX" sz="1000" dirty="0" smtClean="0">
+                          <a:latin typeface="+mj-lt"/>
                         </a:rPr>
                         <a:t>Durante</a:t>
                       </a:r>
-                      <a:endParaRPr lang="es-MX" sz="800" dirty="0">
-                        <a:latin typeface="Arial Narrow" panose="020B0606020202030204" pitchFamily="34" charset="0"/>
+                      <a:endParaRPr lang="es-MX" sz="1000" dirty="0">
+                        <a:latin typeface="+mj-lt"/>
                       </a:endParaRPr>
                     </a:p>
                   </a:txBody>
@@ -6672,13 +6589,13 @@
                     <a:p>
                       <a:pPr algn="ctr"/>
                       <a:r>
-                        <a:rPr lang="es-MX" sz="800" dirty="0" smtClean="0">
-                          <a:latin typeface="Arial Narrow" panose="020B0606020202030204" pitchFamily="34" charset="0"/>
+                        <a:rPr lang="es-MX" sz="1000" dirty="0" smtClean="0">
+                          <a:latin typeface="+mj-lt"/>
                         </a:rPr>
                         <a:t>Después</a:t>
                       </a:r>
-                      <a:endParaRPr lang="es-MX" sz="800" dirty="0">
-                        <a:latin typeface="Arial Narrow" panose="020B0606020202030204" pitchFamily="34" charset="0"/>
+                      <a:endParaRPr lang="es-MX" sz="1000" dirty="0">
+                        <a:latin typeface="+mj-lt"/>
                       </a:endParaRPr>
                     </a:p>
                   </a:txBody>
@@ -6763,8 +6680,8 @@
         </p:nvSpPr>
         <p:spPr>
           <a:xfrm>
-            <a:off x="1547664" y="2492896"/>
-            <a:ext cx="1284618" cy="215444"/>
+            <a:off x="1547664" y="2606715"/>
+            <a:ext cx="1284618" cy="246221"/>
           </a:xfrm>
           <a:prstGeom prst="rect">
             <a:avLst/>
@@ -6781,10 +6698,10 @@
               <a:defRPr sz="800"/>
             </a:pPr>
             <a:r>
-              <a:rPr lang="es-MX" dirty="0" smtClean="0"/>
+              <a:rPr lang="es-MX" sz="1000" b="1" dirty="0"/>
               <a:t>x</a:t>
             </a:r>
-            <a:endParaRPr lang="es-MX" sz="800" dirty="0">
+            <a:endParaRPr lang="es-MX" sz="1000" b="1" dirty="0">
               <a:latin typeface="Arial Narrow" panose="020B0606020202030204" pitchFamily="34" charset="0"/>
             </a:endParaRPr>
           </a:p>
@@ -6798,8 +6715,8 @@
         </p:nvSpPr>
         <p:spPr>
           <a:xfrm>
-            <a:off x="1547664" y="2780928"/>
-            <a:ext cx="1440160" cy="215444"/>
+            <a:off x="1547664" y="2956882"/>
+            <a:ext cx="1440160" cy="246221"/>
           </a:xfrm>
           <a:prstGeom prst="rect">
             <a:avLst/>
@@ -6816,10 +6733,10 @@
               <a:defRPr sz="800"/>
             </a:pPr>
             <a:r>
-              <a:rPr lang="es-MX" dirty="0" smtClean="0"/>
+              <a:rPr lang="es-MX" sz="1000" b="1" dirty="0"/>
               <a:t>x</a:t>
             </a:r>
-            <a:endParaRPr lang="es-MX" sz="600" dirty="0">
+            <a:endParaRPr lang="es-MX" sz="800" b="1" dirty="0">
               <a:latin typeface="Arial Narrow" panose="020B0606020202030204" pitchFamily="34" charset="0"/>
             </a:endParaRPr>
           </a:p>
@@ -6833,8 +6750,8 @@
         </p:nvSpPr>
         <p:spPr>
           <a:xfrm>
-            <a:off x="1547664" y="3284984"/>
-            <a:ext cx="1284618" cy="215444"/>
+            <a:off x="1547664" y="3470231"/>
+            <a:ext cx="1284618" cy="246221"/>
           </a:xfrm>
           <a:prstGeom prst="rect">
             <a:avLst/>
@@ -6851,10 +6768,10 @@
               <a:defRPr sz="800"/>
             </a:pPr>
             <a:r>
-              <a:rPr lang="es-MX" dirty="0" smtClean="0"/>
+              <a:rPr lang="es-MX" sz="1000" b="1" dirty="0" smtClean="0"/>
               <a:t>x</a:t>
             </a:r>
-            <a:endParaRPr lang="es-MX" sz="800" dirty="0">
+            <a:endParaRPr lang="es-MX" sz="1000" b="1" dirty="0">
               <a:latin typeface="Arial Narrow" panose="020B0606020202030204" pitchFamily="34" charset="0"/>
             </a:endParaRPr>
           </a:p>
@@ -6868,8 +6785,8 @@
         </p:nvSpPr>
         <p:spPr>
           <a:xfrm>
-            <a:off x="1547664" y="3717612"/>
-            <a:ext cx="1201084" cy="215444"/>
+            <a:off x="1547664" y="3902859"/>
+            <a:ext cx="1201084" cy="246221"/>
           </a:xfrm>
           <a:prstGeom prst="rect">
             <a:avLst/>
@@ -6886,10 +6803,10 @@
               <a:defRPr sz="800"/>
             </a:pPr>
             <a:r>
-              <a:rPr lang="es-MX" dirty="0" smtClean="0"/>
+              <a:rPr lang="es-MX" sz="1000" b="1" dirty="0" smtClean="0"/>
               <a:t>x</a:t>
             </a:r>
-            <a:endParaRPr lang="es-MX" sz="800" dirty="0">
+            <a:endParaRPr lang="es-MX" sz="1000" b="1" dirty="0">
               <a:latin typeface="Arial Narrow" panose="020B0606020202030204" pitchFamily="34" charset="0"/>
             </a:endParaRPr>
           </a:p>
@@ -6903,8 +6820,8 @@
         </p:nvSpPr>
         <p:spPr>
           <a:xfrm>
-            <a:off x="1547664" y="4140957"/>
-            <a:ext cx="1117550" cy="215444"/>
+            <a:off x="1547664" y="4334907"/>
+            <a:ext cx="1117550" cy="246221"/>
           </a:xfrm>
           <a:prstGeom prst="rect">
             <a:avLst/>
@@ -6921,10 +6838,10 @@
               <a:defRPr sz="800"/>
             </a:pPr>
             <a:r>
-              <a:rPr lang="es-MX" dirty="0" smtClean="0"/>
+              <a:rPr lang="es-MX" sz="1000" b="1" dirty="0" smtClean="0"/>
               <a:t>x</a:t>
             </a:r>
-            <a:endParaRPr lang="es-MX" sz="800" dirty="0">
+            <a:endParaRPr lang="es-MX" sz="1000" b="1" dirty="0">
               <a:latin typeface="Arial Narrow" panose="020B0606020202030204" pitchFamily="34" charset="0"/>
             </a:endParaRPr>
           </a:p>
@@ -6938,8 +6855,8 @@
         </p:nvSpPr>
         <p:spPr>
           <a:xfrm>
-            <a:off x="1547664" y="4581128"/>
-            <a:ext cx="1117550" cy="215444"/>
+            <a:off x="1547664" y="4694947"/>
+            <a:ext cx="1117550" cy="246221"/>
           </a:xfrm>
           <a:prstGeom prst="rect">
             <a:avLst/>
@@ -6956,10 +6873,10 @@
               <a:defRPr sz="800"/>
             </a:pPr>
             <a:r>
-              <a:rPr lang="es-MX" dirty="0" smtClean="0"/>
+              <a:rPr lang="es-MX" sz="1000" b="1" dirty="0" smtClean="0"/>
               <a:t>x</a:t>
             </a:r>
-            <a:endParaRPr lang="es-MX" sz="800" dirty="0">
+            <a:endParaRPr lang="es-MX" sz="1000" b="1" dirty="0">
               <a:latin typeface="Arial Narrow" panose="020B0606020202030204" pitchFamily="34" charset="0"/>
             </a:endParaRPr>
           </a:p>
@@ -6973,8 +6890,8 @@
         </p:nvSpPr>
         <p:spPr>
           <a:xfrm>
-            <a:off x="1547664" y="5013176"/>
-            <a:ext cx="1201084" cy="215444"/>
+            <a:off x="1547664" y="5126995"/>
+            <a:ext cx="1201084" cy="246221"/>
           </a:xfrm>
           <a:prstGeom prst="rect">
             <a:avLst/>
@@ -6991,10 +6908,10 @@
               <a:defRPr sz="800"/>
             </a:pPr>
             <a:r>
-              <a:rPr lang="es-MX" dirty="0" smtClean="0"/>
+              <a:rPr lang="es-MX" sz="1000" b="1" dirty="0" smtClean="0"/>
               <a:t>x</a:t>
             </a:r>
-            <a:endParaRPr lang="es-MX" sz="800" dirty="0">
+            <a:endParaRPr lang="es-MX" sz="1000" b="1" dirty="0">
               <a:latin typeface="Arial Narrow" panose="020B0606020202030204" pitchFamily="34" charset="0"/>
             </a:endParaRPr>
           </a:p>
@@ -7008,8 +6925,8 @@
         </p:nvSpPr>
         <p:spPr>
           <a:xfrm>
-            <a:off x="1547664" y="5373216"/>
-            <a:ext cx="1117550" cy="215444"/>
+            <a:off x="1547664" y="5559043"/>
+            <a:ext cx="1117550" cy="246221"/>
           </a:xfrm>
           <a:prstGeom prst="rect">
             <a:avLst/>
@@ -7026,10 +6943,10 @@
               <a:defRPr sz="800"/>
             </a:pPr>
             <a:r>
-              <a:rPr lang="es-MX" dirty="0" smtClean="0"/>
+              <a:rPr lang="es-MX" sz="1000" b="1" dirty="0" smtClean="0"/>
               <a:t>x</a:t>
             </a:r>
-            <a:endParaRPr lang="es-MX" sz="800" dirty="0">
+            <a:endParaRPr lang="es-MX" sz="1000" b="1" dirty="0">
               <a:latin typeface="Arial Narrow" panose="020B0606020202030204" pitchFamily="34" charset="0"/>
             </a:endParaRPr>
           </a:p>
@@ -7043,8 +6960,8 @@
         </p:nvSpPr>
         <p:spPr>
           <a:xfrm>
-            <a:off x="1547664" y="5805264"/>
-            <a:ext cx="1201084" cy="215444"/>
+            <a:off x="1547664" y="5991091"/>
+            <a:ext cx="1201084" cy="246221"/>
           </a:xfrm>
           <a:prstGeom prst="rect">
             <a:avLst/>
@@ -7061,10 +6978,10 @@
               <a:defRPr sz="800"/>
             </a:pPr>
             <a:r>
-              <a:rPr lang="es-MX" dirty="0" smtClean="0"/>
+              <a:rPr lang="es-MX" sz="1000" b="1" dirty="0" smtClean="0"/>
               <a:t>x</a:t>
             </a:r>
-            <a:endParaRPr lang="es-MX" sz="800" dirty="0">
+            <a:endParaRPr lang="es-MX" sz="1000" b="1" dirty="0">
               <a:latin typeface="Arial Narrow" panose="020B0606020202030204" pitchFamily="34" charset="0"/>
             </a:endParaRPr>
           </a:p>
@@ -7078,8 +6995,8 @@
         </p:nvSpPr>
         <p:spPr>
           <a:xfrm>
-            <a:off x="1547664" y="6165304"/>
-            <a:ext cx="1368152" cy="215444"/>
+            <a:off x="1547664" y="6341258"/>
+            <a:ext cx="1368152" cy="246221"/>
           </a:xfrm>
           <a:prstGeom prst="rect">
             <a:avLst/>
@@ -7096,10 +7013,10 @@
               <a:defRPr sz="800"/>
             </a:pPr>
             <a:r>
-              <a:rPr lang="es-MX" dirty="0" smtClean="0"/>
+              <a:rPr lang="es-MX" sz="1000" b="1" dirty="0" smtClean="0"/>
               <a:t>x</a:t>
             </a:r>
-            <a:endParaRPr lang="es-MX" sz="800" dirty="0">
+            <a:endParaRPr lang="es-MX" sz="1000" b="1" dirty="0">
               <a:latin typeface="Arial Narrow" panose="020B0606020202030204" pitchFamily="34" charset="0"/>
             </a:endParaRPr>
           </a:p>
@@ -7113,8 +7030,8 @@
         </p:nvSpPr>
         <p:spPr>
           <a:xfrm>
-            <a:off x="3491880" y="1341348"/>
-            <a:ext cx="360040" cy="215444"/>
+            <a:off x="3563888" y="1268760"/>
+            <a:ext cx="360040" cy="246221"/>
           </a:xfrm>
           <a:prstGeom prst="rect">
             <a:avLst/>
@@ -7131,10 +7048,10 @@
               <a:defRPr sz="800"/>
             </a:pPr>
             <a:r>
-              <a:rPr lang="es-MX" dirty="0" smtClean="0"/>
+              <a:rPr lang="es-MX" sz="1000" b="1" dirty="0" smtClean="0"/>
               <a:t>x</a:t>
             </a:r>
-            <a:endParaRPr lang="es-MX" sz="800" dirty="0">
+            <a:endParaRPr lang="es-MX" sz="1000" b="1" dirty="0">
               <a:latin typeface="Arial Narrow" panose="020B0606020202030204" pitchFamily="34" charset="0"/>
             </a:endParaRPr>
           </a:p>
@@ -7148,8 +7065,8 @@
         </p:nvSpPr>
         <p:spPr>
           <a:xfrm>
-            <a:off x="4283968" y="1340768"/>
-            <a:ext cx="360040" cy="215444"/>
+            <a:off x="4283968" y="1268760"/>
+            <a:ext cx="360040" cy="246221"/>
           </a:xfrm>
           <a:prstGeom prst="rect">
             <a:avLst/>
@@ -7166,10 +7083,10 @@
               <a:defRPr sz="800"/>
             </a:pPr>
             <a:r>
-              <a:rPr lang="es-MX" dirty="0" smtClean="0"/>
+              <a:rPr lang="es-MX" sz="1000" b="1" dirty="0" smtClean="0"/>
               <a:t>x</a:t>
             </a:r>
-            <a:endParaRPr lang="es-MX" sz="800" dirty="0">
+            <a:endParaRPr lang="es-MX" sz="1000" b="1" dirty="0">
               <a:latin typeface="Arial Narrow" panose="020B0606020202030204" pitchFamily="34" charset="0"/>
             </a:endParaRPr>
           </a:p>
@@ -7183,8 +7100,8 @@
         </p:nvSpPr>
         <p:spPr>
           <a:xfrm>
-            <a:off x="5184068" y="1340768"/>
-            <a:ext cx="396044" cy="215444"/>
+            <a:off x="5256076" y="1268760"/>
+            <a:ext cx="396044" cy="246221"/>
           </a:xfrm>
           <a:prstGeom prst="rect">
             <a:avLst/>
@@ -7201,10 +7118,10 @@
               <a:defRPr sz="800"/>
             </a:pPr>
             <a:r>
-              <a:rPr lang="es-MX" dirty="0" smtClean="0"/>
+              <a:rPr lang="es-MX" sz="1000" b="1" dirty="0" smtClean="0"/>
               <a:t>x</a:t>
             </a:r>
-            <a:endParaRPr lang="es-MX" sz="800" dirty="0">
+            <a:endParaRPr lang="es-MX" sz="1000" b="1" dirty="0">
               <a:latin typeface="Arial Narrow" panose="020B0606020202030204" pitchFamily="34" charset="0"/>
             </a:endParaRPr>
           </a:p>
@@ -7218,8 +7135,8 @@
         </p:nvSpPr>
         <p:spPr>
           <a:xfrm>
-            <a:off x="6012160" y="1341348"/>
-            <a:ext cx="360040" cy="215444"/>
+            <a:off x="5940152" y="1268760"/>
+            <a:ext cx="360040" cy="246221"/>
           </a:xfrm>
           <a:prstGeom prst="rect">
             <a:avLst/>
@@ -7236,10 +7153,10 @@
               <a:defRPr sz="800"/>
             </a:pPr>
             <a:r>
-              <a:rPr lang="es-MX" dirty="0" smtClean="0"/>
+              <a:rPr lang="es-MX" sz="1000" b="1" dirty="0" smtClean="0"/>
               <a:t>x</a:t>
             </a:r>
-            <a:endParaRPr lang="es-MX" sz="800" dirty="0">
+            <a:endParaRPr lang="es-MX" sz="1000" b="1" dirty="0">
               <a:latin typeface="Arial Narrow" panose="020B0606020202030204" pitchFamily="34" charset="0"/>
             </a:endParaRPr>
           </a:p>
@@ -7253,8 +7170,8 @@
         </p:nvSpPr>
         <p:spPr>
           <a:xfrm>
-            <a:off x="3491880" y="1700808"/>
-            <a:ext cx="360040" cy="215444"/>
+            <a:off x="3563888" y="1670611"/>
+            <a:ext cx="360040" cy="246221"/>
           </a:xfrm>
           <a:prstGeom prst="rect">
             <a:avLst/>
@@ -7271,10 +7188,10 @@
               <a:defRPr sz="800"/>
             </a:pPr>
             <a:r>
-              <a:rPr lang="es-MX" dirty="0" smtClean="0"/>
+              <a:rPr lang="es-MX" sz="1000" b="1" dirty="0" smtClean="0"/>
               <a:t>x</a:t>
             </a:r>
-            <a:endParaRPr lang="es-MX" sz="800" dirty="0">
+            <a:endParaRPr lang="es-MX" sz="1000" b="1" dirty="0">
               <a:latin typeface="Arial Narrow" panose="020B0606020202030204" pitchFamily="34" charset="0"/>
             </a:endParaRPr>
           </a:p>
@@ -7288,8 +7205,8 @@
         </p:nvSpPr>
         <p:spPr>
           <a:xfrm>
-            <a:off x="4283968" y="1700808"/>
-            <a:ext cx="360040" cy="215444"/>
+            <a:off x="4283968" y="1670611"/>
+            <a:ext cx="360040" cy="246221"/>
           </a:xfrm>
           <a:prstGeom prst="rect">
             <a:avLst/>
@@ -7306,10 +7223,10 @@
               <a:defRPr sz="800"/>
             </a:pPr>
             <a:r>
-              <a:rPr lang="es-MX" dirty="0" smtClean="0"/>
+              <a:rPr lang="es-MX" sz="1000" b="1" dirty="0" smtClean="0"/>
               <a:t>x</a:t>
             </a:r>
-            <a:endParaRPr lang="es-MX" sz="800" dirty="0">
+            <a:endParaRPr lang="es-MX" sz="1000" b="1" dirty="0">
               <a:latin typeface="Arial Narrow" panose="020B0606020202030204" pitchFamily="34" charset="0"/>
             </a:endParaRPr>
           </a:p>
@@ -7323,8 +7240,8 @@
         </p:nvSpPr>
         <p:spPr>
           <a:xfrm>
-            <a:off x="4572000" y="1700808"/>
-            <a:ext cx="1656184" cy="215444"/>
+            <a:off x="4572000" y="1670611"/>
+            <a:ext cx="1656184" cy="246221"/>
           </a:xfrm>
           <a:prstGeom prst="rect">
             <a:avLst/>
@@ -7341,10 +7258,10 @@
               <a:defRPr sz="800"/>
             </a:pPr>
             <a:r>
-              <a:rPr lang="es-MX" dirty="0" smtClean="0"/>
+              <a:rPr lang="es-MX" sz="1000" b="1" dirty="0" smtClean="0"/>
               <a:t>x</a:t>
             </a:r>
-            <a:endParaRPr lang="es-MX" sz="800" dirty="0">
+            <a:endParaRPr lang="es-MX" sz="1000" b="1" dirty="0">
               <a:latin typeface="Arial Narrow" panose="020B0606020202030204" pitchFamily="34" charset="0"/>
             </a:endParaRPr>
           </a:p>
@@ -7358,8 +7275,8 @@
         </p:nvSpPr>
         <p:spPr>
           <a:xfrm>
-            <a:off x="3851920" y="2205444"/>
-            <a:ext cx="1224136" cy="215444"/>
+            <a:off x="3851920" y="2107530"/>
+            <a:ext cx="1224136" cy="246221"/>
           </a:xfrm>
           <a:prstGeom prst="rect">
             <a:avLst/>
@@ -7376,10 +7293,10 @@
               <a:defRPr sz="800"/>
             </a:pPr>
             <a:r>
-              <a:rPr lang="es-MX" dirty="0" smtClean="0"/>
+              <a:rPr lang="es-MX" sz="1000" b="1" dirty="0" smtClean="0"/>
               <a:t>x</a:t>
             </a:r>
-            <a:endParaRPr lang="es-MX" sz="800" dirty="0">
+            <a:endParaRPr lang="es-MX" sz="1000" b="1" dirty="0">
               <a:latin typeface="Arial Narrow" panose="020B0606020202030204" pitchFamily="34" charset="0"/>
             </a:endParaRPr>
           </a:p>
@@ -7393,8 +7310,8 @@
         </p:nvSpPr>
         <p:spPr>
           <a:xfrm>
-            <a:off x="5076056" y="2205444"/>
-            <a:ext cx="1080120" cy="215444"/>
+            <a:off x="5076056" y="2107530"/>
+            <a:ext cx="1080120" cy="246221"/>
           </a:xfrm>
           <a:prstGeom prst="rect">
             <a:avLst/>
@@ -7411,10 +7328,10 @@
               <a:defRPr sz="800"/>
             </a:pPr>
             <a:r>
-              <a:rPr lang="es-MX" dirty="0" smtClean="0"/>
+              <a:rPr lang="es-MX" sz="1000" b="1" dirty="0" smtClean="0"/>
               <a:t>x</a:t>
             </a:r>
-            <a:endParaRPr lang="es-MX" sz="800" dirty="0">
+            <a:endParaRPr lang="es-MX" sz="1000" b="1" dirty="0">
               <a:latin typeface="Arial Narrow" panose="020B0606020202030204" pitchFamily="34" charset="0"/>
             </a:endParaRPr>
           </a:p>
@@ -7428,8 +7345,8 @@
         </p:nvSpPr>
         <p:spPr>
           <a:xfrm>
-            <a:off x="4067944" y="2924944"/>
-            <a:ext cx="2088232" cy="215444"/>
+            <a:off x="4067944" y="2996952"/>
+            <a:ext cx="2088232" cy="246221"/>
           </a:xfrm>
           <a:prstGeom prst="rect">
             <a:avLst/>
@@ -7446,10 +7363,10 @@
               <a:defRPr sz="800"/>
             </a:pPr>
             <a:r>
-              <a:rPr lang="es-MX" dirty="0" smtClean="0"/>
+              <a:rPr lang="es-MX" sz="1000" b="1" dirty="0" smtClean="0"/>
               <a:t>x</a:t>
             </a:r>
-            <a:endParaRPr lang="es-MX" sz="800" dirty="0">
+            <a:endParaRPr lang="es-MX" sz="1000" b="1" dirty="0">
               <a:latin typeface="Arial Narrow" panose="020B0606020202030204" pitchFamily="34" charset="0"/>
             </a:endParaRPr>
           </a:p>
@@ -7463,8 +7380,8 @@
         </p:nvSpPr>
         <p:spPr>
           <a:xfrm>
-            <a:off x="4067944" y="3212976"/>
-            <a:ext cx="2088232" cy="215444"/>
+            <a:off x="4067944" y="3326795"/>
+            <a:ext cx="2088232" cy="246221"/>
           </a:xfrm>
           <a:prstGeom prst="rect">
             <a:avLst/>
@@ -7481,10 +7398,10 @@
               <a:defRPr sz="800"/>
             </a:pPr>
             <a:r>
-              <a:rPr lang="es-MX" dirty="0" smtClean="0"/>
+              <a:rPr lang="es-MX" sz="1000" b="1" dirty="0" smtClean="0"/>
               <a:t>x</a:t>
             </a:r>
-            <a:endParaRPr lang="es-MX" sz="800" dirty="0">
+            <a:endParaRPr lang="es-MX" sz="1000" b="1" dirty="0">
               <a:latin typeface="Arial Narrow" panose="020B0606020202030204" pitchFamily="34" charset="0"/>
             </a:endParaRPr>
           </a:p>
@@ -7498,8 +7415,8 @@
         </p:nvSpPr>
         <p:spPr>
           <a:xfrm>
-            <a:off x="4067944" y="3501008"/>
-            <a:ext cx="2088232" cy="215444"/>
+            <a:off x="4067944" y="3614827"/>
+            <a:ext cx="2088232" cy="246221"/>
           </a:xfrm>
           <a:prstGeom prst="rect">
             <a:avLst/>
@@ -7516,10 +7433,10 @@
               <a:defRPr sz="800"/>
             </a:pPr>
             <a:r>
-              <a:rPr lang="es-MX" dirty="0" smtClean="0"/>
+              <a:rPr lang="es-MX" sz="1000" b="1" dirty="0" smtClean="0"/>
               <a:t>x</a:t>
             </a:r>
-            <a:endParaRPr lang="es-MX" sz="800" dirty="0">
+            <a:endParaRPr lang="es-MX" sz="1000" b="1" dirty="0">
               <a:latin typeface="Arial Narrow" panose="020B0606020202030204" pitchFamily="34" charset="0"/>
             </a:endParaRPr>
           </a:p>
@@ -7533,8 +7450,8 @@
         </p:nvSpPr>
         <p:spPr>
           <a:xfrm>
-            <a:off x="3059832" y="4293096"/>
-            <a:ext cx="432048" cy="215444"/>
+            <a:off x="3059832" y="4448726"/>
+            <a:ext cx="432048" cy="246221"/>
           </a:xfrm>
           <a:prstGeom prst="rect">
             <a:avLst/>
@@ -7551,10 +7468,10 @@
               <a:defRPr sz="800"/>
             </a:pPr>
             <a:r>
-              <a:rPr lang="es-MX" dirty="0" smtClean="0"/>
+              <a:rPr lang="es-MX" sz="1000" b="1" dirty="0" smtClean="0"/>
               <a:t>x</a:t>
             </a:r>
-            <a:endParaRPr lang="es-MX" sz="800" dirty="0">
+            <a:endParaRPr lang="es-MX" sz="1000" b="1" dirty="0">
               <a:latin typeface="Arial Narrow" panose="020B0606020202030204" pitchFamily="34" charset="0"/>
             </a:endParaRPr>
           </a:p>
@@ -7568,8 +7485,8 @@
         </p:nvSpPr>
         <p:spPr>
           <a:xfrm>
-            <a:off x="4572000" y="4293096"/>
-            <a:ext cx="1584176" cy="215444"/>
+            <a:off x="4644008" y="4464114"/>
+            <a:ext cx="1584176" cy="246221"/>
           </a:xfrm>
           <a:prstGeom prst="rect">
             <a:avLst/>
@@ -7583,14 +7500,14 @@
           <a:lstStyle/>
           <a:p>
             <a:r>
-              <a:rPr lang="es-MX" sz="800" smtClean="0">
-                <a:latin typeface="Arial Narrow" panose="020B0606020202030204" pitchFamily="34" charset="0"/>
+              <a:rPr lang="es-MX" sz="1000" b="1" dirty="0" smtClean="0">
+                <a:latin typeface="+mj-lt"/>
                 <a:cs typeface="Angsana New" panose="02020603050405020304" pitchFamily="18" charset="-34"/>
               </a:rPr>
               <a:t>x</a:t>
             </a:r>
-            <a:endParaRPr lang="es-MX" sz="800" dirty="0">
-              <a:latin typeface="Arial Narrow" panose="020B0606020202030204" pitchFamily="34" charset="0"/>
+            <a:endParaRPr lang="es-MX" sz="1000" b="1" dirty="0">
+              <a:latin typeface="+mj-lt"/>
               <a:cs typeface="Angsana New" panose="02020603050405020304" pitchFamily="18" charset="-34"/>
             </a:endParaRPr>
           </a:p>
@@ -7604,8 +7521,8 @@
         </p:nvSpPr>
         <p:spPr>
           <a:xfrm>
-            <a:off x="3059832" y="4653136"/>
-            <a:ext cx="432048" cy="215444"/>
+            <a:off x="3059832" y="4797152"/>
+            <a:ext cx="432048" cy="246221"/>
           </a:xfrm>
           <a:prstGeom prst="rect">
             <a:avLst/>
@@ -7622,10 +7539,10 @@
               <a:defRPr sz="800"/>
             </a:pPr>
             <a:r>
-              <a:rPr lang="es-MX" dirty="0" smtClean="0"/>
+              <a:rPr lang="es-MX" sz="1000" b="1" dirty="0" smtClean="0"/>
               <a:t>x</a:t>
             </a:r>
-            <a:endParaRPr lang="es-MX" sz="800" dirty="0">
+            <a:endParaRPr lang="es-MX" sz="1000" b="1" dirty="0">
               <a:latin typeface="Arial Narrow" panose="020B0606020202030204" pitchFamily="34" charset="0"/>
             </a:endParaRPr>
           </a:p>
@@ -7639,8 +7556,8 @@
         </p:nvSpPr>
         <p:spPr>
           <a:xfrm>
-            <a:off x="3059832" y="5013176"/>
-            <a:ext cx="360040" cy="215444"/>
+            <a:off x="3059832" y="5157192"/>
+            <a:ext cx="360040" cy="246221"/>
           </a:xfrm>
           <a:prstGeom prst="rect">
             <a:avLst/>
@@ -7657,10 +7574,10 @@
               <a:defRPr sz="800"/>
             </a:pPr>
             <a:r>
-              <a:rPr lang="es-MX" dirty="0" smtClean="0"/>
+              <a:rPr lang="es-MX" sz="1000" b="1" dirty="0" smtClean="0"/>
               <a:t>x</a:t>
             </a:r>
-            <a:endParaRPr lang="es-MX" sz="800" dirty="0">
+            <a:endParaRPr lang="es-MX" sz="1000" b="1" dirty="0">
               <a:latin typeface="Arial Narrow" panose="020B0606020202030204" pitchFamily="34" charset="0"/>
             </a:endParaRPr>
           </a:p>
@@ -7674,8 +7591,8 @@
         </p:nvSpPr>
         <p:spPr>
           <a:xfrm>
-            <a:off x="3059832" y="5445804"/>
-            <a:ext cx="360040" cy="215444"/>
+            <a:off x="3059832" y="5547332"/>
+            <a:ext cx="360040" cy="246221"/>
           </a:xfrm>
           <a:prstGeom prst="rect">
             <a:avLst/>
@@ -7692,10 +7609,10 @@
               <a:defRPr sz="800"/>
             </a:pPr>
             <a:r>
-              <a:rPr lang="es-MX" dirty="0" smtClean="0"/>
+              <a:rPr lang="es-MX" sz="1000" b="1" dirty="0" smtClean="0"/>
               <a:t>x</a:t>
             </a:r>
-            <a:endParaRPr lang="es-MX" sz="800" dirty="0">
+            <a:endParaRPr lang="es-MX" sz="1000" b="1" dirty="0">
               <a:latin typeface="Arial Narrow" panose="020B0606020202030204" pitchFamily="34" charset="0"/>
             </a:endParaRPr>
           </a:p>
@@ -7709,8 +7626,8 @@
         </p:nvSpPr>
         <p:spPr>
           <a:xfrm>
-            <a:off x="3059832" y="5805264"/>
-            <a:ext cx="360040" cy="215444"/>
+            <a:off x="3059832" y="5919083"/>
+            <a:ext cx="360040" cy="246221"/>
           </a:xfrm>
           <a:prstGeom prst="rect">
             <a:avLst/>
@@ -7727,10 +7644,10 @@
               <a:defRPr sz="800"/>
             </a:pPr>
             <a:r>
-              <a:rPr lang="es-MX" dirty="0" smtClean="0"/>
+              <a:rPr lang="es-MX" sz="1000" b="1" dirty="0" smtClean="0"/>
               <a:t>x</a:t>
             </a:r>
-            <a:endParaRPr lang="es-MX" sz="800" dirty="0">
+            <a:endParaRPr lang="es-MX" sz="1000" b="1" dirty="0">
               <a:latin typeface="Arial Narrow" panose="020B0606020202030204" pitchFamily="34" charset="0"/>
             </a:endParaRPr>
           </a:p>
@@ -7744,8 +7661,8 @@
         </p:nvSpPr>
         <p:spPr>
           <a:xfrm>
-            <a:off x="3059832" y="6165304"/>
-            <a:ext cx="360040" cy="215444"/>
+            <a:off x="3059832" y="6279123"/>
+            <a:ext cx="360040" cy="246221"/>
           </a:xfrm>
           <a:prstGeom prst="rect">
             <a:avLst/>
@@ -7762,10 +7679,10 @@
               <a:defRPr sz="800"/>
             </a:pPr>
             <a:r>
-              <a:rPr lang="es-MX" dirty="0" smtClean="0"/>
+              <a:rPr lang="es-MX" sz="1000" b="1" dirty="0" smtClean="0"/>
               <a:t>x</a:t>
             </a:r>
-            <a:endParaRPr lang="es-MX" sz="800" dirty="0">
+            <a:endParaRPr lang="es-MX" sz="1000" b="1" dirty="0">
               <a:latin typeface="Arial Narrow" panose="020B0606020202030204" pitchFamily="34" charset="0"/>
             </a:endParaRPr>
           </a:p>
@@ -7780,7 +7697,7 @@
         <p:spPr>
           <a:xfrm>
             <a:off x="6444208" y="1341348"/>
-            <a:ext cx="2160240" cy="215444"/>
+            <a:ext cx="2160240" cy="246221"/>
           </a:xfrm>
           <a:prstGeom prst="rect">
             <a:avLst/>
@@ -7797,10 +7714,10 @@
               <a:defRPr sz="800"/>
             </a:pPr>
             <a:r>
-              <a:rPr lang="es-MX" dirty="0" smtClean="0"/>
+              <a:rPr lang="es-MX" sz="1000" dirty="0" smtClean="0"/>
               <a:t>x</a:t>
             </a:r>
-            <a:endParaRPr lang="es-MX" sz="800" dirty="0">
+            <a:endParaRPr lang="es-MX" sz="1000" dirty="0">
               <a:latin typeface="Arial Narrow" panose="020B0606020202030204" pitchFamily="34" charset="0"/>
             </a:endParaRPr>
           </a:p>
@@ -7815,7 +7732,7 @@
         <p:spPr>
           <a:xfrm>
             <a:off x="6444208" y="2708340"/>
-            <a:ext cx="2160240" cy="215444"/>
+            <a:ext cx="2160240" cy="246221"/>
           </a:xfrm>
           <a:prstGeom prst="rect">
             <a:avLst/>
@@ -7832,10 +7749,10 @@
               <a:defRPr sz="800"/>
             </a:pPr>
             <a:r>
-              <a:rPr lang="es-MX" dirty="0" smtClean="0"/>
+              <a:rPr lang="es-MX" sz="1000" dirty="0" smtClean="0"/>
               <a:t>x</a:t>
             </a:r>
-            <a:endParaRPr lang="es-MX" sz="800" dirty="0">
+            <a:endParaRPr lang="es-MX" sz="1000" dirty="0">
               <a:latin typeface="Arial Narrow" panose="020B0606020202030204" pitchFamily="34" charset="0"/>
             </a:endParaRPr>
           </a:p>
@@ -7849,8 +7766,8 @@
         </p:nvSpPr>
         <p:spPr>
           <a:xfrm>
-            <a:off x="7524328" y="4077652"/>
-            <a:ext cx="936104" cy="215444"/>
+            <a:off x="7596336" y="4107268"/>
+            <a:ext cx="936104" cy="246221"/>
           </a:xfrm>
           <a:prstGeom prst="rect">
             <a:avLst/>
@@ -7867,10 +7784,10 @@
               <a:defRPr sz="800"/>
             </a:pPr>
             <a:r>
-              <a:rPr lang="es-MX" dirty="0" smtClean="0"/>
+              <a:rPr lang="es-MX" sz="1000" b="1" dirty="0" smtClean="0"/>
               <a:t>x</a:t>
             </a:r>
-            <a:endParaRPr lang="es-MX" sz="800" dirty="0">
+            <a:endParaRPr lang="es-MX" sz="1000" b="1" dirty="0">
               <a:latin typeface="Arial Narrow" panose="020B0606020202030204" pitchFamily="34" charset="0"/>
             </a:endParaRPr>
           </a:p>
@@ -7884,8 +7801,8 @@
         </p:nvSpPr>
         <p:spPr>
           <a:xfrm>
-            <a:off x="7524328" y="4293676"/>
-            <a:ext cx="1008112" cy="215444"/>
+            <a:off x="7596336" y="4437111"/>
+            <a:ext cx="1008112" cy="246221"/>
           </a:xfrm>
           <a:prstGeom prst="rect">
             <a:avLst/>
@@ -7902,10 +7819,10 @@
               <a:defRPr sz="800"/>
             </a:pPr>
             <a:r>
-              <a:rPr lang="es-MX" dirty="0" smtClean="0"/>
+              <a:rPr lang="es-MX" sz="1000" b="1" dirty="0" smtClean="0"/>
               <a:t>x</a:t>
             </a:r>
-            <a:endParaRPr lang="es-MX" sz="800" dirty="0">
+            <a:endParaRPr lang="es-MX" sz="1000" b="1" dirty="0">
               <a:latin typeface="Arial Narrow" panose="020B0606020202030204" pitchFamily="34" charset="0"/>
             </a:endParaRPr>
           </a:p>
@@ -7919,8 +7836,8 @@
         </p:nvSpPr>
         <p:spPr>
           <a:xfrm>
-            <a:off x="7524328" y="4509700"/>
-            <a:ext cx="1152128" cy="215444"/>
+            <a:off x="7596336" y="4725143"/>
+            <a:ext cx="1152128" cy="246221"/>
           </a:xfrm>
           <a:prstGeom prst="rect">
             <a:avLst/>
@@ -7937,10 +7854,10 @@
               <a:defRPr sz="800"/>
             </a:pPr>
             <a:r>
-              <a:rPr lang="es-MX" dirty="0" smtClean="0"/>
+              <a:rPr lang="es-MX" sz="1000" b="1" dirty="0" smtClean="0"/>
               <a:t>x</a:t>
             </a:r>
-            <a:endParaRPr lang="es-MX" sz="800" dirty="0">
+            <a:endParaRPr lang="es-MX" sz="1000" b="1" dirty="0">
               <a:latin typeface="Arial Narrow" panose="020B0606020202030204" pitchFamily="34" charset="0"/>
             </a:endParaRPr>
           </a:p>
@@ -7968,8 +7885,8 @@
         </p:blipFill>
         <p:spPr>
           <a:xfrm>
-            <a:off x="686806" y="1988840"/>
-            <a:ext cx="1944463" cy="493735"/>
+            <a:off x="971600" y="1988841"/>
+            <a:ext cx="1417777" cy="360000"/>
           </a:xfrm>
           <a:prstGeom prst="rect">
             <a:avLst/>
@@ -7998,8 +7915,8 @@
         </p:blipFill>
         <p:spPr>
           <a:xfrm>
-            <a:off x="3707904" y="908720"/>
-            <a:ext cx="1944463" cy="493735"/>
+            <a:off x="3946310" y="908721"/>
+            <a:ext cx="1417778" cy="360000"/>
           </a:xfrm>
           <a:prstGeom prst="rect">
             <a:avLst/>
@@ -8028,8 +7945,8 @@
         </p:blipFill>
         <p:spPr>
           <a:xfrm>
-            <a:off x="3671653" y="2569194"/>
-            <a:ext cx="1944463" cy="493735"/>
+            <a:off x="4018319" y="2569194"/>
+            <a:ext cx="1417777" cy="360000"/>
           </a:xfrm>
           <a:prstGeom prst="rect">
             <a:avLst/>
@@ -8058,8 +7975,8 @@
         </p:blipFill>
         <p:spPr>
           <a:xfrm>
-            <a:off x="3489762" y="3933056"/>
-            <a:ext cx="2450390" cy="493735"/>
+            <a:off x="3865453" y="4001413"/>
+            <a:ext cx="1786667" cy="360000"/>
           </a:xfrm>
           <a:prstGeom prst="rect">
             <a:avLst/>
@@ -8088,8 +8005,8 @@
         </p:blipFill>
         <p:spPr>
           <a:xfrm>
-            <a:off x="6341255" y="942577"/>
-            <a:ext cx="2450390" cy="493735"/>
+            <a:off x="6673764" y="942577"/>
+            <a:ext cx="1786668" cy="360000"/>
           </a:xfrm>
           <a:prstGeom prst="rect">
             <a:avLst/>
@@ -8118,8 +8035,8 @@
         </p:blipFill>
         <p:spPr>
           <a:xfrm>
-            <a:off x="6372200" y="2353750"/>
-            <a:ext cx="2450390" cy="493735"/>
+            <a:off x="6673764" y="2353751"/>
+            <a:ext cx="1786668" cy="360000"/>
           </a:xfrm>
           <a:prstGeom prst="rect">
             <a:avLst/>
@@ -8148,8 +8065,8 @@
         </p:blipFill>
         <p:spPr>
           <a:xfrm>
-            <a:off x="6372200" y="3694948"/>
-            <a:ext cx="2450390" cy="493735"/>
+            <a:off x="6673764" y="3725145"/>
+            <a:ext cx="1786668" cy="360000"/>
           </a:xfrm>
           <a:prstGeom prst="rect">
             <a:avLst/>
@@ -8178,8 +8095,38 @@
         </p:blipFill>
         <p:spPr>
           <a:xfrm>
-            <a:off x="6366846" y="4931899"/>
-            <a:ext cx="2450390" cy="493735"/>
+            <a:off x="6732240" y="5157232"/>
+            <a:ext cx="1786667" cy="360000"/>
+          </a:xfrm>
+          <a:prstGeom prst="rect">
+            <a:avLst/>
+          </a:prstGeom>
+        </p:spPr>
+      </p:pic>
+      <p:pic>
+        <p:nvPicPr>
+          <p:cNvPr id="46" name="45 Imagen"/>
+          <p:cNvPicPr>
+            <a:picLocks noChangeAspect="1"/>
+          </p:cNvPicPr>
+          <p:nvPr/>
+        </p:nvPicPr>
+        <p:blipFill>
+          <a:blip r:embed="rId10" cstate="print">
+            <a:extLst>
+              <a:ext uri="{28A0092B-C50C-407E-A947-70E740481C1C}">
+                <a14:useLocalDpi xmlns:a14="http://schemas.microsoft.com/office/drawing/2010/main" val="0"/>
+              </a:ext>
+            </a:extLst>
+          </a:blip>
+          <a:stretch>
+            <a:fillRect/>
+          </a:stretch>
+        </p:blipFill>
+        <p:spPr>
+          <a:xfrm>
+            <a:off x="539552" y="1052736"/>
+            <a:ext cx="2284210" cy="764629"/>
           </a:xfrm>
           <a:prstGeom prst="rect">
             <a:avLst/>

</xml_diff>

<commit_message>
listado de excel imprime montos de inversión, Ficha técnica imprime montos de inversión, corregida la etiqueta OTRA CLASIFICACION por Obras Institucionales, Eliminación de X cuando no existe subclasificación, ya muestra la sub clasificación PNI en ficha técnica, se eliminó Susceptible de inaugurar.
</commit_message>
<xml_diff>
--- a/obras/static/ppt/FichaTecnicaObras.pptx
+++ b/obras/static/ppt/FichaTecnicaObras.pptx
@@ -110,6 +110,36 @@
       </a:defRPr>
     </a:lvl9pPr>
   </p:defaultTextStyle>
+  <p:extLst>
+    <p:ext uri="{EFAFB233-063F-42B5-8137-9DF3F51BA10A}">
+      <p15:sldGuideLst xmlns:p15="http://schemas.microsoft.com/office/powerpoint/2012/main">
+        <p15:guide id="1" orient="horz" pos="2160">
+          <p15:clr>
+            <a:srgbClr val="A4A3A4"/>
+          </p15:clr>
+        </p15:guide>
+        <p15:guide id="2" pos="2880">
+          <p15:clr>
+            <a:srgbClr val="A4A3A4"/>
+          </p15:clr>
+        </p15:guide>
+      </p15:sldGuideLst>
+    </p:ext>
+    <p:ext uri="{2D200454-40CA-4A62-9FC3-DE9A4176ACB9}">
+      <p15:notesGuideLst xmlns:p15="http://schemas.microsoft.com/office/powerpoint/2012/main">
+        <p15:guide id="1" orient="horz" pos="2880">
+          <p15:clr>
+            <a:srgbClr val="A4A3A4"/>
+          </p15:clr>
+        </p15:guide>
+        <p15:guide id="2" pos="2160">
+          <p15:clr>
+            <a:srgbClr val="A4A3A4"/>
+          </p15:clr>
+        </p15:guide>
+      </p15:notesGuideLst>
+    </p:ext>
+  </p:extLst>
 </p:presentation>
 </file>
 
@@ -195,7 +225,7 @@
           <a:p>
             <a:fld id="{A12F159B-2BA9-4A4C-8F37-6A12CA4521B5}" type="datetimeFigureOut">
               <a:rPr lang="es-MX" smtClean="0"/>
-              <a:t>01/09/2015</a:t>
+              <a:t>12/10/2015</a:t>
             </a:fld>
             <a:endParaRPr lang="es-MX"/>
           </a:p>
@@ -360,7 +390,7 @@
           <a:p>
             <a:fld id="{E725DF0C-0434-4166-AFB2-E9FB5C8C5747}" type="datetimeFigureOut">
               <a:rPr lang="es-MX" smtClean="0"/>
-              <a:t>01/09/2015</a:t>
+              <a:t>12/10/2015</a:t>
             </a:fld>
             <a:endParaRPr lang="es-MX"/>
           </a:p>
@@ -815,7 +845,7 @@
           <a:p>
             <a:fld id="{F4C741E7-0659-46B3-91BB-B8C3B98C4B5D}" type="datetimeFigureOut">
               <a:rPr lang="es-MX" smtClean="0"/>
-              <a:t>01/09/2015</a:t>
+              <a:t>12/10/2015</a:t>
             </a:fld>
             <a:endParaRPr lang="es-MX"/>
           </a:p>
@@ -1008,7 +1038,7 @@
           <a:p>
             <a:fld id="{F4C741E7-0659-46B3-91BB-B8C3B98C4B5D}" type="datetimeFigureOut">
               <a:rPr lang="es-MX" smtClean="0"/>
-              <a:t>01/09/2015</a:t>
+              <a:t>12/10/2015</a:t>
             </a:fld>
             <a:endParaRPr lang="es-MX"/>
           </a:p>
@@ -1194,7 +1224,7 @@
           <a:p>
             <a:fld id="{F4C741E7-0659-46B3-91BB-B8C3B98C4B5D}" type="datetimeFigureOut">
               <a:rPr lang="es-MX" smtClean="0"/>
-              <a:t>01/09/2015</a:t>
+              <a:t>12/10/2015</a:t>
             </a:fld>
             <a:endParaRPr lang="es-MX"/>
           </a:p>
@@ -1380,7 +1410,7 @@
           <a:p>
             <a:fld id="{F4C741E7-0659-46B3-91BB-B8C3B98C4B5D}" type="datetimeFigureOut">
               <a:rPr lang="es-MX" smtClean="0"/>
-              <a:t>01/09/2015</a:t>
+              <a:t>12/10/2015</a:t>
             </a:fld>
             <a:endParaRPr lang="es-MX"/>
           </a:p>
@@ -1632,7 +1662,7 @@
           <a:p>
             <a:fld id="{F4C741E7-0659-46B3-91BB-B8C3B98C4B5D}" type="datetimeFigureOut">
               <a:rPr lang="es-MX" smtClean="0"/>
-              <a:t>01/09/2015</a:t>
+              <a:t>12/10/2015</a:t>
             </a:fld>
             <a:endParaRPr lang="es-MX"/>
           </a:p>
@@ -1934,7 +1964,7 @@
           <a:p>
             <a:fld id="{F4C741E7-0659-46B3-91BB-B8C3B98C4B5D}" type="datetimeFigureOut">
               <a:rPr lang="es-MX" smtClean="0"/>
-              <a:t>01/09/2015</a:t>
+              <a:t>12/10/2015</a:t>
             </a:fld>
             <a:endParaRPr lang="es-MX"/>
           </a:p>
@@ -2376,7 +2406,7 @@
           <a:p>
             <a:fld id="{F4C741E7-0659-46B3-91BB-B8C3B98C4B5D}" type="datetimeFigureOut">
               <a:rPr lang="es-MX" smtClean="0"/>
-              <a:t>01/09/2015</a:t>
+              <a:t>12/10/2015</a:t>
             </a:fld>
             <a:endParaRPr lang="es-MX"/>
           </a:p>
@@ -2502,7 +2532,7 @@
           <a:p>
             <a:fld id="{F4C741E7-0659-46B3-91BB-B8C3B98C4B5D}" type="datetimeFigureOut">
               <a:rPr lang="es-MX" smtClean="0"/>
-              <a:t>01/09/2015</a:t>
+              <a:t>12/10/2015</a:t>
             </a:fld>
             <a:endParaRPr lang="es-MX"/>
           </a:p>
@@ -2597,7 +2627,7 @@
           <a:p>
             <a:fld id="{F4C741E7-0659-46B3-91BB-B8C3B98C4B5D}" type="datetimeFigureOut">
               <a:rPr lang="es-MX" smtClean="0"/>
-              <a:t>01/09/2015</a:t>
+              <a:t>12/10/2015</a:t>
             </a:fld>
             <a:endParaRPr lang="es-MX"/>
           </a:p>
@@ -2883,7 +2913,7 @@
           <a:p>
             <a:fld id="{F4C741E7-0659-46B3-91BB-B8C3B98C4B5D}" type="datetimeFigureOut">
               <a:rPr lang="es-MX" smtClean="0"/>
-              <a:t>01/09/2015</a:t>
+              <a:t>12/10/2015</a:t>
             </a:fld>
             <a:endParaRPr lang="es-MX"/>
           </a:p>
@@ -3145,7 +3175,7 @@
           <a:p>
             <a:fld id="{F4C741E7-0659-46B3-91BB-B8C3B98C4B5D}" type="datetimeFigureOut">
               <a:rPr lang="es-MX" smtClean="0"/>
-              <a:t>01/09/2015</a:t>
+              <a:t>12/10/2015</a:t>
             </a:fld>
             <a:endParaRPr lang="es-MX"/>
           </a:p>
@@ -3263,7 +3293,7 @@
           <a:p>
             <a:fld id="{F4C741E7-0659-46B3-91BB-B8C3B98C4B5D}" type="datetimeFigureOut">
               <a:rPr lang="es-MX" smtClean="0"/>
-              <a:t>01/09/2015</a:t>
+              <a:t>12/10/2015</a:t>
             </a:fld>
             <a:endParaRPr lang="es-MX"/>
           </a:p>
@@ -4429,7 +4459,7 @@
           <p:nvPr>
             <p:extLst>
               <p:ext uri="{D42A27DB-BD31-4B8C-83A1-F6EECF244321}">
-                <p14:modId xmlns:p14="http://schemas.microsoft.com/office/powerpoint/2010/main" val="4116423866"/>
+                <p14:modId xmlns:p14="http://schemas.microsoft.com/office/powerpoint/2010/main" val="1200110880"/>
               </p:ext>
             </p:extLst>
           </p:nvPr>
@@ -4793,7 +4823,7 @@
                     <a:p>
                       <a:r>
                         <a:rPr lang="es-MX" sz="1000" dirty="0" smtClean="0"/>
-                        <a:t>Otros</a:t>
+                        <a:t> Otros</a:t>
                       </a:r>
                       <a:endParaRPr lang="es-MX" sz="1000" b="1" dirty="0">
                         <a:latin typeface="Arial Narrow" panose="020B0606020202030204" pitchFamily="34" charset="0"/>
@@ -5333,13 +5363,13 @@
           <p:nvPr>
             <p:extLst>
               <p:ext uri="{D42A27DB-BD31-4B8C-83A1-F6EECF244321}">
-                <p14:modId xmlns:p14="http://schemas.microsoft.com/office/powerpoint/2010/main" val="3751331233"/>
+                <p14:modId xmlns:p14="http://schemas.microsoft.com/office/powerpoint/2010/main" val="4028318316"/>
               </p:ext>
             </p:extLst>
           </p:nvPr>
         </p:nvGraphicFramePr>
         <p:xfrm>
-          <a:off x="3059832" y="4005065"/>
+          <a:off x="3059832" y="4005062"/>
           <a:ext cx="3312368" cy="2736303"/>
         </p:xfrm>
         <a:graphic>
@@ -5794,7 +5824,13 @@
                         <a:rPr lang="es-MX" sz="1000" b="0" dirty="0" smtClean="0">
                           <a:latin typeface="+mj-lt"/>
                         </a:rPr>
-                        <a:t>Otra clasificación</a:t>
+                        <a:t>Obras</a:t>
+                      </a:r>
+                      <a:r>
+                        <a:rPr lang="es-MX" sz="1000" b="0" baseline="0" dirty="0" smtClean="0">
+                          <a:latin typeface="+mj-lt"/>
+                        </a:rPr>
+                        <a:t> Institucionales</a:t>
                       </a:r>
                       <a:endParaRPr lang="es-MX" sz="1000" b="0" dirty="0">
                         <a:latin typeface="+mj-lt"/>
@@ -6102,14 +6138,14 @@
           <p:nvPr>
             <p:extLst>
               <p:ext uri="{D42A27DB-BD31-4B8C-83A1-F6EECF244321}">
-                <p14:modId xmlns:p14="http://schemas.microsoft.com/office/powerpoint/2010/main" val="71855369"/>
+                <p14:modId xmlns:p14="http://schemas.microsoft.com/office/powerpoint/2010/main" val="1937076811"/>
               </p:ext>
             </p:extLst>
           </p:nvPr>
         </p:nvGraphicFramePr>
         <p:xfrm>
-          <a:off x="6444208" y="3645024"/>
-          <a:ext cx="2304256" cy="1428544"/>
+          <a:off x="6444208" y="3645028"/>
+          <a:ext cx="2304256" cy="1208658"/>
         </p:xfrm>
         <a:graphic>
           <a:graphicData uri="http://schemas.openxmlformats.org/drawingml/2006/table">
@@ -6121,7 +6157,7 @@
                 <a:gridCol w="1368152"/>
                 <a:gridCol w="936104"/>
               </a:tblGrid>
-              <a:tr h="418111">
+              <a:tr h="350491">
                 <a:tc gridSpan="2">
                   <a:txBody>
                     <a:bodyPr/>
@@ -6178,7 +6214,7 @@
                   <a:tcPr/>
                 </a:tc>
               </a:tr>
-              <a:tr h="278740">
+              <a:tr h="233661">
                 <a:tc>
                   <a:txBody>
                     <a:bodyPr/>
@@ -6232,18 +6268,12 @@
                   </a:tcPr>
                 </a:tc>
               </a:tr>
-              <a:tr h="452953">
+              <a:tr h="233661">
                 <a:tc>
                   <a:txBody>
                     <a:bodyPr/>
                     <a:lstStyle/>
                     <a:p>
-                      <a:r>
-                        <a:rPr lang="es-MX" sz="1000" b="0" dirty="0" smtClean="0">
-                          <a:latin typeface="+mj-lt"/>
-                        </a:rPr>
-                        <a:t>Susceptible a inaugurar</a:t>
-                      </a:r>
                       <a:endParaRPr lang="es-MX" sz="1000" b="0" dirty="0">
                         <a:latin typeface="+mj-lt"/>
                       </a:endParaRPr>
@@ -6286,7 +6316,7 @@
                   </a:tcPr>
                 </a:tc>
               </a:tr>
-              <a:tr h="278740">
+              <a:tr h="355218">
                 <a:tc>
                   <a:txBody>
                     <a:bodyPr/>
@@ -6371,14 +6401,14 @@
           <p:nvPr>
             <p:extLst>
               <p:ext uri="{D42A27DB-BD31-4B8C-83A1-F6EECF244321}">
-                <p14:modId xmlns:p14="http://schemas.microsoft.com/office/powerpoint/2010/main" val="101761822"/>
+                <p14:modId xmlns:p14="http://schemas.microsoft.com/office/powerpoint/2010/main" val="3293680929"/>
               </p:ext>
             </p:extLst>
           </p:nvPr>
         </p:nvGraphicFramePr>
         <p:xfrm>
-          <a:off x="6444208" y="5115664"/>
-          <a:ext cx="2304256" cy="1625704"/>
+          <a:off x="6444208" y="4941168"/>
+          <a:ext cx="2304256" cy="1800200"/>
         </p:xfrm>
         <a:graphic>
           <a:graphicData uri="http://schemas.openxmlformats.org/drawingml/2006/table">
@@ -6467,7 +6497,7 @@
                   <a:tcPr/>
                 </a:tc>
               </a:tr>
-              <a:tr h="1259944">
+              <a:tr h="1434440">
                 <a:tc>
                   <a:txBody>
                     <a:bodyPr/>
@@ -7030,8 +7060,46 @@
         </p:nvSpPr>
         <p:spPr>
           <a:xfrm>
-            <a:off x="3563888" y="1268760"/>
-            <a:ext cx="360040" cy="246221"/>
+            <a:off x="3518814" y="1300955"/>
+            <a:ext cx="405113" cy="200055"/>
+          </a:xfrm>
+          <a:prstGeom prst="rect">
+            <a:avLst/>
+          </a:prstGeom>
+          <a:noFill/>
+          <a:ln>
+            <a:noFill/>
+          </a:ln>
+        </p:spPr>
+        <p:txBody>
+          <a:bodyPr wrap="square" lIns="72000" rIns="0" rtlCol="0">
+            <a:spAutoFit/>
+          </a:bodyPr>
+          <a:lstStyle/>
+          <a:p>
+            <a:pPr>
+              <a:defRPr sz="800"/>
+            </a:pPr>
+            <a:r>
+              <a:rPr lang="es-MX" sz="700" b="1" dirty="0" smtClean="0"/>
+              <a:t>x</a:t>
+            </a:r>
+            <a:endParaRPr lang="es-MX" sz="700" b="1" dirty="0">
+              <a:latin typeface="Arial Narrow" panose="020B0606020202030204" pitchFamily="34" charset="0"/>
+            </a:endParaRPr>
+          </a:p>
+        </p:txBody>
+      </p:sp>
+      <p:sp>
+        <p:nvSpPr>
+          <p:cNvPr id="21" name="20 CuadroTexto"/>
+          <p:cNvSpPr txBox="1"/>
+          <p:nvPr/>
+        </p:nvSpPr>
+        <p:spPr>
+          <a:xfrm>
+            <a:off x="4290406" y="1300955"/>
+            <a:ext cx="425609" cy="200055"/>
           </a:xfrm>
           <a:prstGeom prst="rect">
             <a:avLst/>
@@ -7039,7 +7107,7 @@
           <a:noFill/>
         </p:spPr>
         <p:txBody>
-          <a:bodyPr wrap="square" rtlCol="0">
+          <a:bodyPr wrap="square" lIns="72000" rIns="0" rtlCol="0">
             <a:spAutoFit/>
           </a:bodyPr>
           <a:lstStyle/>
@@ -7048,10 +7116,10 @@
               <a:defRPr sz="800"/>
             </a:pPr>
             <a:r>
-              <a:rPr lang="es-MX" sz="1000" b="1" dirty="0" smtClean="0"/>
+              <a:rPr lang="es-MX" sz="700" b="1" dirty="0" smtClean="0"/>
               <a:t>x</a:t>
             </a:r>
-            <a:endParaRPr lang="es-MX" sz="1000" b="1" dirty="0">
+            <a:endParaRPr lang="es-MX" sz="700" b="1" dirty="0">
               <a:latin typeface="Arial Narrow" panose="020B0606020202030204" pitchFamily="34" charset="0"/>
             </a:endParaRPr>
           </a:p>
@@ -7059,14 +7127,14 @@
       </p:sp>
       <p:sp>
         <p:nvSpPr>
-          <p:cNvPr id="21" name="20 CuadroTexto"/>
+          <p:cNvPr id="22" name="21 CuadroTexto"/>
           <p:cNvSpPr txBox="1"/>
           <p:nvPr/>
         </p:nvSpPr>
         <p:spPr>
           <a:xfrm>
-            <a:off x="4283968" y="1268760"/>
-            <a:ext cx="360040" cy="246221"/>
+            <a:off x="5262515" y="1300955"/>
+            <a:ext cx="382510" cy="200055"/>
           </a:xfrm>
           <a:prstGeom prst="rect">
             <a:avLst/>
@@ -7074,7 +7142,7 @@
           <a:noFill/>
         </p:spPr>
         <p:txBody>
-          <a:bodyPr wrap="square" rtlCol="0">
+          <a:bodyPr wrap="square" lIns="72000" rIns="0" rtlCol="0">
             <a:spAutoFit/>
           </a:bodyPr>
           <a:lstStyle/>
@@ -7083,10 +7151,10 @@
               <a:defRPr sz="800"/>
             </a:pPr>
             <a:r>
-              <a:rPr lang="es-MX" sz="1000" b="1" dirty="0" smtClean="0"/>
+              <a:rPr lang="es-MX" sz="700" b="1" dirty="0" smtClean="0"/>
               <a:t>x</a:t>
             </a:r>
-            <a:endParaRPr lang="es-MX" sz="1000" b="1" dirty="0">
+            <a:endParaRPr lang="es-MX" sz="700" b="1" dirty="0">
               <a:latin typeface="Arial Narrow" panose="020B0606020202030204" pitchFamily="34" charset="0"/>
             </a:endParaRPr>
           </a:p>
@@ -7094,14 +7162,14 @@
       </p:sp>
       <p:sp>
         <p:nvSpPr>
-          <p:cNvPr id="22" name="21 CuadroTexto"/>
+          <p:cNvPr id="23" name="22 CuadroTexto"/>
           <p:cNvSpPr txBox="1"/>
           <p:nvPr/>
         </p:nvSpPr>
         <p:spPr>
           <a:xfrm>
-            <a:off x="5256076" y="1268760"/>
-            <a:ext cx="396044" cy="246221"/>
+            <a:off x="5946590" y="1300955"/>
+            <a:ext cx="425609" cy="200055"/>
           </a:xfrm>
           <a:prstGeom prst="rect">
             <a:avLst/>
@@ -7109,7 +7177,7 @@
           <a:noFill/>
         </p:spPr>
         <p:txBody>
-          <a:bodyPr wrap="square" rtlCol="0">
+          <a:bodyPr wrap="square" lIns="72000" rIns="0" rtlCol="0">
             <a:spAutoFit/>
           </a:bodyPr>
           <a:lstStyle/>
@@ -7118,10 +7186,10 @@
               <a:defRPr sz="800"/>
             </a:pPr>
             <a:r>
-              <a:rPr lang="es-MX" sz="1000" b="1" dirty="0" smtClean="0"/>
+              <a:rPr lang="es-MX" sz="700" b="1" dirty="0" smtClean="0"/>
               <a:t>x</a:t>
             </a:r>
-            <a:endParaRPr lang="es-MX" sz="1000" b="1" dirty="0">
+            <a:endParaRPr lang="es-MX" sz="700" b="1" dirty="0">
               <a:latin typeface="Arial Narrow" panose="020B0606020202030204" pitchFamily="34" charset="0"/>
             </a:endParaRPr>
           </a:p>
@@ -7129,14 +7197,14 @@
       </p:sp>
       <p:sp>
         <p:nvSpPr>
-          <p:cNvPr id="23" name="22 CuadroTexto"/>
+          <p:cNvPr id="24" name="23 CuadroTexto"/>
           <p:cNvSpPr txBox="1"/>
           <p:nvPr/>
         </p:nvSpPr>
         <p:spPr>
           <a:xfrm>
-            <a:off x="5940152" y="1268760"/>
-            <a:ext cx="360040" cy="246221"/>
+            <a:off x="3563888" y="1706774"/>
+            <a:ext cx="382422" cy="200055"/>
           </a:xfrm>
           <a:prstGeom prst="rect">
             <a:avLst/>
@@ -7144,7 +7212,7 @@
           <a:noFill/>
         </p:spPr>
         <p:txBody>
-          <a:bodyPr wrap="square" rtlCol="0">
+          <a:bodyPr wrap="square" lIns="72000" rIns="0" rtlCol="0">
             <a:spAutoFit/>
           </a:bodyPr>
           <a:lstStyle/>
@@ -7153,10 +7221,10 @@
               <a:defRPr sz="800"/>
             </a:pPr>
             <a:r>
-              <a:rPr lang="es-MX" sz="1000" b="1" dirty="0" smtClean="0"/>
+              <a:rPr lang="es-MX" sz="700" b="1" dirty="0" smtClean="0"/>
               <a:t>x</a:t>
             </a:r>
-            <a:endParaRPr lang="es-MX" sz="1000" b="1" dirty="0">
+            <a:endParaRPr lang="es-MX" sz="700" b="1" dirty="0">
               <a:latin typeface="Arial Narrow" panose="020B0606020202030204" pitchFamily="34" charset="0"/>
             </a:endParaRPr>
           </a:p>
@@ -7164,14 +7232,14 @@
       </p:sp>
       <p:sp>
         <p:nvSpPr>
-          <p:cNvPr id="24" name="23 CuadroTexto"/>
+          <p:cNvPr id="25" name="24 CuadroTexto"/>
           <p:cNvSpPr txBox="1"/>
           <p:nvPr/>
         </p:nvSpPr>
         <p:spPr>
           <a:xfrm>
-            <a:off x="3563888" y="1670611"/>
-            <a:ext cx="360040" cy="246221"/>
+            <a:off x="4283968" y="1706774"/>
+            <a:ext cx="360040" cy="200055"/>
           </a:xfrm>
           <a:prstGeom prst="rect">
             <a:avLst/>
@@ -7179,7 +7247,7 @@
           <a:noFill/>
         </p:spPr>
         <p:txBody>
-          <a:bodyPr wrap="square" rtlCol="0">
+          <a:bodyPr wrap="square" lIns="72000" rIns="0" rtlCol="0">
             <a:spAutoFit/>
           </a:bodyPr>
           <a:lstStyle/>
@@ -7188,10 +7256,10 @@
               <a:defRPr sz="800"/>
             </a:pPr>
             <a:r>
-              <a:rPr lang="es-MX" sz="1000" b="1" dirty="0" smtClean="0"/>
+              <a:rPr lang="es-MX" sz="700" b="1" dirty="0" smtClean="0"/>
               <a:t>x</a:t>
             </a:r>
-            <a:endParaRPr lang="es-MX" sz="1000" b="1" dirty="0">
+            <a:endParaRPr lang="es-MX" sz="700" b="1" dirty="0">
               <a:latin typeface="Arial Narrow" panose="020B0606020202030204" pitchFamily="34" charset="0"/>
             </a:endParaRPr>
           </a:p>
@@ -7199,14 +7267,14 @@
       </p:sp>
       <p:sp>
         <p:nvSpPr>
-          <p:cNvPr id="25" name="24 CuadroTexto"/>
+          <p:cNvPr id="26" name="25 CuadroTexto"/>
           <p:cNvSpPr txBox="1"/>
           <p:nvPr/>
         </p:nvSpPr>
         <p:spPr>
           <a:xfrm>
-            <a:off x="4283968" y="1670611"/>
-            <a:ext cx="360040" cy="246221"/>
+            <a:off x="4716016" y="1706774"/>
+            <a:ext cx="1656184" cy="220061"/>
           </a:xfrm>
           <a:prstGeom prst="rect">
             <a:avLst/>
@@ -7223,45 +7291,10 @@
               <a:defRPr sz="800"/>
             </a:pPr>
             <a:r>
-              <a:rPr lang="es-MX" sz="1000" b="1" dirty="0" smtClean="0"/>
+              <a:rPr lang="es-MX" sz="700" b="1" dirty="0" smtClean="0"/>
               <a:t>x</a:t>
             </a:r>
-            <a:endParaRPr lang="es-MX" sz="1000" b="1" dirty="0">
-              <a:latin typeface="Arial Narrow" panose="020B0606020202030204" pitchFamily="34" charset="0"/>
-            </a:endParaRPr>
-          </a:p>
-        </p:txBody>
-      </p:sp>
-      <p:sp>
-        <p:nvSpPr>
-          <p:cNvPr id="26" name="25 CuadroTexto"/>
-          <p:cNvSpPr txBox="1"/>
-          <p:nvPr/>
-        </p:nvSpPr>
-        <p:spPr>
-          <a:xfrm>
-            <a:off x="4572000" y="1670611"/>
-            <a:ext cx="1656184" cy="246221"/>
-          </a:xfrm>
-          <a:prstGeom prst="rect">
-            <a:avLst/>
-          </a:prstGeom>
-          <a:noFill/>
-        </p:spPr>
-        <p:txBody>
-          <a:bodyPr wrap="square" rtlCol="0">
-            <a:spAutoFit/>
-          </a:bodyPr>
-          <a:lstStyle/>
-          <a:p>
-            <a:pPr>
-              <a:defRPr sz="800"/>
-            </a:pPr>
-            <a:r>
-              <a:rPr lang="es-MX" sz="1000" b="1" dirty="0" smtClean="0"/>
-              <a:t>x</a:t>
-            </a:r>
-            <a:endParaRPr lang="es-MX" sz="1000" b="1" dirty="0">
+            <a:endParaRPr lang="es-MX" sz="700" b="1" dirty="0">
               <a:latin typeface="Arial Narrow" panose="020B0606020202030204" pitchFamily="34" charset="0"/>
             </a:endParaRPr>
           </a:p>
@@ -7766,7 +7799,7 @@
         </p:nvSpPr>
         <p:spPr>
           <a:xfrm>
-            <a:off x="7596336" y="4107268"/>
+            <a:off x="7596336" y="4011415"/>
             <a:ext cx="936104" cy="246221"/>
           </a:xfrm>
           <a:prstGeom prst="rect">
@@ -7795,48 +7828,13 @@
       </p:sp>
       <p:sp>
         <p:nvSpPr>
-          <p:cNvPr id="43" name="42 CuadroTexto"/>
-          <p:cNvSpPr txBox="1"/>
-          <p:nvPr/>
-        </p:nvSpPr>
-        <p:spPr>
-          <a:xfrm>
-            <a:off x="7596336" y="4437111"/>
-            <a:ext cx="1008112" cy="246221"/>
-          </a:xfrm>
-          <a:prstGeom prst="rect">
-            <a:avLst/>
-          </a:prstGeom>
-          <a:noFill/>
-        </p:spPr>
-        <p:txBody>
-          <a:bodyPr wrap="square" rtlCol="0">
-            <a:spAutoFit/>
-          </a:bodyPr>
-          <a:lstStyle/>
-          <a:p>
-            <a:pPr>
-              <a:defRPr sz="800"/>
-            </a:pPr>
-            <a:r>
-              <a:rPr lang="es-MX" sz="1000" b="1" dirty="0" smtClean="0"/>
-              <a:t>x</a:t>
-            </a:r>
-            <a:endParaRPr lang="es-MX" sz="1000" b="1" dirty="0">
-              <a:latin typeface="Arial Narrow" panose="020B0606020202030204" pitchFamily="34" charset="0"/>
-            </a:endParaRPr>
-          </a:p>
-        </p:txBody>
-      </p:sp>
-      <p:sp>
-        <p:nvSpPr>
           <p:cNvPr id="44" name="43 CuadroTexto"/>
           <p:cNvSpPr txBox="1"/>
           <p:nvPr/>
         </p:nvSpPr>
         <p:spPr>
           <a:xfrm>
-            <a:off x="7596336" y="4725143"/>
+            <a:off x="7583458" y="4493798"/>
             <a:ext cx="1152128" cy="246221"/>
           </a:xfrm>
           <a:prstGeom prst="rect">
@@ -7859,6 +7857,42 @@
             </a:r>
             <a:endParaRPr lang="es-MX" sz="1000" b="1" dirty="0">
               <a:latin typeface="Arial Narrow" panose="020B0606020202030204" pitchFamily="34" charset="0"/>
+            </a:endParaRPr>
+          </a:p>
+        </p:txBody>
+      </p:sp>
+      <p:sp>
+        <p:nvSpPr>
+          <p:cNvPr id="52" name="33 CuadroTexto"/>
+          <p:cNvSpPr txBox="1"/>
+          <p:nvPr/>
+        </p:nvSpPr>
+        <p:spPr>
+          <a:xfrm>
+            <a:off x="5220072" y="5541437"/>
+            <a:ext cx="864096" cy="246221"/>
+          </a:xfrm>
+          <a:prstGeom prst="rect">
+            <a:avLst/>
+          </a:prstGeom>
+          <a:noFill/>
+        </p:spPr>
+        <p:txBody>
+          <a:bodyPr wrap="square" rtlCol="0">
+            <a:spAutoFit/>
+          </a:bodyPr>
+          <a:lstStyle/>
+          <a:p>
+            <a:r>
+              <a:rPr lang="es-MX" sz="1000" b="1" dirty="0" smtClean="0">
+                <a:latin typeface="+mj-lt"/>
+                <a:cs typeface="Angsana New" panose="02020603050405020304" pitchFamily="18" charset="-34"/>
+              </a:rPr>
+              <a:t>x</a:t>
+            </a:r>
+            <a:endParaRPr lang="es-MX" sz="1000" b="1" dirty="0">
+              <a:latin typeface="+mj-lt"/>
+              <a:cs typeface="Angsana New" panose="02020603050405020304" pitchFamily="18" charset="-34"/>
             </a:endParaRPr>
           </a:p>
         </p:txBody>
@@ -8095,7 +8129,7 @@
         </p:blipFill>
         <p:spPr>
           <a:xfrm>
-            <a:off x="6732240" y="5157232"/>
+            <a:off x="6686643" y="4973363"/>
             <a:ext cx="1786667" cy="360000"/>
           </a:xfrm>
           <a:prstGeom prst="rect">

</xml_diff>

<commit_message>
la ficha técnica y el excel del listado ya muestran Registro de cartera y número de beneficiarios
</commit_message>
<xml_diff>
--- a/obras/static/ppt/FichaTecnicaObras.pptx
+++ b/obras/static/ppt/FichaTecnicaObras.pptx
@@ -225,7 +225,7 @@
           <a:p>
             <a:fld id="{A12F159B-2BA9-4A4C-8F37-6A12CA4521B5}" type="datetimeFigureOut">
               <a:rPr lang="es-MX" smtClean="0"/>
-              <a:t>12/10/2015</a:t>
+              <a:t>13/10/2015</a:t>
             </a:fld>
             <a:endParaRPr lang="es-MX"/>
           </a:p>
@@ -390,7 +390,7 @@
           <a:p>
             <a:fld id="{E725DF0C-0434-4166-AFB2-E9FB5C8C5747}" type="datetimeFigureOut">
               <a:rPr lang="es-MX" smtClean="0"/>
-              <a:t>12/10/2015</a:t>
+              <a:t>13/10/2015</a:t>
             </a:fld>
             <a:endParaRPr lang="es-MX"/>
           </a:p>
@@ -845,7 +845,7 @@
           <a:p>
             <a:fld id="{F4C741E7-0659-46B3-91BB-B8C3B98C4B5D}" type="datetimeFigureOut">
               <a:rPr lang="es-MX" smtClean="0"/>
-              <a:t>12/10/2015</a:t>
+              <a:t>13/10/2015</a:t>
             </a:fld>
             <a:endParaRPr lang="es-MX"/>
           </a:p>
@@ -1038,7 +1038,7 @@
           <a:p>
             <a:fld id="{F4C741E7-0659-46B3-91BB-B8C3B98C4B5D}" type="datetimeFigureOut">
               <a:rPr lang="es-MX" smtClean="0"/>
-              <a:t>12/10/2015</a:t>
+              <a:t>13/10/2015</a:t>
             </a:fld>
             <a:endParaRPr lang="es-MX"/>
           </a:p>
@@ -1224,7 +1224,7 @@
           <a:p>
             <a:fld id="{F4C741E7-0659-46B3-91BB-B8C3B98C4B5D}" type="datetimeFigureOut">
               <a:rPr lang="es-MX" smtClean="0"/>
-              <a:t>12/10/2015</a:t>
+              <a:t>13/10/2015</a:t>
             </a:fld>
             <a:endParaRPr lang="es-MX"/>
           </a:p>
@@ -1410,7 +1410,7 @@
           <a:p>
             <a:fld id="{F4C741E7-0659-46B3-91BB-B8C3B98C4B5D}" type="datetimeFigureOut">
               <a:rPr lang="es-MX" smtClean="0"/>
-              <a:t>12/10/2015</a:t>
+              <a:t>13/10/2015</a:t>
             </a:fld>
             <a:endParaRPr lang="es-MX"/>
           </a:p>
@@ -1662,7 +1662,7 @@
           <a:p>
             <a:fld id="{F4C741E7-0659-46B3-91BB-B8C3B98C4B5D}" type="datetimeFigureOut">
               <a:rPr lang="es-MX" smtClean="0"/>
-              <a:t>12/10/2015</a:t>
+              <a:t>13/10/2015</a:t>
             </a:fld>
             <a:endParaRPr lang="es-MX"/>
           </a:p>
@@ -1964,7 +1964,7 @@
           <a:p>
             <a:fld id="{F4C741E7-0659-46B3-91BB-B8C3B98C4B5D}" type="datetimeFigureOut">
               <a:rPr lang="es-MX" smtClean="0"/>
-              <a:t>12/10/2015</a:t>
+              <a:t>13/10/2015</a:t>
             </a:fld>
             <a:endParaRPr lang="es-MX"/>
           </a:p>
@@ -2406,7 +2406,7 @@
           <a:p>
             <a:fld id="{F4C741E7-0659-46B3-91BB-B8C3B98C4B5D}" type="datetimeFigureOut">
               <a:rPr lang="es-MX" smtClean="0"/>
-              <a:t>12/10/2015</a:t>
+              <a:t>13/10/2015</a:t>
             </a:fld>
             <a:endParaRPr lang="es-MX"/>
           </a:p>
@@ -2532,7 +2532,7 @@
           <a:p>
             <a:fld id="{F4C741E7-0659-46B3-91BB-B8C3B98C4B5D}" type="datetimeFigureOut">
               <a:rPr lang="es-MX" smtClean="0"/>
-              <a:t>12/10/2015</a:t>
+              <a:t>13/10/2015</a:t>
             </a:fld>
             <a:endParaRPr lang="es-MX"/>
           </a:p>
@@ -2627,7 +2627,7 @@
           <a:p>
             <a:fld id="{F4C741E7-0659-46B3-91BB-B8C3B98C4B5D}" type="datetimeFigureOut">
               <a:rPr lang="es-MX" smtClean="0"/>
-              <a:t>12/10/2015</a:t>
+              <a:t>13/10/2015</a:t>
             </a:fld>
             <a:endParaRPr lang="es-MX"/>
           </a:p>
@@ -2913,7 +2913,7 @@
           <a:p>
             <a:fld id="{F4C741E7-0659-46B3-91BB-B8C3B98C4B5D}" type="datetimeFigureOut">
               <a:rPr lang="es-MX" smtClean="0"/>
-              <a:t>12/10/2015</a:t>
+              <a:t>13/10/2015</a:t>
             </a:fld>
             <a:endParaRPr lang="es-MX"/>
           </a:p>
@@ -3175,7 +3175,7 @@
           <a:p>
             <a:fld id="{F4C741E7-0659-46B3-91BB-B8C3B98C4B5D}" type="datetimeFigureOut">
               <a:rPr lang="es-MX" smtClean="0"/>
-              <a:t>12/10/2015</a:t>
+              <a:t>13/10/2015</a:t>
             </a:fld>
             <a:endParaRPr lang="es-MX"/>
           </a:p>
@@ -3293,7 +3293,7 @@
           <a:p>
             <a:fld id="{F4C741E7-0659-46B3-91BB-B8C3B98C4B5D}" type="datetimeFigureOut">
               <a:rPr lang="es-MX" smtClean="0"/>
-              <a:t>12/10/2015</a:t>
+              <a:t>13/10/2015</a:t>
             </a:fld>
             <a:endParaRPr lang="es-MX"/>
           </a:p>
@@ -3807,14 +3807,14 @@
           <p:nvPr>
             <p:extLst>
               <p:ext uri="{D42A27DB-BD31-4B8C-83A1-F6EECF244321}">
-                <p14:modId xmlns:p14="http://schemas.microsoft.com/office/powerpoint/2010/main" val="2688668618"/>
+                <p14:modId xmlns:p14="http://schemas.microsoft.com/office/powerpoint/2010/main" val="2390886114"/>
               </p:ext>
             </p:extLst>
           </p:nvPr>
         </p:nvGraphicFramePr>
         <p:xfrm>
           <a:off x="395536" y="1988840"/>
-          <a:ext cx="2555920" cy="4742126"/>
+          <a:ext cx="2555920" cy="4740912"/>
         </p:xfrm>
         <a:graphic>
           <a:graphicData uri="http://schemas.openxmlformats.org/drawingml/2006/table">
@@ -3826,7 +3826,7 @@
                 <a:gridCol w="1187768"/>
                 <a:gridCol w="1368152"/>
               </a:tblGrid>
-              <a:tr h="415027">
+              <a:tr h="416178">
                 <a:tc gridSpan="2">
                   <a:txBody>
                     <a:bodyPr/>
@@ -3901,18 +3901,19 @@
                   <a:tcPr/>
                 </a:tc>
               </a:tr>
-              <a:tr h="415027">
+              <a:tr h="397339">
                 <a:tc>
                   <a:txBody>
                     <a:bodyPr/>
                     <a:lstStyle/>
-                    <a:p>
-                      <a:endParaRPr lang="es-MX" sz="1000" dirty="0" smtClean="0"/>
-                    </a:p>
                     <a:p>
                       <a:r>
                         <a:rPr lang="es-MX" sz="1000" dirty="0" smtClean="0"/>
-                        <a:t>Identificador de la obra</a:t>
+                        <a:t>Identificador </a:t>
+                      </a:r>
+                      <a:r>
+                        <a:rPr lang="es-MX" sz="1000" dirty="0" smtClean="0"/>
+                        <a:t>de la obra</a:t>
                       </a:r>
                       <a:endParaRPr lang="es-MX" sz="1000" b="1" dirty="0">
                         <a:latin typeface="Arial Narrow" panose="020B0606020202030204" pitchFamily="34" charset="0"/>
@@ -3956,7 +3957,7 @@
                   </a:tcPr>
                 </a:tc>
               </a:tr>
-              <a:tr h="415027">
+              <a:tr h="554635">
                 <a:tc>
                   <a:txBody>
                     <a:bodyPr/>
@@ -4008,7 +4009,7 @@
                   </a:tcPr>
                 </a:tc>
               </a:tr>
-              <a:tr h="458243">
+              <a:tr h="459514">
                 <a:tc>
                   <a:txBody>
                     <a:bodyPr/>
@@ -4060,7 +4061,7 @@
                   </a:tcPr>
                 </a:tc>
               </a:tr>
-              <a:tr h="415027">
+              <a:tr h="416178">
                 <a:tc>
                   <a:txBody>
                     <a:bodyPr/>
@@ -4112,7 +4113,7 @@
                   </a:tcPr>
                 </a:tc>
               </a:tr>
-              <a:tr h="415027">
+              <a:tr h="416178">
                 <a:tc>
                   <a:txBody>
                     <a:bodyPr/>
@@ -4164,7 +4165,7 @@
                   </a:tcPr>
                 </a:tc>
               </a:tr>
-              <a:tr h="415027">
+              <a:tr h="416178">
                 <a:tc>
                   <a:txBody>
                     <a:bodyPr/>
@@ -4220,7 +4221,7 @@
                   </a:tcPr>
                 </a:tc>
               </a:tr>
-              <a:tr h="415027">
+              <a:tr h="416178">
                 <a:tc>
                   <a:txBody>
                     <a:bodyPr/>
@@ -4272,7 +4273,7 @@
                   </a:tcPr>
                 </a:tc>
               </a:tr>
-              <a:tr h="415027">
+              <a:tr h="416178">
                 <a:tc>
                   <a:txBody>
                     <a:bodyPr/>
@@ -4324,7 +4325,7 @@
                   </a:tcPr>
                 </a:tc>
               </a:tr>
-              <a:tr h="415027">
+              <a:tr h="416178">
                 <a:tc>
                   <a:txBody>
                     <a:bodyPr/>
@@ -4376,7 +4377,7 @@
                   </a:tcPr>
                 </a:tc>
               </a:tr>
-              <a:tr h="415027">
+              <a:tr h="416178">
                 <a:tc>
                   <a:txBody>
                     <a:bodyPr/>
@@ -4459,14 +4460,14 @@
           <p:nvPr>
             <p:extLst>
               <p:ext uri="{D42A27DB-BD31-4B8C-83A1-F6EECF244321}">
-                <p14:modId xmlns:p14="http://schemas.microsoft.com/office/powerpoint/2010/main" val="1200110880"/>
+                <p14:modId xmlns:p14="http://schemas.microsoft.com/office/powerpoint/2010/main" val="3962417853"/>
               </p:ext>
             </p:extLst>
           </p:nvPr>
         </p:nvGraphicFramePr>
         <p:xfrm>
-          <a:off x="3059832" y="908720"/>
-          <a:ext cx="3312368" cy="1577073"/>
+          <a:off x="3059832" y="908722"/>
+          <a:ext cx="3312368" cy="1681127"/>
         </p:xfrm>
         <a:graphic>
           <a:graphicData uri="http://schemas.openxmlformats.org/drawingml/2006/table">
@@ -4479,13 +4480,13 @@
                 <a:gridCol w="224671"/>
                 <a:gridCol w="567055"/>
                 <a:gridCol w="208280"/>
-                <a:gridCol w="463068"/>
-                <a:gridCol w="234162"/>
+                <a:gridCol w="580390"/>
+                <a:gridCol w="116840"/>
                 <a:gridCol w="208280"/>
                 <a:gridCol w="529919"/>
                 <a:gridCol w="300869"/>
               </a:tblGrid>
-              <a:tr h="288032">
+              <a:tr h="354431">
                 <a:tc gridSpan="9">
                   <a:txBody>
                     <a:bodyPr/>
@@ -4612,7 +4613,7 @@
                   <a:tcPr/>
                 </a:tc>
               </a:tr>
-              <a:tr h="403771">
+              <a:tr h="260347">
                 <a:tc>
                   <a:txBody>
                     <a:bodyPr/>
@@ -4774,7 +4775,7 @@
                   </a:tcPr>
                 </a:tc>
               </a:tr>
-              <a:tr h="403771">
+              <a:tr h="286424">
                 <a:tc>
                   <a:txBody>
                     <a:bodyPr/>
@@ -4918,7 +4919,7 @@
                   <a:tcPr/>
                 </a:tc>
               </a:tr>
-              <a:tr h="403771">
+              <a:tr h="383966">
                 <a:tc gridSpan="2">
                   <a:txBody>
                     <a:bodyPr/>
@@ -4947,6 +4948,152 @@
                       <a:headEnd type="none" w="med" len="med"/>
                       <a:tailEnd type="none" w="med" len="med"/>
                     </a:lnL>
+                    <a:noFill/>
+                  </a:tcPr>
+                </a:tc>
+                <a:tc hMerge="1">
+                  <a:txBody>
+                    <a:bodyPr/>
+                    <a:lstStyle/>
+                    <a:p>
+                      <a:endParaRPr lang="es-MX" sz="800" dirty="0">
+                        <a:latin typeface="Arial Narrow" panose="020B0606020202030204" pitchFamily="34" charset="0"/>
+                      </a:endParaRPr>
+                    </a:p>
+                  </a:txBody>
+                  <a:tcPr/>
+                </a:tc>
+                <a:tc gridSpan="3">
+                  <a:txBody>
+                    <a:bodyPr/>
+                    <a:lstStyle/>
+                    <a:p>
+                      <a:endParaRPr lang="es-MX" sz="1000" b="0" dirty="0">
+                        <a:latin typeface="Arial Narrow" panose="020B0606020202030204" pitchFamily="34" charset="0"/>
+                      </a:endParaRPr>
+                    </a:p>
+                  </a:txBody>
+                  <a:tcPr>
+                    <a:noFill/>
+                  </a:tcPr>
+                </a:tc>
+                <a:tc hMerge="1">
+                  <a:txBody>
+                    <a:bodyPr/>
+                    <a:lstStyle/>
+                    <a:p>
+                      <a:endParaRPr lang="es-MX" sz="800" dirty="0">
+                        <a:latin typeface="Arial Narrow" panose="020B0606020202030204" pitchFamily="34" charset="0"/>
+                      </a:endParaRPr>
+                    </a:p>
+                  </a:txBody>
+                  <a:tcPr/>
+                </a:tc>
+                <a:tc hMerge="1">
+                  <a:txBody>
+                    <a:bodyPr/>
+                    <a:lstStyle/>
+                    <a:p>
+                      <a:endParaRPr lang="es-MX" sz="800" dirty="0">
+                        <a:latin typeface="Arial Narrow" panose="020B0606020202030204" pitchFamily="34" charset="0"/>
+                      </a:endParaRPr>
+                    </a:p>
+                  </a:txBody>
+                  <a:tcPr/>
+                </a:tc>
+                <a:tc gridSpan="4">
+                  <a:txBody>
+                    <a:bodyPr/>
+                    <a:lstStyle/>
+                    <a:p>
+                      <a:endParaRPr lang="es-MX" sz="1000" dirty="0">
+                        <a:latin typeface="Arial Narrow" panose="020B0606020202030204" pitchFamily="34" charset="0"/>
+                      </a:endParaRPr>
+                    </a:p>
+                  </a:txBody>
+                  <a:tcPr>
+                    <a:lnR w="28575" cap="flat" cmpd="sng" algn="ctr">
+                      <a:solidFill>
+                        <a:srgbClr val="006600"/>
+                      </a:solidFill>
+                      <a:prstDash val="solid"/>
+                      <a:round/>
+                      <a:headEnd type="none" w="med" len="med"/>
+                      <a:tailEnd type="none" w="med" len="med"/>
+                    </a:lnR>
+                    <a:noFill/>
+                  </a:tcPr>
+                </a:tc>
+                <a:tc hMerge="1">
+                  <a:txBody>
+                    <a:bodyPr/>
+                    <a:lstStyle/>
+                    <a:p>
+                      <a:endParaRPr lang="es-MX"/>
+                    </a:p>
+                  </a:txBody>
+                  <a:tcPr/>
+                </a:tc>
+                <a:tc hMerge="1">
+                  <a:txBody>
+                    <a:bodyPr/>
+                    <a:lstStyle/>
+                    <a:p>
+                      <a:endParaRPr lang="es-MX"/>
+                    </a:p>
+                  </a:txBody>
+                  <a:tcPr/>
+                </a:tc>
+                <a:tc hMerge="1">
+                  <a:txBody>
+                    <a:bodyPr/>
+                    <a:lstStyle/>
+                    <a:p>
+                      <a:endParaRPr lang="es-MX"/>
+                    </a:p>
+                  </a:txBody>
+                  <a:tcPr/>
+                </a:tc>
+              </a:tr>
+              <a:tr h="372356">
+                <a:tc gridSpan="5">
+                  <a:txBody>
+                    <a:bodyPr/>
+                    <a:lstStyle/>
+                    <a:p>
+                      <a:r>
+                        <a:rPr lang="es-MX" sz="1000" b="0" dirty="0" smtClean="0">
+                          <a:latin typeface="+mn-lt"/>
+                        </a:rPr>
+                        <a:t>Registro </a:t>
+                      </a:r>
+                      <a:r>
+                        <a:rPr lang="es-MX" sz="1000" b="0" smtClean="0">
+                          <a:latin typeface="+mn-lt"/>
+                        </a:rPr>
+                        <a:t>de</a:t>
+                      </a:r>
+                      <a:r>
+                        <a:rPr lang="es-MX" sz="1000" b="0" baseline="0" smtClean="0">
+                          <a:latin typeface="+mn-lt"/>
+                        </a:rPr>
+                        <a:t> Cartera</a:t>
+                      </a:r>
+                      <a:endParaRPr lang="es-MX" sz="1000" b="0" dirty="0">
+                        <a:latin typeface="+mn-lt"/>
+                      </a:endParaRPr>
+                    </a:p>
+                  </a:txBody>
+                  <a:tcPr>
+                    <a:lnL w="28575" cap="flat" cmpd="sng" algn="ctr">
+                      <a:solidFill>
+                        <a:srgbClr val="006600"/>
+                      </a:solidFill>
+                      <a:prstDash val="solid"/>
+                      <a:round/>
+                      <a:headEnd type="none" w="med" len="med"/>
+                      <a:tailEnd type="none" w="med" len="med"/>
+                    </a:lnL>
                     <a:lnB w="28575" cap="flat" cmpd="sng" algn="ctr">
                       <a:solidFill>
                         <a:srgbClr val="006600"/>
@@ -4964,14 +5111,12 @@
                     <a:bodyPr/>
                     <a:lstStyle/>
                     <a:p>
-                      <a:endParaRPr lang="es-MX" sz="800" dirty="0">
-                        <a:latin typeface="Arial Narrow" panose="020B0606020202030204" pitchFamily="34" charset="0"/>
-                      </a:endParaRPr>
+                      <a:endParaRPr lang="es-MX"/>
                     </a:p>
                   </a:txBody>
                   <a:tcPr/>
                 </a:tc>
-                <a:tc gridSpan="3">
+                <a:tc hMerge="1">
                   <a:txBody>
                     <a:bodyPr/>
                     <a:lstStyle/>
@@ -4991,7 +5136,9 @@
                       <a:headEnd type="none" w="med" len="med"/>
                       <a:tailEnd type="none" w="med" len="med"/>
                     </a:lnB>
-                    <a:noFill/>
+                    <a:solidFill>
+                      <a:schemeClr val="accent1"/>
+                    </a:solidFill>
                   </a:tcPr>
                 </a:tc>
                 <a:tc hMerge="1">
@@ -4999,9 +5146,7 @@
                     <a:bodyPr/>
                     <a:lstStyle/>
                     <a:p>
-                      <a:endParaRPr lang="es-MX" sz="800" dirty="0">
-                        <a:latin typeface="Arial Narrow" panose="020B0606020202030204" pitchFamily="34" charset="0"/>
-                      </a:endParaRPr>
+                      <a:endParaRPr lang="es-MX"/>
                     </a:p>
                   </a:txBody>
                   <a:tcPr/>
@@ -5011,9 +5156,7 @@
                     <a:bodyPr/>
                     <a:lstStyle/>
                     <a:p>
-                      <a:endParaRPr lang="es-MX" sz="800" dirty="0">
-                        <a:latin typeface="Arial Narrow" panose="020B0606020202030204" pitchFamily="34" charset="0"/>
-                      </a:endParaRPr>
+                      <a:endParaRPr lang="es-MX"/>
                     </a:p>
                   </a:txBody>
                   <a:tcPr/>
@@ -5094,14 +5237,14 @@
           <p:nvPr>
             <p:extLst>
               <p:ext uri="{D42A27DB-BD31-4B8C-83A1-F6EECF244321}">
-                <p14:modId xmlns:p14="http://schemas.microsoft.com/office/powerpoint/2010/main" val="1161424258"/>
+                <p14:modId xmlns:p14="http://schemas.microsoft.com/office/powerpoint/2010/main" val="81651236"/>
               </p:ext>
             </p:extLst>
           </p:nvPr>
         </p:nvGraphicFramePr>
         <p:xfrm>
-          <a:off x="3059832" y="2564904"/>
-          <a:ext cx="3312368" cy="1352398"/>
+          <a:off x="3055072" y="2681647"/>
+          <a:ext cx="3312368" cy="1341573"/>
         </p:xfrm>
         <a:graphic>
           <a:graphicData uri="http://schemas.openxmlformats.org/drawingml/2006/table">
@@ -5110,11 +5253,13 @@
                 <a:tableStyleId>{5C22544A-7EE6-4342-B048-85BDC9FD1C3A}</a:tableStyleId>
               </a:tblPr>
               <a:tblGrid>
-                <a:gridCol w="1080120"/>
-                <a:gridCol w="2232248"/>
+                <a:gridCol w="1588936"/>
+                <a:gridCol w="648072"/>
+                <a:gridCol w="792088"/>
+                <a:gridCol w="283272"/>
               </a:tblGrid>
-              <a:tr h="288032">
-                <a:tc gridSpan="2">
+              <a:tr h="341974">
+                <a:tc gridSpan="4">
                   <a:txBody>
                     <a:bodyPr/>
                     <a:lstStyle/>
@@ -5164,14 +5309,34 @@
                     <a:bodyPr/>
                     <a:lstStyle/>
                     <a:p>
+                      <a:endParaRPr lang="es-MX"/>
+                    </a:p>
+                  </a:txBody>
+                  <a:tcPr/>
+                </a:tc>
+                <a:tc hMerge="1">
+                  <a:txBody>
+                    <a:bodyPr/>
+                    <a:lstStyle/>
+                    <a:p>
                       <a:endParaRPr lang="es-MX" dirty="0"/>
                     </a:p>
                   </a:txBody>
                   <a:tcPr/>
                 </a:tc>
+                <a:tc hMerge="1">
+                  <a:txBody>
+                    <a:bodyPr/>
+                    <a:lstStyle/>
+                    <a:p>
+                      <a:endParaRPr lang="es-MX"/>
+                    </a:p>
+                  </a:txBody>
+                  <a:tcPr/>
+                </a:tc>
               </a:tr>
-              <a:tr h="295199">
-                <a:tc>
+              <a:tr h="325672">
+                <a:tc gridSpan="2">
                   <a:txBody>
                     <a:bodyPr/>
                     <a:lstStyle/>
@@ -5200,7 +5365,17 @@
                     <a:noFill/>
                   </a:tcPr>
                 </a:tc>
-                <a:tc>
+                <a:tc hMerge="1">
+                  <a:txBody>
+                    <a:bodyPr/>
+                    <a:lstStyle/>
+                    <a:p>
+                      <a:endParaRPr lang="es-MX"/>
+                    </a:p>
+                  </a:txBody>
+                  <a:tcPr/>
+                </a:tc>
+                <a:tc gridSpan="2">
                   <a:txBody>
                     <a:bodyPr/>
                     <a:lstStyle/>
@@ -5223,9 +5398,19 @@
                     <a:noFill/>
                   </a:tcPr>
                 </a:tc>
+                <a:tc hMerge="1">
+                  <a:txBody>
+                    <a:bodyPr/>
+                    <a:lstStyle/>
+                    <a:p>
+                      <a:endParaRPr lang="es-MX"/>
+                    </a:p>
+                  </a:txBody>
+                  <a:tcPr/>
+                </a:tc>
               </a:tr>
-              <a:tr h="295199">
-                <a:tc>
+              <a:tr h="284381">
+                <a:tc gridSpan="2">
                   <a:txBody>
                     <a:bodyPr/>
                     <a:lstStyle/>
@@ -5254,7 +5439,17 @@
                     <a:noFill/>
                   </a:tcPr>
                 </a:tc>
-                <a:tc>
+                <a:tc hMerge="1">
+                  <a:txBody>
+                    <a:bodyPr/>
+                    <a:lstStyle/>
+                    <a:p>
+                      <a:endParaRPr lang="es-MX"/>
+                    </a:p>
+                  </a:txBody>
+                  <a:tcPr/>
+                </a:tc>
+                <a:tc gridSpan="2">
                   <a:txBody>
                     <a:bodyPr/>
                     <a:lstStyle/>
@@ -5274,37 +5469,154 @@
                       <a:headEnd type="none" w="med" len="med"/>
                       <a:tailEnd type="none" w="med" len="med"/>
                     </a:lnR>
+                    <a:lnB w="12700" cmpd="sng">
+                      <a:noFill/>
+                    </a:lnB>
                     <a:noFill/>
                   </a:tcPr>
                 </a:tc>
+                <a:tc hMerge="1">
+                  <a:txBody>
+                    <a:bodyPr/>
+                    <a:lstStyle/>
+                    <a:p>
+                      <a:endParaRPr lang="es-MX"/>
+                    </a:p>
+                  </a:txBody>
+                  <a:tcPr/>
+                </a:tc>
               </a:tr>
-              <a:tr h="295199">
+              <a:tr h="342238">
                 <a:tc>
                   <a:txBody>
                     <a:bodyPr/>
                     <a:lstStyle/>
                     <a:p>
+                      <a:pPr marL="0" marR="0" indent="0" algn="l" defTabSz="914400" rtl="0" eaLnBrk="1" fontAlgn="auto" latinLnBrk="0" hangingPunct="1">
+                        <a:lnSpc>
+                          <a:spcPct val="100000"/>
+                        </a:lnSpc>
+                        <a:spcBef>
+                          <a:spcPts val="0"/>
+                        </a:spcBef>
+                        <a:spcAft>
+                          <a:spcPts val="0"/>
+                        </a:spcAft>
+                        <a:buClrTx/>
+                        <a:buSzTx/>
+                        <a:buFontTx/>
+                        <a:buNone/>
+                        <a:tabLst/>
+                        <a:defRPr/>
+                      </a:pPr>
                       <a:r>
-                        <a:rPr lang="es-MX" sz="1000" b="0" dirty="0" smtClean="0">
-                          <a:latin typeface="+mj-lt"/>
+                        <a:rPr lang="es-MX" sz="1000" b="0" kern="1200" dirty="0" smtClean="0">
+                          <a:solidFill>
+                            <a:schemeClr val="dk1"/>
+                          </a:solidFill>
+                          <a:latin typeface="+mn-lt"/>
+                          <a:ea typeface="+mn-ea"/>
+                          <a:cs typeface="+mn-cs"/>
+                        </a:rPr>
+                        <a:t>Número de Beneficiarios</a:t>
+                      </a:r>
+                    </a:p>
+                  </a:txBody>
+                  <a:tcPr>
+                    <a:lnL w="28575" cap="flat" cmpd="sng" algn="ctr">
+                      <a:solidFill>
+                        <a:srgbClr val="006600"/>
+                      </a:solidFill>
+                      <a:prstDash val="solid"/>
+                      <a:round/>
+                      <a:headEnd type="none" w="med" len="med"/>
+                      <a:tailEnd type="none" w="med" len="med"/>
+                    </a:lnL>
+                    <a:lnB w="28575" cap="flat" cmpd="sng" algn="ctr">
+                      <a:solidFill>
+                        <a:srgbClr val="006600"/>
+                      </a:solidFill>
+                      <a:prstDash val="solid"/>
+                      <a:round/>
+                      <a:headEnd type="none" w="med" len="med"/>
+                      <a:tailEnd type="none" w="med" len="med"/>
+                    </a:lnB>
+                    <a:noFill/>
+                  </a:tcPr>
+                </a:tc>
+                <a:tc>
+                  <a:txBody>
+                    <a:bodyPr/>
+                    <a:lstStyle/>
+                    <a:p>
+                      <a:endParaRPr lang="es-MX" dirty="0"/>
+                    </a:p>
+                  </a:txBody>
+                  <a:tcPr>
+                    <a:lnR w="12700" cmpd="sng">
+                      <a:noFill/>
+                    </a:lnR>
+                    <a:lnB w="28575" cap="flat" cmpd="sng" algn="ctr">
+                      <a:solidFill>
+                        <a:srgbClr val="006600"/>
+                      </a:solidFill>
+                      <a:prstDash val="solid"/>
+                      <a:round/>
+                      <a:headEnd type="none" w="med" len="med"/>
+                      <a:tailEnd type="none" w="med" len="med"/>
+                    </a:lnB>
+                    <a:noFill/>
+                  </a:tcPr>
+                </a:tc>
+                <a:tc>
+                  <a:txBody>
+                    <a:bodyPr/>
+                    <a:lstStyle/>
+                    <a:p>
+                      <a:pPr marL="0" marR="0" indent="0" algn="l" defTabSz="914400" rtl="0" eaLnBrk="1" fontAlgn="auto" latinLnBrk="0" hangingPunct="1">
+                        <a:lnSpc>
+                          <a:spcPct val="100000"/>
+                        </a:lnSpc>
+                        <a:spcBef>
+                          <a:spcPts val="0"/>
+                        </a:spcBef>
+                        <a:spcAft>
+                          <a:spcPts val="0"/>
+                        </a:spcAft>
+                        <a:buClrTx/>
+                        <a:buSzTx/>
+                        <a:buFontTx/>
+                        <a:buNone/>
+                        <a:tabLst/>
+                        <a:defRPr/>
+                      </a:pPr>
+                      <a:r>
+                        <a:rPr lang="es-MX" sz="800" b="0" kern="1200" dirty="0" smtClean="0">
+                          <a:solidFill>
+                            <a:schemeClr val="dk1"/>
+                          </a:solidFill>
+                          <a:latin typeface="+mn-lt"/>
+                          <a:ea typeface="+mn-ea"/>
+                          <a:cs typeface="+mn-cs"/>
                         </a:rPr>
                         <a:t>Señalización</a:t>
                       </a:r>
-                      <a:endParaRPr lang="es-MX" sz="1000" b="0" dirty="0">
-                        <a:latin typeface="+mj-lt"/>
-                      </a:endParaRPr>
                     </a:p>
                   </a:txBody>
                   <a:tcPr>
-                    <a:lnL w="28575" cap="flat" cmpd="sng" algn="ctr">
-                      <a:solidFill>
-                        <a:srgbClr val="006600"/>
-                      </a:solidFill>
-                      <a:prstDash val="solid"/>
-                      <a:round/>
-                      <a:headEnd type="none" w="med" len="med"/>
-                      <a:tailEnd type="none" w="med" len="med"/>
+                    <a:lnL w="12700" cmpd="sng">
+                      <a:noFill/>
                     </a:lnL>
+                    <a:lnR w="28575" cap="flat" cmpd="sng" algn="ctr">
+                      <a:noFill/>
+                      <a:prstDash val="solid"/>
+                      <a:round/>
+                      <a:headEnd type="none" w="med" len="med"/>
+                      <a:tailEnd type="none" w="med" len="med"/>
+                    </a:lnR>
+                    <a:lnT w="12700" cmpd="sng">
+                      <a:noFill/>
+                    </a:lnT>
                     <a:lnB w="28575" cap="flat" cmpd="sng" algn="ctr">
                       <a:solidFill>
                         <a:srgbClr val="006600"/>
@@ -5322,12 +5634,17 @@
                     <a:bodyPr/>
                     <a:lstStyle/>
                     <a:p>
-                      <a:endParaRPr lang="es-MX" sz="800" dirty="0">
-                        <a:latin typeface="Arial Narrow" panose="020B0606020202030204" pitchFamily="34" charset="0"/>
-                      </a:endParaRPr>
+                      <a:endParaRPr lang="es-MX" dirty="0"/>
                     </a:p>
                   </a:txBody>
                   <a:tcPr>
+                    <a:lnL w="28575" cap="flat" cmpd="sng" algn="ctr">
+                      <a:noFill/>
+                      <a:prstDash val="solid"/>
+                      <a:round/>
+                      <a:headEnd type="none" w="med" len="med"/>
+                      <a:tailEnd type="none" w="med" len="med"/>
+                    </a:lnL>
                     <a:lnR w="28575" cap="flat" cmpd="sng" algn="ctr">
                       <a:solidFill>
                         <a:srgbClr val="006600"/>
@@ -5363,14 +5680,14 @@
           <p:nvPr>
             <p:extLst>
               <p:ext uri="{D42A27DB-BD31-4B8C-83A1-F6EECF244321}">
-                <p14:modId xmlns:p14="http://schemas.microsoft.com/office/powerpoint/2010/main" val="4028318316"/>
+                <p14:modId xmlns:p14="http://schemas.microsoft.com/office/powerpoint/2010/main" val="4061200985"/>
               </p:ext>
             </p:extLst>
           </p:nvPr>
         </p:nvGraphicFramePr>
         <p:xfrm>
-          <a:off x="3059832" y="4005062"/>
-          <a:ext cx="3312368" cy="2736303"/>
+          <a:off x="3059832" y="4084287"/>
+          <a:ext cx="3312368" cy="2657078"/>
         </p:xfrm>
         <a:graphic>
           <a:graphicData uri="http://schemas.openxmlformats.org/drawingml/2006/table">
@@ -5383,7 +5700,7 @@
                 <a:gridCol w="1235393"/>
                 <a:gridCol w="1763920"/>
               </a:tblGrid>
-              <a:tr h="376363">
+              <a:tr h="365348">
                 <a:tc gridSpan="3">
                   <a:txBody>
                     <a:bodyPr/>
@@ -5450,7 +5767,7 @@
                   <a:tcPr/>
                 </a:tc>
               </a:tr>
-              <a:tr h="407727">
+              <a:tr h="395794">
                 <a:tc>
                   <a:txBody>
                     <a:bodyPr/>
@@ -5518,7 +5835,7 @@
                   </a:tcPr>
                 </a:tc>
               </a:tr>
-              <a:tr h="381590">
+              <a:tr h="370422">
                 <a:tc>
                   <a:txBody>
                     <a:bodyPr/>
@@ -5584,7 +5901,7 @@
                   <a:tcPr/>
                 </a:tc>
               </a:tr>
-              <a:tr h="381590">
+              <a:tr h="370422">
                 <a:tc>
                   <a:txBody>
                     <a:bodyPr/>
@@ -5650,7 +5967,7 @@
                   <a:tcPr/>
                 </a:tc>
               </a:tr>
-              <a:tr h="381590">
+              <a:tr h="370422">
                 <a:tc>
                   <a:txBody>
                     <a:bodyPr/>
@@ -5716,7 +6033,7 @@
                   <a:tcPr/>
                 </a:tc>
               </a:tr>
-              <a:tr h="381590">
+              <a:tr h="370422">
                 <a:tc>
                   <a:txBody>
                     <a:bodyPr/>
@@ -5782,7 +6099,7 @@
                   <a:tcPr/>
                 </a:tc>
               </a:tr>
-              <a:tr h="425853">
+              <a:tr h="413390">
                 <a:tc>
                   <a:txBody>
                     <a:bodyPr/>
@@ -6710,7 +7027,7 @@
         </p:nvSpPr>
         <p:spPr>
           <a:xfrm>
-            <a:off x="1547664" y="2606715"/>
+            <a:off x="1485181" y="2420888"/>
             <a:ext cx="1284618" cy="246221"/>
           </a:xfrm>
           <a:prstGeom prst="rect">
@@ -6719,7 +7036,7 @@
           <a:noFill/>
         </p:spPr>
         <p:txBody>
-          <a:bodyPr wrap="square" rtlCol="0">
+          <a:bodyPr wrap="square" lIns="0" rIns="36000" rtlCol="0">
             <a:spAutoFit/>
           </a:bodyPr>
           <a:lstStyle/>
@@ -6745,8 +7062,8 @@
         </p:nvSpPr>
         <p:spPr>
           <a:xfrm>
-            <a:off x="1547664" y="2956882"/>
-            <a:ext cx="1440160" cy="246221"/>
+            <a:off x="1485181" y="2822739"/>
+            <a:ext cx="1440160" cy="215444"/>
           </a:xfrm>
           <a:prstGeom prst="rect">
             <a:avLst/>
@@ -6754,7 +7071,7 @@
           <a:noFill/>
         </p:spPr>
         <p:txBody>
-          <a:bodyPr wrap="square" rtlCol="0">
+          <a:bodyPr wrap="square" lIns="0" rIns="36000" rtlCol="0">
             <a:spAutoFit/>
           </a:bodyPr>
           <a:lstStyle/>
@@ -6763,7 +7080,7 @@
               <a:defRPr sz="800"/>
             </a:pPr>
             <a:r>
-              <a:rPr lang="es-MX" sz="1000" b="1" dirty="0"/>
+              <a:rPr lang="es-MX" sz="800" b="1" dirty="0"/>
               <a:t>x</a:t>
             </a:r>
             <a:endParaRPr lang="es-MX" sz="800" b="1" dirty="0">
@@ -6780,7 +7097,7 @@
         </p:nvSpPr>
         <p:spPr>
           <a:xfrm>
-            <a:off x="1547664" y="3470231"/>
+            <a:off x="1485181" y="3470231"/>
             <a:ext cx="1284618" cy="246221"/>
           </a:xfrm>
           <a:prstGeom prst="rect">
@@ -6789,7 +7106,7 @@
           <a:noFill/>
         </p:spPr>
         <p:txBody>
-          <a:bodyPr wrap="square" rtlCol="0">
+          <a:bodyPr wrap="square" lIns="0" rIns="36000" rtlCol="0">
             <a:spAutoFit/>
           </a:bodyPr>
           <a:lstStyle/>
@@ -6815,7 +7132,7 @@
         </p:nvSpPr>
         <p:spPr>
           <a:xfrm>
-            <a:off x="1547664" y="3902859"/>
+            <a:off x="1485181" y="3902859"/>
             <a:ext cx="1201084" cy="246221"/>
           </a:xfrm>
           <a:prstGeom prst="rect">
@@ -6824,7 +7141,7 @@
           <a:noFill/>
         </p:spPr>
         <p:txBody>
-          <a:bodyPr wrap="square" rtlCol="0">
+          <a:bodyPr wrap="square" lIns="0" rIns="36000" rtlCol="0">
             <a:spAutoFit/>
           </a:bodyPr>
           <a:lstStyle/>
@@ -6850,7 +7167,7 @@
         </p:nvSpPr>
         <p:spPr>
           <a:xfrm>
-            <a:off x="1547664" y="4334907"/>
+            <a:off x="1485181" y="4334907"/>
             <a:ext cx="1117550" cy="246221"/>
           </a:xfrm>
           <a:prstGeom prst="rect">
@@ -6859,7 +7176,7 @@
           <a:noFill/>
         </p:spPr>
         <p:txBody>
-          <a:bodyPr wrap="square" rtlCol="0">
+          <a:bodyPr wrap="square" lIns="0" rIns="36000" rtlCol="0">
             <a:spAutoFit/>
           </a:bodyPr>
           <a:lstStyle/>
@@ -6885,7 +7202,7 @@
         </p:nvSpPr>
         <p:spPr>
           <a:xfrm>
-            <a:off x="1547664" y="4694947"/>
+            <a:off x="1485181" y="4694947"/>
             <a:ext cx="1117550" cy="246221"/>
           </a:xfrm>
           <a:prstGeom prst="rect">
@@ -6894,7 +7211,7 @@
           <a:noFill/>
         </p:spPr>
         <p:txBody>
-          <a:bodyPr wrap="square" rtlCol="0">
+          <a:bodyPr wrap="square" lIns="0" rIns="36000" rtlCol="0">
             <a:spAutoFit/>
           </a:bodyPr>
           <a:lstStyle/>
@@ -6920,7 +7237,7 @@
         </p:nvSpPr>
         <p:spPr>
           <a:xfrm>
-            <a:off x="1547664" y="5126995"/>
+            <a:off x="1485181" y="5126995"/>
             <a:ext cx="1201084" cy="246221"/>
           </a:xfrm>
           <a:prstGeom prst="rect">
@@ -6929,7 +7246,7 @@
           <a:noFill/>
         </p:spPr>
         <p:txBody>
-          <a:bodyPr wrap="square" rtlCol="0">
+          <a:bodyPr wrap="square" lIns="0" rIns="36000" rtlCol="0">
             <a:spAutoFit/>
           </a:bodyPr>
           <a:lstStyle/>
@@ -6955,7 +7272,7 @@
         </p:nvSpPr>
         <p:spPr>
           <a:xfrm>
-            <a:off x="1547664" y="5559043"/>
+            <a:off x="1485181" y="5559043"/>
             <a:ext cx="1117550" cy="246221"/>
           </a:xfrm>
           <a:prstGeom prst="rect">
@@ -6964,7 +7281,7 @@
           <a:noFill/>
         </p:spPr>
         <p:txBody>
-          <a:bodyPr wrap="square" rtlCol="0">
+          <a:bodyPr wrap="square" lIns="0" rIns="36000" rtlCol="0">
             <a:spAutoFit/>
           </a:bodyPr>
           <a:lstStyle/>
@@ -6990,7 +7307,7 @@
         </p:nvSpPr>
         <p:spPr>
           <a:xfrm>
-            <a:off x="1547664" y="5991091"/>
+            <a:off x="1485181" y="5991091"/>
             <a:ext cx="1201084" cy="246221"/>
           </a:xfrm>
           <a:prstGeom prst="rect">
@@ -6999,7 +7316,7 @@
           <a:noFill/>
         </p:spPr>
         <p:txBody>
-          <a:bodyPr wrap="square" rtlCol="0">
+          <a:bodyPr wrap="square" lIns="0" rIns="36000" rtlCol="0">
             <a:spAutoFit/>
           </a:bodyPr>
           <a:lstStyle/>
@@ -7025,7 +7342,7 @@
         </p:nvSpPr>
         <p:spPr>
           <a:xfrm>
-            <a:off x="1547664" y="6341258"/>
+            <a:off x="1485181" y="6341258"/>
             <a:ext cx="1368152" cy="246221"/>
           </a:xfrm>
           <a:prstGeom prst="rect">
@@ -7034,7 +7351,7 @@
           <a:noFill/>
         </p:spPr>
         <p:txBody>
-          <a:bodyPr wrap="square" rtlCol="0">
+          <a:bodyPr wrap="square" lIns="0" rIns="36000" rtlCol="0">
             <a:spAutoFit/>
           </a:bodyPr>
           <a:lstStyle/>
@@ -7203,8 +7520,8 @@
         </p:nvSpPr>
         <p:spPr>
           <a:xfrm>
-            <a:off x="3563888" y="1706774"/>
-            <a:ext cx="382422" cy="200055"/>
+            <a:off x="3516262" y="1581330"/>
+            <a:ext cx="430047" cy="200055"/>
           </a:xfrm>
           <a:prstGeom prst="rect">
             <a:avLst/>
@@ -7238,8 +7555,8 @@
         </p:nvSpPr>
         <p:spPr>
           <a:xfrm>
-            <a:off x="4283968" y="1706774"/>
-            <a:ext cx="360040" cy="200055"/>
+            <a:off x="4236343" y="1581330"/>
+            <a:ext cx="551680" cy="200055"/>
           </a:xfrm>
           <a:prstGeom prst="rect">
             <a:avLst/>
@@ -7273,8 +7590,8 @@
         </p:nvSpPr>
         <p:spPr>
           <a:xfrm>
-            <a:off x="4716016" y="1706774"/>
-            <a:ext cx="1656184" cy="220061"/>
+            <a:off x="4788023" y="1581330"/>
+            <a:ext cx="1536551" cy="200055"/>
           </a:xfrm>
           <a:prstGeom prst="rect">
             <a:avLst/>
@@ -7308,7 +7625,7 @@
         </p:nvSpPr>
         <p:spPr>
           <a:xfrm>
-            <a:off x="3851920" y="2107530"/>
+            <a:off x="3851920" y="1955130"/>
             <a:ext cx="1224136" cy="246221"/>
           </a:xfrm>
           <a:prstGeom prst="rect">
@@ -7343,7 +7660,7 @@
         </p:nvSpPr>
         <p:spPr>
           <a:xfrm>
-            <a:off x="5076056" y="2107530"/>
+            <a:off x="5220072" y="1936868"/>
             <a:ext cx="1080120" cy="246221"/>
           </a:xfrm>
           <a:prstGeom prst="rect">
@@ -7378,8 +7695,8 @@
         </p:nvSpPr>
         <p:spPr>
           <a:xfrm>
-            <a:off x="4067944" y="2996952"/>
-            <a:ext cx="2088232" cy="246221"/>
+            <a:off x="4086994" y="3044978"/>
+            <a:ext cx="2256630" cy="246221"/>
           </a:xfrm>
           <a:prstGeom prst="rect">
             <a:avLst/>
@@ -7413,8 +7730,8 @@
         </p:nvSpPr>
         <p:spPr>
           <a:xfrm>
-            <a:off x="4067944" y="3326795"/>
-            <a:ext cx="2088232" cy="246221"/>
+            <a:off x="4086994" y="3360088"/>
+            <a:ext cx="2088232" cy="223837"/>
           </a:xfrm>
           <a:prstGeom prst="rect">
             <a:avLst/>
@@ -7448,8 +7765,8 @@
         </p:nvSpPr>
         <p:spPr>
           <a:xfrm>
-            <a:off x="4067944" y="3614827"/>
-            <a:ext cx="2088232" cy="246221"/>
+            <a:off x="5898965" y="3627884"/>
+            <a:ext cx="425610" cy="248683"/>
           </a:xfrm>
           <a:prstGeom prst="rect">
             <a:avLst/>
@@ -7518,7 +7835,7 @@
         </p:nvSpPr>
         <p:spPr>
           <a:xfrm>
-            <a:off x="4644008" y="4464114"/>
+            <a:off x="4608585" y="4451854"/>
             <a:ext cx="1584176" cy="246221"/>
           </a:xfrm>
           <a:prstGeom prst="rect">
@@ -7893,6 +8210,76 @@
             <a:endParaRPr lang="es-MX" sz="1000" b="1" dirty="0">
               <a:latin typeface="+mj-lt"/>
               <a:cs typeface="Angsana New" panose="02020603050405020304" pitchFamily="18" charset="-34"/>
+            </a:endParaRPr>
+          </a:p>
+        </p:txBody>
+      </p:sp>
+      <p:sp>
+        <p:nvSpPr>
+          <p:cNvPr id="55" name="31 CuadroTexto"/>
+          <p:cNvSpPr txBox="1"/>
+          <p:nvPr/>
+        </p:nvSpPr>
+        <p:spPr>
+          <a:xfrm>
+            <a:off x="4292169" y="2210773"/>
+            <a:ext cx="1900592" cy="248683"/>
+          </a:xfrm>
+          <a:prstGeom prst="rect">
+            <a:avLst/>
+          </a:prstGeom>
+          <a:noFill/>
+        </p:spPr>
+        <p:txBody>
+          <a:bodyPr wrap="square" rtlCol="0">
+            <a:spAutoFit/>
+          </a:bodyPr>
+          <a:lstStyle/>
+          <a:p>
+            <a:pPr>
+              <a:defRPr sz="800"/>
+            </a:pPr>
+            <a:r>
+              <a:rPr lang="es-MX" sz="1000" b="1" dirty="0" smtClean="0"/>
+              <a:t>x</a:t>
+            </a:r>
+            <a:endParaRPr lang="es-MX" sz="1000" b="1" dirty="0">
+              <a:latin typeface="Arial Narrow" panose="020B0606020202030204" pitchFamily="34" charset="0"/>
+            </a:endParaRPr>
+          </a:p>
+        </p:txBody>
+      </p:sp>
+      <p:sp>
+        <p:nvSpPr>
+          <p:cNvPr id="53" name="31 CuadroTexto"/>
+          <p:cNvSpPr txBox="1"/>
+          <p:nvPr/>
+        </p:nvSpPr>
+        <p:spPr>
+          <a:xfrm>
+            <a:off x="4473756" y="3649384"/>
+            <a:ext cx="737605" cy="248683"/>
+          </a:xfrm>
+          <a:prstGeom prst="rect">
+            <a:avLst/>
+          </a:prstGeom>
+          <a:noFill/>
+        </p:spPr>
+        <p:txBody>
+          <a:bodyPr wrap="square" rtlCol="0">
+            <a:spAutoFit/>
+          </a:bodyPr>
+          <a:lstStyle/>
+          <a:p>
+            <a:pPr>
+              <a:defRPr sz="800"/>
+            </a:pPr>
+            <a:r>
+              <a:rPr lang="es-MX" sz="1000" b="1" dirty="0" smtClean="0"/>
+              <a:t>x</a:t>
+            </a:r>
+            <a:endParaRPr lang="es-MX" sz="1000" b="1" dirty="0">
+              <a:latin typeface="Arial Narrow" panose="020B0606020202030204" pitchFamily="34" charset="0"/>
             </a:endParaRPr>
           </a:p>
         </p:txBody>
@@ -7979,7 +8366,7 @@
         </p:blipFill>
         <p:spPr>
           <a:xfrm>
-            <a:off x="4018319" y="2569194"/>
+            <a:off x="4002367" y="2691775"/>
             <a:ext cx="1417777" cy="360000"/>
           </a:xfrm>
           <a:prstGeom prst="rect">
@@ -8009,7 +8396,7 @@
         </p:blipFill>
         <p:spPr>
           <a:xfrm>
-            <a:off x="3865453" y="4001413"/>
+            <a:off x="3865453" y="4115212"/>
             <a:ext cx="1786667" cy="360000"/>
           </a:xfrm>
           <a:prstGeom prst="rect">

</xml_diff>